<commit_message>
Updated the estimation deck.
</commit_message>
<xml_diff>
--- a/Agile Firestarter Autumn 2010 Agile Estimation.pptx
+++ b/Agile Firestarter Autumn 2010 Agile Estimation.pptx
@@ -1,32 +1,34 @@
 
 <file path=ppt/presentation.xml><?xml version="1.0" encoding="utf-8"?>
-<p:presentation xmlns:a="http://schemas.openxmlformats.org/drawingml/2006/main" xmlns:r="http://schemas.openxmlformats.org/officeDocument/2006/relationships" xmlns:p="http://schemas.openxmlformats.org/presentationml/2006/main" strictFirstAndLastChars="0" saveSubsetFonts="1">
+<p:presentation xmlns:a="http://schemas.openxmlformats.org/drawingml/2006/main" xmlns:r="http://schemas.openxmlformats.org/officeDocument/2006/relationships" xmlns:mc="http://schemas.openxmlformats.org/markup-compatibility/2006" xmlns:mv="urn:schemas-microsoft-com:mac:vml" xmlns:p="http://schemas.openxmlformats.org/presentationml/2006/main" mc:Ignorable="mv" mc:PreserveAttributes="mv:*" strictFirstAndLastChars="0" saveSubsetFonts="1">
   <p:sldMasterIdLst>
     <p:sldMasterId id="2147483936" r:id="rId1"/>
   </p:sldMasterIdLst>
   <p:notesMasterIdLst>
-    <p:notesMasterId r:id="rId21"/>
+    <p:notesMasterId r:id="rId23"/>
   </p:notesMasterIdLst>
   <p:sldIdLst>
     <p:sldId id="499" r:id="rId2"/>
     <p:sldId id="524" r:id="rId3"/>
-    <p:sldId id="523" r:id="rId4"/>
-    <p:sldId id="540" r:id="rId5"/>
-    <p:sldId id="541" r:id="rId6"/>
-    <p:sldId id="542" r:id="rId7"/>
-    <p:sldId id="543" r:id="rId8"/>
-    <p:sldId id="525" r:id="rId9"/>
-    <p:sldId id="526" r:id="rId10"/>
-    <p:sldId id="518" r:id="rId11"/>
-    <p:sldId id="544" r:id="rId12"/>
-    <p:sldId id="545" r:id="rId13"/>
-    <p:sldId id="517" r:id="rId14"/>
+    <p:sldId id="546" r:id="rId4"/>
+    <p:sldId id="547" r:id="rId5"/>
+    <p:sldId id="523" r:id="rId6"/>
+    <p:sldId id="540" r:id="rId7"/>
+    <p:sldId id="541" r:id="rId8"/>
+    <p:sldId id="543" r:id="rId9"/>
+    <p:sldId id="525" r:id="rId10"/>
+    <p:sldId id="526" r:id="rId11"/>
+    <p:sldId id="518" r:id="rId12"/>
+    <p:sldId id="544" r:id="rId13"/>
+    <p:sldId id="545" r:id="rId14"/>
     <p:sldId id="519" r:id="rId15"/>
-    <p:sldId id="528" r:id="rId16"/>
-    <p:sldId id="521" r:id="rId17"/>
-    <p:sldId id="520" r:id="rId18"/>
-    <p:sldId id="522" r:id="rId19"/>
-    <p:sldId id="538" r:id="rId20"/>
+    <p:sldId id="517" r:id="rId16"/>
+    <p:sldId id="548" r:id="rId17"/>
+    <p:sldId id="528" r:id="rId18"/>
+    <p:sldId id="521" r:id="rId19"/>
+    <p:sldId id="520" r:id="rId20"/>
+    <p:sldId id="522" r:id="rId21"/>
+    <p:sldId id="538" r:id="rId22"/>
   </p:sldIdLst>
   <p:sldSz cx="10160000" cy="7620000"/>
   <p:notesSz cx="6858000" cy="9144000"/>
@@ -168,7 +170,7 @@
 </file>
 
 <file path=ppt/notesMasters/notesMaster1.xml><?xml version="1.0" encoding="utf-8"?>
-<p:notesMaster xmlns:a="http://schemas.openxmlformats.org/drawingml/2006/main" xmlns:r="http://schemas.openxmlformats.org/officeDocument/2006/relationships" xmlns:p="http://schemas.openxmlformats.org/presentationml/2006/main">
+<p:notesMaster xmlns:a="http://schemas.openxmlformats.org/drawingml/2006/main" xmlns:r="http://schemas.openxmlformats.org/officeDocument/2006/relationships" xmlns:mc="http://schemas.openxmlformats.org/markup-compatibility/2006" xmlns:mv="urn:schemas-microsoft-com:mac:vml" xmlns:p="http://schemas.openxmlformats.org/presentationml/2006/main" mc:Ignorable="mv" mc:PreserveAttributes="mv:*">
   <p:cSld>
     <p:bg>
       <p:bgPr>
@@ -486,7 +488,7 @@
     </p:spTree>
     <p:extLst>
       <p:ext uri="{BB962C8B-B14F-4D97-AF65-F5344CB8AC3E}">
-        <p14:creationId xmlns:p14="http://schemas.microsoft.com/office/powerpoint/2010/main" val="2551398053"/>
+        <p14:creationId xmlns="" xmlns:a="http://schemas.openxmlformats.org/drawingml/2006/main" xmlns:r="http://schemas.openxmlformats.org/officeDocument/2006/relationships" xmlns:p="http://schemas.openxmlformats.org/presentationml/2006/main" xmlns:p14="http://schemas.microsoft.com/office/powerpoint/2010/main" xmlns:mv="urn:schemas-microsoft-com:mac:vml" xmlns:mc="http://schemas.openxmlformats.org/markup-compatibility/2006" val="2551398053"/>
       </p:ext>
     </p:extLst>
   </p:cSld>
@@ -616,8 +618,448 @@
 </p:notesMaster>
 </file>
 
+<file path=ppt/notesSlides/notesSlide1.xml><?xml version="1.0" encoding="utf-8"?>
+<p:notes xmlns:a="http://schemas.openxmlformats.org/drawingml/2006/main" xmlns:r="http://schemas.openxmlformats.org/officeDocument/2006/relationships" xmlns:mc="http://schemas.openxmlformats.org/markup-compatibility/2006" xmlns:mv="urn:schemas-microsoft-com:mac:vml" xmlns:p="http://schemas.openxmlformats.org/presentationml/2006/main" mc:Ignorable="mv" mc:PreserveAttributes="mv:*">
+  <p:cSld>
+    <p:spTree>
+      <p:nvGrpSpPr>
+        <p:cNvPr id="1" name=""/>
+        <p:cNvGrpSpPr/>
+        <p:nvPr/>
+      </p:nvGrpSpPr>
+      <p:grpSpPr>
+        <a:xfrm>
+          <a:off x="0" y="0"/>
+          <a:ext cx="0" cy="0"/>
+          <a:chOff x="0" y="0"/>
+          <a:chExt cx="0" cy="0"/>
+        </a:xfrm>
+      </p:grpSpPr>
+      <p:sp>
+        <p:nvSpPr>
+          <p:cNvPr id="2" name="Slide Image Placeholder 1"/>
+          <p:cNvSpPr>
+            <a:spLocks noGrp="1" noRot="1" noChangeAspect="1"/>
+          </p:cNvSpPr>
+          <p:nvPr>
+            <p:ph type="sldImg"/>
+          </p:nvPr>
+        </p:nvSpPr>
+        <p:spPr/>
+      </p:sp>
+      <p:sp>
+        <p:nvSpPr>
+          <p:cNvPr id="3" name="Notes Placeholder 2"/>
+          <p:cNvSpPr>
+            <a:spLocks noGrp="1"/>
+          </p:cNvSpPr>
+          <p:nvPr>
+            <p:ph type="body" idx="1"/>
+          </p:nvPr>
+        </p:nvSpPr>
+        <p:spPr/>
+        <p:txBody>
+          <a:bodyPr>
+            <a:normAutofit/>
+          </a:bodyPr>
+          <a:lstStyle/>
+          <a:p>
+            <a:r>
+              <a:rPr lang="en-US" dirty="0" smtClean="0"/>
+              <a:t>Break</a:t>
+            </a:r>
+            <a:r>
+              <a:rPr lang="en-US" baseline="0" dirty="0" smtClean="0"/>
+              <a:t> for questions about user stories!</a:t>
+            </a:r>
+            <a:endParaRPr lang="en-US" dirty="0"/>
+          </a:p>
+        </p:txBody>
+      </p:sp>
+      <p:sp>
+        <p:nvSpPr>
+          <p:cNvPr id="4" name="Slide Number Placeholder 3"/>
+          <p:cNvSpPr>
+            <a:spLocks noGrp="1"/>
+          </p:cNvSpPr>
+          <p:nvPr>
+            <p:ph type="sldNum" sz="quarter" idx="10"/>
+          </p:nvPr>
+        </p:nvSpPr>
+        <p:spPr/>
+        <p:txBody>
+          <a:bodyPr/>
+          <a:lstStyle/>
+          <a:p>
+            <a:pPr>
+              <a:defRPr/>
+            </a:pPr>
+            <a:fld id="{5A54C694-995F-4285-BB19-700A08DB7AB0}" type="slidenum">
+              <a:rPr lang="en-US" smtClean="0"/>
+              <a:pPr>
+                <a:defRPr/>
+              </a:pPr>
+              <a:t>13</a:t>
+            </a:fld>
+            <a:endParaRPr lang="en-US"/>
+          </a:p>
+        </p:txBody>
+      </p:sp>
+    </p:spTree>
+  </p:cSld>
+  <p:clrMapOvr>
+    <a:masterClrMapping/>
+  </p:clrMapOvr>
+</p:notes>
+</file>
+
+<file path=ppt/notesSlides/notesSlide2.xml><?xml version="1.0" encoding="utf-8"?>
+<p:notes xmlns:a="http://schemas.openxmlformats.org/drawingml/2006/main" xmlns:r="http://schemas.openxmlformats.org/officeDocument/2006/relationships" xmlns:mc="http://schemas.openxmlformats.org/markup-compatibility/2006" xmlns:mv="urn:schemas-microsoft-com:mac:vml" xmlns:p="http://schemas.openxmlformats.org/presentationml/2006/main" mc:Ignorable="mv" mc:PreserveAttributes="mv:*">
+  <p:cSld>
+    <p:spTree>
+      <p:nvGrpSpPr>
+        <p:cNvPr id="1" name=""/>
+        <p:cNvGrpSpPr/>
+        <p:nvPr/>
+      </p:nvGrpSpPr>
+      <p:grpSpPr>
+        <a:xfrm>
+          <a:off x="0" y="0"/>
+          <a:ext cx="0" cy="0"/>
+          <a:chOff x="0" y="0"/>
+          <a:chExt cx="0" cy="0"/>
+        </a:xfrm>
+      </p:grpSpPr>
+      <p:sp>
+        <p:nvSpPr>
+          <p:cNvPr id="2" name="Slide Image Placeholder 1"/>
+          <p:cNvSpPr>
+            <a:spLocks noGrp="1" noRot="1" noChangeAspect="1"/>
+          </p:cNvSpPr>
+          <p:nvPr>
+            <p:ph type="sldImg"/>
+          </p:nvPr>
+        </p:nvSpPr>
+        <p:spPr/>
+      </p:sp>
+      <p:sp>
+        <p:nvSpPr>
+          <p:cNvPr id="3" name="Notes Placeholder 2"/>
+          <p:cNvSpPr>
+            <a:spLocks noGrp="1"/>
+          </p:cNvSpPr>
+          <p:nvPr>
+            <p:ph type="body" idx="1"/>
+          </p:nvPr>
+        </p:nvSpPr>
+        <p:spPr/>
+        <p:txBody>
+          <a:bodyPr>
+            <a:normAutofit/>
+          </a:bodyPr>
+          <a:lstStyle/>
+          <a:p>
+            <a:pPr marL="0" marR="0" indent="0" algn="l" defTabSz="914400" rtl="0" eaLnBrk="0" fontAlgn="base" latinLnBrk="0" hangingPunct="0">
+              <a:lnSpc>
+                <a:spcPct val="100000"/>
+              </a:lnSpc>
+              <a:spcBef>
+                <a:spcPct val="0"/>
+              </a:spcBef>
+              <a:spcAft>
+                <a:spcPct val="0"/>
+              </a:spcAft>
+              <a:buClrTx/>
+              <a:buSzTx/>
+              <a:buFontTx/>
+              <a:buNone/>
+              <a:tabLst/>
+              <a:defRPr/>
+            </a:pPr>
+            <a:r>
+              <a:rPr lang="en-US" dirty="0" smtClean="0"/>
+              <a:t>Break</a:t>
+            </a:r>
+            <a:r>
+              <a:rPr lang="en-US" baseline="0" dirty="0" smtClean="0"/>
+              <a:t> for questions about story points!</a:t>
+            </a:r>
+            <a:endParaRPr lang="en-US" dirty="0" smtClean="0"/>
+          </a:p>
+          <a:p>
+            <a:endParaRPr lang="en-US" dirty="0"/>
+          </a:p>
+        </p:txBody>
+      </p:sp>
+      <p:sp>
+        <p:nvSpPr>
+          <p:cNvPr id="4" name="Slide Number Placeholder 3"/>
+          <p:cNvSpPr>
+            <a:spLocks noGrp="1"/>
+          </p:cNvSpPr>
+          <p:nvPr>
+            <p:ph type="sldNum" sz="quarter" idx="10"/>
+          </p:nvPr>
+        </p:nvSpPr>
+        <p:spPr/>
+        <p:txBody>
+          <a:bodyPr/>
+          <a:lstStyle/>
+          <a:p>
+            <a:pPr>
+              <a:defRPr/>
+            </a:pPr>
+            <a:fld id="{5A54C694-995F-4285-BB19-700A08DB7AB0}" type="slidenum">
+              <a:rPr lang="en-US" smtClean="0"/>
+              <a:pPr>
+                <a:defRPr/>
+              </a:pPr>
+              <a:t>14</a:t>
+            </a:fld>
+            <a:endParaRPr lang="en-US"/>
+          </a:p>
+        </p:txBody>
+      </p:sp>
+    </p:spTree>
+  </p:cSld>
+  <p:clrMapOvr>
+    <a:masterClrMapping/>
+  </p:clrMapOvr>
+</p:notes>
+</file>
+
+<file path=ppt/notesSlides/notesSlide3.xml><?xml version="1.0" encoding="utf-8"?>
+<p:notes xmlns:a="http://schemas.openxmlformats.org/drawingml/2006/main" xmlns:r="http://schemas.openxmlformats.org/officeDocument/2006/relationships" xmlns:mc="http://schemas.openxmlformats.org/markup-compatibility/2006" xmlns:mv="urn:schemas-microsoft-com:mac:vml" xmlns:p="http://schemas.openxmlformats.org/presentationml/2006/main" mc:Ignorable="mv" mc:PreserveAttributes="mv:*">
+  <p:cSld>
+    <p:spTree>
+      <p:nvGrpSpPr>
+        <p:cNvPr id="1" name=""/>
+        <p:cNvGrpSpPr/>
+        <p:nvPr/>
+      </p:nvGrpSpPr>
+      <p:grpSpPr>
+        <a:xfrm>
+          <a:off x="0" y="0"/>
+          <a:ext cx="0" cy="0"/>
+          <a:chOff x="0" y="0"/>
+          <a:chExt cx="0" cy="0"/>
+        </a:xfrm>
+      </p:grpSpPr>
+      <p:sp>
+        <p:nvSpPr>
+          <p:cNvPr id="2" name="Slide Image Placeholder 1"/>
+          <p:cNvSpPr>
+            <a:spLocks noGrp="1" noRot="1" noChangeAspect="1"/>
+          </p:cNvSpPr>
+          <p:nvPr>
+            <p:ph type="sldImg"/>
+          </p:nvPr>
+        </p:nvSpPr>
+        <p:spPr/>
+      </p:sp>
+      <p:sp>
+        <p:nvSpPr>
+          <p:cNvPr id="3" name="Notes Placeholder 2"/>
+          <p:cNvSpPr>
+            <a:spLocks noGrp="1"/>
+          </p:cNvSpPr>
+          <p:nvPr>
+            <p:ph type="body" idx="1"/>
+          </p:nvPr>
+        </p:nvSpPr>
+        <p:spPr/>
+        <p:txBody>
+          <a:bodyPr>
+            <a:normAutofit/>
+          </a:bodyPr>
+          <a:lstStyle/>
+          <a:p>
+            <a:pPr marL="0" marR="0" indent="0" algn="l" defTabSz="914400" rtl="0" eaLnBrk="0" fontAlgn="base" latinLnBrk="0" hangingPunct="0">
+              <a:lnSpc>
+                <a:spcPct val="100000"/>
+              </a:lnSpc>
+              <a:spcBef>
+                <a:spcPct val="0"/>
+              </a:spcBef>
+              <a:spcAft>
+                <a:spcPct val="0"/>
+              </a:spcAft>
+              <a:buClrTx/>
+              <a:buSzTx/>
+              <a:buFontTx/>
+              <a:buNone/>
+              <a:tabLst/>
+              <a:defRPr/>
+            </a:pPr>
+            <a:r>
+              <a:rPr lang="en-US" dirty="0" smtClean="0"/>
+              <a:t>Break</a:t>
+            </a:r>
+            <a:r>
+              <a:rPr lang="en-US" baseline="0" dirty="0" smtClean="0"/>
+              <a:t> for questions about Planning Poker!</a:t>
+            </a:r>
+            <a:endParaRPr lang="en-US" dirty="0" smtClean="0"/>
+          </a:p>
+          <a:p>
+            <a:endParaRPr lang="en-US" dirty="0"/>
+          </a:p>
+        </p:txBody>
+      </p:sp>
+      <p:sp>
+        <p:nvSpPr>
+          <p:cNvPr id="4" name="Slide Number Placeholder 3"/>
+          <p:cNvSpPr>
+            <a:spLocks noGrp="1"/>
+          </p:cNvSpPr>
+          <p:nvPr>
+            <p:ph type="sldNum" sz="quarter" idx="10"/>
+          </p:nvPr>
+        </p:nvSpPr>
+        <p:spPr/>
+        <p:txBody>
+          <a:bodyPr/>
+          <a:lstStyle/>
+          <a:p>
+            <a:pPr>
+              <a:defRPr/>
+            </a:pPr>
+            <a:fld id="{5A54C694-995F-4285-BB19-700A08DB7AB0}" type="slidenum">
+              <a:rPr lang="en-US" smtClean="0"/>
+              <a:pPr>
+                <a:defRPr/>
+              </a:pPr>
+              <a:t>16</a:t>
+            </a:fld>
+            <a:endParaRPr lang="en-US"/>
+          </a:p>
+        </p:txBody>
+      </p:sp>
+    </p:spTree>
+  </p:cSld>
+  <p:clrMapOvr>
+    <a:masterClrMapping/>
+  </p:clrMapOvr>
+</p:notes>
+</file>
+
+<file path=ppt/notesSlides/notesSlide4.xml><?xml version="1.0" encoding="utf-8"?>
+<p:notes xmlns:a="http://schemas.openxmlformats.org/drawingml/2006/main" xmlns:r="http://schemas.openxmlformats.org/officeDocument/2006/relationships" xmlns:mc="http://schemas.openxmlformats.org/markup-compatibility/2006" xmlns:mv="urn:schemas-microsoft-com:mac:vml" xmlns:p="http://schemas.openxmlformats.org/presentationml/2006/main" mc:Ignorable="mv" mc:PreserveAttributes="mv:*">
+  <p:cSld>
+    <p:spTree>
+      <p:nvGrpSpPr>
+        <p:cNvPr id="1" name=""/>
+        <p:cNvGrpSpPr/>
+        <p:nvPr/>
+      </p:nvGrpSpPr>
+      <p:grpSpPr>
+        <a:xfrm>
+          <a:off x="0" y="0"/>
+          <a:ext cx="0" cy="0"/>
+          <a:chOff x="0" y="0"/>
+          <a:chExt cx="0" cy="0"/>
+        </a:xfrm>
+      </p:grpSpPr>
+      <p:sp>
+        <p:nvSpPr>
+          <p:cNvPr id="2" name="Slide Image Placeholder 1"/>
+          <p:cNvSpPr>
+            <a:spLocks noGrp="1" noRot="1" noChangeAspect="1"/>
+          </p:cNvSpPr>
+          <p:nvPr>
+            <p:ph type="sldImg"/>
+          </p:nvPr>
+        </p:nvSpPr>
+        <p:spPr/>
+      </p:sp>
+      <p:sp>
+        <p:nvSpPr>
+          <p:cNvPr id="3" name="Notes Placeholder 2"/>
+          <p:cNvSpPr>
+            <a:spLocks noGrp="1"/>
+          </p:cNvSpPr>
+          <p:nvPr>
+            <p:ph type="body" idx="1"/>
+          </p:nvPr>
+        </p:nvSpPr>
+        <p:spPr/>
+        <p:txBody>
+          <a:bodyPr>
+            <a:normAutofit/>
+          </a:bodyPr>
+          <a:lstStyle/>
+          <a:p>
+            <a:pPr marL="0" marR="0" indent="0" algn="l" defTabSz="914400" rtl="0" eaLnBrk="0" fontAlgn="base" latinLnBrk="0" hangingPunct="0">
+              <a:lnSpc>
+                <a:spcPct val="100000"/>
+              </a:lnSpc>
+              <a:spcBef>
+                <a:spcPct val="0"/>
+              </a:spcBef>
+              <a:spcAft>
+                <a:spcPct val="0"/>
+              </a:spcAft>
+              <a:buClrTx/>
+              <a:buSzTx/>
+              <a:buFontTx/>
+              <a:buNone/>
+              <a:tabLst/>
+              <a:defRPr/>
+            </a:pPr>
+            <a:r>
+              <a:rPr lang="en-US" dirty="0" smtClean="0"/>
+              <a:t>Break</a:t>
+            </a:r>
+            <a:r>
+              <a:rPr lang="en-US" baseline="0" dirty="0" smtClean="0"/>
+              <a:t> for questions about Iterations and Velocity!</a:t>
+            </a:r>
+            <a:endParaRPr lang="en-US" dirty="0" smtClean="0"/>
+          </a:p>
+          <a:p>
+            <a:endParaRPr lang="en-US" dirty="0"/>
+          </a:p>
+        </p:txBody>
+      </p:sp>
+      <p:sp>
+        <p:nvSpPr>
+          <p:cNvPr id="4" name="Slide Number Placeholder 3"/>
+          <p:cNvSpPr>
+            <a:spLocks noGrp="1"/>
+          </p:cNvSpPr>
+          <p:nvPr>
+            <p:ph type="sldNum" sz="quarter" idx="10"/>
+          </p:nvPr>
+        </p:nvSpPr>
+        <p:spPr/>
+        <p:txBody>
+          <a:bodyPr/>
+          <a:lstStyle/>
+          <a:p>
+            <a:pPr>
+              <a:defRPr/>
+            </a:pPr>
+            <a:fld id="{5A54C694-995F-4285-BB19-700A08DB7AB0}" type="slidenum">
+              <a:rPr lang="en-US" smtClean="0"/>
+              <a:pPr>
+                <a:defRPr/>
+              </a:pPr>
+              <a:t>19</a:t>
+            </a:fld>
+            <a:endParaRPr lang="en-US"/>
+          </a:p>
+        </p:txBody>
+      </p:sp>
+    </p:spTree>
+  </p:cSld>
+  <p:clrMapOvr>
+    <a:masterClrMapping/>
+  </p:clrMapOvr>
+</p:notes>
+</file>
+
 <file path=ppt/slideLayouts/slideLayout1.xml><?xml version="1.0" encoding="utf-8"?>
-<p:sldLayout xmlns:a="http://schemas.openxmlformats.org/drawingml/2006/main" xmlns:r="http://schemas.openxmlformats.org/officeDocument/2006/relationships" xmlns:p="http://schemas.openxmlformats.org/presentationml/2006/main" type="title" preserve="1">
+<p:sldLayout xmlns:a="http://schemas.openxmlformats.org/drawingml/2006/main" xmlns:r="http://schemas.openxmlformats.org/officeDocument/2006/relationships" xmlns:mc="http://schemas.openxmlformats.org/markup-compatibility/2006" xmlns:mv="urn:schemas-microsoft-com:mac:vml" xmlns:p="http://schemas.openxmlformats.org/presentationml/2006/main" mc:Ignorable="mv" mc:PreserveAttributes="mv:*" type="title" preserve="1">
   <p:cSld name="Title Slide">
     <p:spTree>
       <p:nvGrpSpPr>
@@ -933,25 +1375,7 @@
                 </a:solidFill>
                 <a:latin typeface="+mn-lt"/>
               </a:rPr>
-              <a:t> </a:t>
-            </a:r>
-            <a:r>
-              <a:rPr lang="en-US" sz="1800" i="0" baseline="0" dirty="0" smtClean="0">
-                <a:solidFill>
-                  <a:schemeClr val="bg1"/>
-                </a:solidFill>
-                <a:latin typeface="+mn-lt"/>
-              </a:rPr>
-              <a:t>Autumn </a:t>
-            </a:r>
-            <a:r>
-              <a:rPr lang="en-US" sz="1800" i="0" baseline="0" dirty="0" smtClean="0">
-                <a:solidFill>
-                  <a:schemeClr val="bg1"/>
-                </a:solidFill>
-                <a:latin typeface="+mn-lt"/>
-              </a:rPr>
-              <a:t>2010</a:t>
+              <a:t> Autumn 2010</a:t>
             </a:r>
             <a:endParaRPr lang="en-US" sz="1800" i="0" dirty="0">
               <a:solidFill>
@@ -981,7 +1405,7 @@
 </file>
 
 <file path=ppt/slideLayouts/slideLayout10.xml><?xml version="1.0" encoding="utf-8"?>
-<p:sldLayout xmlns:a="http://schemas.openxmlformats.org/drawingml/2006/main" xmlns:r="http://schemas.openxmlformats.org/officeDocument/2006/relationships" xmlns:p="http://schemas.openxmlformats.org/presentationml/2006/main" type="picTx" preserve="1">
+<p:sldLayout xmlns:a="http://schemas.openxmlformats.org/drawingml/2006/main" xmlns:r="http://schemas.openxmlformats.org/officeDocument/2006/relationships" xmlns:mc="http://schemas.openxmlformats.org/markup-compatibility/2006" xmlns:mv="urn:schemas-microsoft-com:mac:vml" xmlns:p="http://schemas.openxmlformats.org/presentationml/2006/main" mc:Ignorable="mv" mc:PreserveAttributes="mv:*" type="picTx" preserve="1">
   <p:cSld name="Picture with Caption">
     <p:spTree>
       <p:nvGrpSpPr>
@@ -1168,7 +1592,7 @@
 </file>
 
 <file path=ppt/slideLayouts/slideLayout11.xml><?xml version="1.0" encoding="utf-8"?>
-<p:sldLayout xmlns:a="http://schemas.openxmlformats.org/drawingml/2006/main" xmlns:r="http://schemas.openxmlformats.org/officeDocument/2006/relationships" xmlns:p="http://schemas.openxmlformats.org/presentationml/2006/main" type="vertTx" preserve="1">
+<p:sldLayout xmlns:a="http://schemas.openxmlformats.org/drawingml/2006/main" xmlns:r="http://schemas.openxmlformats.org/officeDocument/2006/relationships" xmlns:mc="http://schemas.openxmlformats.org/markup-compatibility/2006" xmlns:mv="urn:schemas-microsoft-com:mac:vml" xmlns:p="http://schemas.openxmlformats.org/presentationml/2006/main" mc:Ignorable="mv" mc:PreserveAttributes="mv:*" type="vertTx" preserve="1">
   <p:cSld name="Title and Vertical Text">
     <p:spTree>
       <p:nvGrpSpPr>
@@ -1268,7 +1692,7 @@
 </file>
 
 <file path=ppt/slideLayouts/slideLayout12.xml><?xml version="1.0" encoding="utf-8"?>
-<p:sldLayout xmlns:a="http://schemas.openxmlformats.org/drawingml/2006/main" xmlns:r="http://schemas.openxmlformats.org/officeDocument/2006/relationships" xmlns:p="http://schemas.openxmlformats.org/presentationml/2006/main" type="vertTitleAndTx" preserve="1">
+<p:sldLayout xmlns:a="http://schemas.openxmlformats.org/drawingml/2006/main" xmlns:r="http://schemas.openxmlformats.org/officeDocument/2006/relationships" xmlns:mc="http://schemas.openxmlformats.org/markup-compatibility/2006" xmlns:mv="urn:schemas-microsoft-com:mac:vml" xmlns:p="http://schemas.openxmlformats.org/presentationml/2006/main" mc:Ignorable="mv" mc:PreserveAttributes="mv:*" type="vertTitleAndTx" preserve="1">
   <p:cSld name="Vertical Title and Text">
     <p:spTree>
       <p:nvGrpSpPr>
@@ -1378,7 +1802,7 @@
 </file>
 
 <file path=ppt/slideLayouts/slideLayout2.xml><?xml version="1.0" encoding="utf-8"?>
-<p:sldLayout xmlns:a="http://schemas.openxmlformats.org/drawingml/2006/main" xmlns:r="http://schemas.openxmlformats.org/officeDocument/2006/relationships" xmlns:p="http://schemas.openxmlformats.org/presentationml/2006/main" type="obj" preserve="1">
+<p:sldLayout xmlns:a="http://schemas.openxmlformats.org/drawingml/2006/main" xmlns:r="http://schemas.openxmlformats.org/officeDocument/2006/relationships" xmlns:mc="http://schemas.openxmlformats.org/markup-compatibility/2006" xmlns:mv="urn:schemas-microsoft-com:mac:vml" xmlns:p="http://schemas.openxmlformats.org/presentationml/2006/main" mc:Ignorable="mv" mc:PreserveAttributes="mv:*" type="obj" preserve="1">
   <p:cSld name="Title and Content">
     <p:spTree>
       <p:nvGrpSpPr>
@@ -1493,7 +1917,7 @@
 </file>
 
 <file path=ppt/slideLayouts/slideLayout3.xml><?xml version="1.0" encoding="utf-8"?>
-<p:sldLayout xmlns:a="http://schemas.openxmlformats.org/drawingml/2006/main" xmlns:r="http://schemas.openxmlformats.org/officeDocument/2006/relationships" xmlns:p="http://schemas.openxmlformats.org/presentationml/2006/main" preserve="1" userDrawn="1">
+<p:sldLayout xmlns:a="http://schemas.openxmlformats.org/drawingml/2006/main" xmlns:r="http://schemas.openxmlformats.org/officeDocument/2006/relationships" xmlns:mc="http://schemas.openxmlformats.org/markup-compatibility/2006" xmlns:mv="urn:schemas-microsoft-com:mac:vml" xmlns:p="http://schemas.openxmlformats.org/presentationml/2006/main" mc:Ignorable="mv" mc:PreserveAttributes="mv:*" preserve="1" userDrawn="1">
   <p:cSld name="Content Only">
     <p:spTree>
       <p:nvGrpSpPr>
@@ -1585,7 +2009,7 @@
 </file>
 
 <file path=ppt/slideLayouts/slideLayout4.xml><?xml version="1.0" encoding="utf-8"?>
-<p:sldLayout xmlns:a="http://schemas.openxmlformats.org/drawingml/2006/main" xmlns:r="http://schemas.openxmlformats.org/officeDocument/2006/relationships" xmlns:p="http://schemas.openxmlformats.org/presentationml/2006/main" type="secHead" preserve="1">
+<p:sldLayout xmlns:a="http://schemas.openxmlformats.org/drawingml/2006/main" xmlns:r="http://schemas.openxmlformats.org/officeDocument/2006/relationships" xmlns:mc="http://schemas.openxmlformats.org/markup-compatibility/2006" xmlns:mv="urn:schemas-microsoft-com:mac:vml" xmlns:p="http://schemas.openxmlformats.org/presentationml/2006/main" mc:Ignorable="mv" mc:PreserveAttributes="mv:*" type="secHead" preserve="1">
   <p:cSld name="Section Header">
     <p:spTree>
       <p:nvGrpSpPr>
@@ -1768,7 +2192,7 @@
 </file>
 
 <file path=ppt/slideLayouts/slideLayout5.xml><?xml version="1.0" encoding="utf-8"?>
-<p:sldLayout xmlns:a="http://schemas.openxmlformats.org/drawingml/2006/main" xmlns:r="http://schemas.openxmlformats.org/officeDocument/2006/relationships" xmlns:p="http://schemas.openxmlformats.org/presentationml/2006/main" type="twoObj" preserve="1">
+<p:sldLayout xmlns:a="http://schemas.openxmlformats.org/drawingml/2006/main" xmlns:r="http://schemas.openxmlformats.org/officeDocument/2006/relationships" xmlns:mc="http://schemas.openxmlformats.org/markup-compatibility/2006" xmlns:mv="urn:schemas-microsoft-com:mac:vml" xmlns:p="http://schemas.openxmlformats.org/presentationml/2006/main" mc:Ignorable="mv" mc:PreserveAttributes="mv:*" type="twoObj" preserve="1">
   <p:cSld name="Two Content">
     <p:spTree>
       <p:nvGrpSpPr>
@@ -1996,7 +2420,7 @@
 </file>
 
 <file path=ppt/slideLayouts/slideLayout6.xml><?xml version="1.0" encoding="utf-8"?>
-<p:sldLayout xmlns:a="http://schemas.openxmlformats.org/drawingml/2006/main" xmlns:r="http://schemas.openxmlformats.org/officeDocument/2006/relationships" xmlns:p="http://schemas.openxmlformats.org/presentationml/2006/main" type="twoTxTwoObj" preserve="1">
+<p:sldLayout xmlns:a="http://schemas.openxmlformats.org/drawingml/2006/main" xmlns:r="http://schemas.openxmlformats.org/officeDocument/2006/relationships" xmlns:mc="http://schemas.openxmlformats.org/markup-compatibility/2006" xmlns:mv="urn:schemas-microsoft-com:mac:vml" xmlns:p="http://schemas.openxmlformats.org/presentationml/2006/main" mc:Ignorable="mv" mc:PreserveAttributes="mv:*" type="twoTxTwoObj" preserve="1">
   <p:cSld name="Comparison">
     <p:spTree>
       <p:nvGrpSpPr>
@@ -2358,7 +2782,7 @@
 </file>
 
 <file path=ppt/slideLayouts/slideLayout7.xml><?xml version="1.0" encoding="utf-8"?>
-<p:sldLayout xmlns:a="http://schemas.openxmlformats.org/drawingml/2006/main" xmlns:r="http://schemas.openxmlformats.org/officeDocument/2006/relationships" xmlns:p="http://schemas.openxmlformats.org/presentationml/2006/main" type="titleOnly" preserve="1">
+<p:sldLayout xmlns:a="http://schemas.openxmlformats.org/drawingml/2006/main" xmlns:r="http://schemas.openxmlformats.org/officeDocument/2006/relationships" xmlns:mc="http://schemas.openxmlformats.org/markup-compatibility/2006" xmlns:mv="urn:schemas-microsoft-com:mac:vml" xmlns:p="http://schemas.openxmlformats.org/presentationml/2006/main" mc:Ignorable="mv" mc:PreserveAttributes="mv:*" type="titleOnly" preserve="1">
   <p:cSld name="Title Only">
     <p:spTree>
       <p:nvGrpSpPr>
@@ -2416,7 +2840,7 @@
 </file>
 
 <file path=ppt/slideLayouts/slideLayout8.xml><?xml version="1.0" encoding="utf-8"?>
-<p:sldLayout xmlns:a="http://schemas.openxmlformats.org/drawingml/2006/main" xmlns:r="http://schemas.openxmlformats.org/officeDocument/2006/relationships" xmlns:p="http://schemas.openxmlformats.org/presentationml/2006/main" type="blank" preserve="1">
+<p:sldLayout xmlns:a="http://schemas.openxmlformats.org/drawingml/2006/main" xmlns:r="http://schemas.openxmlformats.org/officeDocument/2006/relationships" xmlns:mc="http://schemas.openxmlformats.org/markup-compatibility/2006" xmlns:mv="urn:schemas-microsoft-com:mac:vml" xmlns:p="http://schemas.openxmlformats.org/presentationml/2006/main" mc:Ignorable="mv" mc:PreserveAttributes="mv:*" type="blank" preserve="1">
   <p:cSld name="Blank">
     <p:spTree>
       <p:nvGrpSpPr>
@@ -2451,7 +2875,7 @@
 </file>
 
 <file path=ppt/slideLayouts/slideLayout9.xml><?xml version="1.0" encoding="utf-8"?>
-<p:sldLayout xmlns:a="http://schemas.openxmlformats.org/drawingml/2006/main" xmlns:r="http://schemas.openxmlformats.org/officeDocument/2006/relationships" xmlns:p="http://schemas.openxmlformats.org/presentationml/2006/main" type="objTx" preserve="1">
+<p:sldLayout xmlns:a="http://schemas.openxmlformats.org/drawingml/2006/main" xmlns:r="http://schemas.openxmlformats.org/officeDocument/2006/relationships" xmlns:mc="http://schemas.openxmlformats.org/markup-compatibility/2006" xmlns:mv="urn:schemas-microsoft-com:mac:vml" xmlns:p="http://schemas.openxmlformats.org/presentationml/2006/main" mc:Ignorable="mv" mc:PreserveAttributes="mv:*" type="objTx" preserve="1">
   <p:cSld name="Content with Caption">
     <p:spTree>
       <p:nvGrpSpPr>
@@ -2658,7 +3082,7 @@
 </file>
 
 <file path=ppt/slideMasters/slideMaster1.xml><?xml version="1.0" encoding="utf-8"?>
-<p:sldMaster xmlns:a="http://schemas.openxmlformats.org/drawingml/2006/main" xmlns:r="http://schemas.openxmlformats.org/officeDocument/2006/relationships" xmlns:p="http://schemas.openxmlformats.org/presentationml/2006/main">
+<p:sldMaster xmlns:a="http://schemas.openxmlformats.org/drawingml/2006/main" xmlns:r="http://schemas.openxmlformats.org/officeDocument/2006/relationships" xmlns:mc="http://schemas.openxmlformats.org/markup-compatibility/2006" xmlns:mv="urn:schemas-microsoft-com:mac:vml" xmlns:p="http://schemas.openxmlformats.org/presentationml/2006/main" mc:Ignorable="mv" mc:PreserveAttributes="mv:*">
   <p:cSld>
     <p:bg>
       <p:bgPr>
@@ -2813,7 +3237,7 @@
             <a:fld id="{F2BCC184-CBE3-4F29-A273-6F4E5CFA4DFC}" type="datetimeFigureOut">
               <a:rPr lang="en-US" smtClean="0"/>
               <a:pPr/>
-              <a:t>11/2/2010</a:t>
+              <a:t>11/9/10</a:t>
             </a:fld>
             <a:endParaRPr lang="en-US"/>
           </a:p>
@@ -3179,7 +3603,7 @@
 </file>
 
 <file path=ppt/slides/slide1.xml><?xml version="1.0" encoding="utf-8"?>
-<p:sld xmlns:a="http://schemas.openxmlformats.org/drawingml/2006/main" xmlns:r="http://schemas.openxmlformats.org/officeDocument/2006/relationships" xmlns:p="http://schemas.openxmlformats.org/presentationml/2006/main">
+<p:sld xmlns:a="http://schemas.openxmlformats.org/drawingml/2006/main" xmlns:r="http://schemas.openxmlformats.org/officeDocument/2006/relationships" xmlns:mc="http://schemas.openxmlformats.org/markup-compatibility/2006" xmlns:mv="urn:schemas-microsoft-com:mac:vml" xmlns:p="http://schemas.openxmlformats.org/presentationml/2006/main" mc:Ignorable="mv" mc:PreserveAttributes="mv:*">
   <p:cSld>
     <p:spTree>
       <p:nvGrpSpPr>
@@ -3208,7 +3632,7 @@
         <p:spPr/>
         <p:txBody>
           <a:bodyPr>
-            <a:normAutofit/>
+            <a:normAutofit fontScale="90000"/>
           </a:bodyPr>
           <a:lstStyle/>
           <a:p>
@@ -3221,7 +3645,7 @@
                   <a:schemeClr val="bg1"/>
                 </a:solidFill>
               </a:rPr>
-              <a:t>Agile Estimation</a:t>
+              <a:t>Agile Estimation and Planning</a:t>
             </a:r>
             <a:endParaRPr sz="6000" dirty="0">
               <a:solidFill>
@@ -3261,7 +3685,7 @@
               <a:defRPr/>
             </a:pPr>
             <a:r>
-              <a:rPr lang="en-US" sz="2400" kern="0" dirty="0" smtClean="0">
+              <a:rPr lang="en-US" sz="2400" kern="0" smtClean="0">
                 <a:solidFill>
                   <a:schemeClr val="bg1"/>
                 </a:solidFill>
@@ -3280,7 +3704,7 @@
               <a:defRPr/>
             </a:pPr>
             <a:r>
-              <a:rPr lang="en-US" sz="2000" kern="0" dirty="0" err="1" smtClean="0">
+              <a:rPr lang="en-US" sz="2000" kern="0" smtClean="0">
                 <a:solidFill>
                   <a:schemeClr val="bg1"/>
                 </a:solidFill>
@@ -3314,7 +3738,7 @@
 </file>
 
 <file path=ppt/slides/slide10.xml><?xml version="1.0" encoding="utf-8"?>
-<p:sld xmlns:a="http://schemas.openxmlformats.org/drawingml/2006/main" xmlns:r="http://schemas.openxmlformats.org/officeDocument/2006/relationships" xmlns:p="http://schemas.openxmlformats.org/presentationml/2006/main">
+<p:sld xmlns:a="http://schemas.openxmlformats.org/drawingml/2006/main" xmlns:r="http://schemas.openxmlformats.org/officeDocument/2006/relationships" xmlns:mc="http://schemas.openxmlformats.org/markup-compatibility/2006" xmlns:mv="urn:schemas-microsoft-com:mac:vml" xmlns:p="http://schemas.openxmlformats.org/presentationml/2006/main" mc:Ignorable="mv" mc:PreserveAttributes="mv:*">
   <p:cSld>
     <p:spTree>
       <p:nvGrpSpPr>
@@ -3352,7 +3776,7 @@
           <a:p>
             <a:r>
               <a:rPr lang="en-US" dirty="0" smtClean="0"/>
-              <a:t>User Story Modeling</a:t>
+              <a:t>The Agile Estimation Process</a:t>
             </a:r>
             <a:endParaRPr lang="en-US" dirty="0"/>
           </a:p>
@@ -3373,31 +3797,81 @@
           <a:bodyPr/>
           <a:lstStyle/>
           <a:p>
-            <a:pPr algn="ctr">
-              <a:buNone/>
-            </a:pPr>
-            <a:r>
-              <a:rPr lang="en-US" dirty="0" smtClean="0"/>
-              <a:t>(Who) wants (what) so that (why)</a:t>
-            </a:r>
-          </a:p>
-          <a:p>
-            <a:pPr algn="ctr">
-              <a:buNone/>
-            </a:pPr>
+            <a:pPr marL="742950" indent="-742950">
+              <a:buFont typeface="+mj-lt"/>
+              <a:buAutoNum type="arabicPeriod"/>
+            </a:pPr>
+            <a:r>
+              <a:rPr lang="en-US" dirty="0" smtClean="0"/>
+              <a:t>Define your work </a:t>
+            </a:r>
+            <a:r>
+              <a:rPr lang="en-US" sz="2400" dirty="0" smtClean="0"/>
+              <a:t>(User Story Modeling)</a:t>
+            </a:r>
+            <a:endParaRPr lang="en-US" sz="2800" dirty="0" smtClean="0"/>
+          </a:p>
+          <a:p>
+            <a:pPr marL="742950" indent="-742950">
+              <a:buFont typeface="+mj-lt"/>
+              <a:buAutoNum type="arabicPeriod"/>
+            </a:pPr>
+            <a:r>
+              <a:rPr lang="en-US" dirty="0" smtClean="0"/>
+              <a:t>Estimate collaboratively </a:t>
+            </a:r>
+            <a:r>
+              <a:rPr lang="en-US" sz="2400" dirty="0" smtClean="0"/>
+              <a:t>(Planning Poker)</a:t>
+            </a:r>
+          </a:p>
+          <a:p>
+            <a:pPr marL="1187446" lvl="1" indent="-742950"/>
+            <a:r>
+              <a:rPr lang="en-US" dirty="0" smtClean="0"/>
+              <a:t>Use a unit of work, not time </a:t>
+            </a:r>
+            <a:r>
+              <a:rPr lang="en-US" sz="2000" dirty="0" smtClean="0"/>
+              <a:t>(Story Points)</a:t>
+            </a:r>
+          </a:p>
+          <a:p>
+            <a:pPr marL="1187446" lvl="1" indent="-742950"/>
+            <a:r>
+              <a:rPr lang="en-US" dirty="0" smtClean="0"/>
+              <a:t>Increase accuracy with relative sizing</a:t>
+            </a:r>
+          </a:p>
+          <a:p>
+            <a:pPr marL="742950" indent="-742950">
+              <a:buFont typeface="+mj-lt"/>
+              <a:buAutoNum type="arabicPeriod"/>
+            </a:pPr>
+            <a:r>
+              <a:rPr lang="en-US" dirty="0" smtClean="0"/>
+              <a:t>Measure real progress </a:t>
+            </a:r>
+            <a:r>
+              <a:rPr lang="en-US" sz="2400" dirty="0" smtClean="0"/>
+              <a:t>(Velocity)</a:t>
+            </a:r>
             <a:endParaRPr lang="en-US" dirty="0" smtClean="0"/>
           </a:p>
           <a:p>
-            <a:r>
-              <a:rPr lang="en-US" dirty="0" smtClean="0"/>
-              <a:t>Keep your user stories small</a:t>
-            </a:r>
-          </a:p>
-          <a:p>
-            <a:r>
-              <a:rPr lang="en-US" dirty="0" smtClean="0"/>
-              <a:t>A story is a conversation starter, and gets more detailed over time</a:t>
-            </a:r>
+            <a:pPr marL="742950" indent="-742950">
+              <a:buFont typeface="+mj-lt"/>
+              <a:buAutoNum type="arabicPeriod"/>
+            </a:pPr>
+            <a:r>
+              <a:rPr lang="en-US" dirty="0" smtClean="0"/>
+              <a:t>Adapt to change </a:t>
+            </a:r>
+            <a:r>
+              <a:rPr lang="en-US" sz="2400" dirty="0" smtClean="0"/>
+              <a:t>(Re-estimation)</a:t>
+            </a:r>
+            <a:endParaRPr lang="en-US" dirty="0"/>
           </a:p>
         </p:txBody>
       </p:sp>
@@ -3413,7 +3887,106 @@
 </file>
 
 <file path=ppt/slides/slide11.xml><?xml version="1.0" encoding="utf-8"?>
-<p:sld xmlns:a="http://schemas.openxmlformats.org/drawingml/2006/main" xmlns:r="http://schemas.openxmlformats.org/officeDocument/2006/relationships" xmlns:p="http://schemas.openxmlformats.org/presentationml/2006/main">
+<p:sld xmlns:a="http://schemas.openxmlformats.org/drawingml/2006/main" xmlns:r="http://schemas.openxmlformats.org/officeDocument/2006/relationships" xmlns:mc="http://schemas.openxmlformats.org/markup-compatibility/2006" xmlns:mv="urn:schemas-microsoft-com:mac:vml" xmlns:p="http://schemas.openxmlformats.org/presentationml/2006/main" mc:Ignorable="mv" mc:PreserveAttributes="mv:*">
+  <p:cSld>
+    <p:spTree>
+      <p:nvGrpSpPr>
+        <p:cNvPr id="1" name=""/>
+        <p:cNvGrpSpPr/>
+        <p:nvPr/>
+      </p:nvGrpSpPr>
+      <p:grpSpPr>
+        <a:xfrm>
+          <a:off x="0" y="0"/>
+          <a:ext cx="0" cy="0"/>
+          <a:chOff x="0" y="0"/>
+          <a:chExt cx="0" cy="0"/>
+        </a:xfrm>
+      </p:grpSpPr>
+      <p:sp>
+        <p:nvSpPr>
+          <p:cNvPr id="2" name="Title 1"/>
+          <p:cNvSpPr>
+            <a:spLocks noGrp="1"/>
+          </p:cNvSpPr>
+          <p:nvPr>
+            <p:ph type="title"/>
+          </p:nvPr>
+        </p:nvSpPr>
+        <p:spPr>
+          <a:xfrm>
+            <a:off x="508000" y="609600"/>
+            <a:ext cx="9144000" cy="1016000"/>
+          </a:xfrm>
+        </p:spPr>
+        <p:txBody>
+          <a:bodyPr/>
+          <a:lstStyle/>
+          <a:p>
+            <a:r>
+              <a:rPr lang="en-US" dirty="0" smtClean="0"/>
+              <a:t>User Story Modeling</a:t>
+            </a:r>
+            <a:endParaRPr lang="en-US" dirty="0"/>
+          </a:p>
+        </p:txBody>
+      </p:sp>
+      <p:sp>
+        <p:nvSpPr>
+          <p:cNvPr id="3" name="Content Placeholder 2"/>
+          <p:cNvSpPr>
+            <a:spLocks noGrp="1"/>
+          </p:cNvSpPr>
+          <p:nvPr>
+            <p:ph idx="1"/>
+          </p:nvPr>
+        </p:nvSpPr>
+        <p:spPr/>
+        <p:txBody>
+          <a:bodyPr/>
+          <a:lstStyle/>
+          <a:p>
+            <a:pPr algn="ctr">
+              <a:buNone/>
+            </a:pPr>
+            <a:r>
+              <a:rPr lang="en-US" dirty="0" smtClean="0"/>
+              <a:t>(Who) wants (what) so that (why)</a:t>
+            </a:r>
+          </a:p>
+          <a:p>
+            <a:pPr algn="ctr">
+              <a:buNone/>
+            </a:pPr>
+            <a:endParaRPr lang="en-US" dirty="0" smtClean="0"/>
+          </a:p>
+          <a:p>
+            <a:r>
+              <a:rPr lang="en-US" dirty="0" smtClean="0"/>
+              <a:t>Keep your user stories small</a:t>
+            </a:r>
+          </a:p>
+          <a:p>
+            <a:r>
+              <a:rPr lang="en-US" dirty="0" smtClean="0"/>
+              <a:t>A story is a conversation starter, and gets more detailed over time</a:t>
+            </a:r>
+          </a:p>
+        </p:txBody>
+      </p:sp>
+    </p:spTree>
+  </p:cSld>
+  <p:clrMapOvr>
+    <a:masterClrMapping/>
+  </p:clrMapOvr>
+  <p:transition>
+    <p:fade/>
+  </p:transition>
+</p:sld>
+</file>
+
+<file path=ppt/slides/slide12.xml><?xml version="1.0" encoding="utf-8"?>
+<p:sld xmlns:a="http://schemas.openxmlformats.org/drawingml/2006/main" xmlns:r="http://schemas.openxmlformats.org/officeDocument/2006/relationships" xmlns:mc="http://schemas.openxmlformats.org/markup-compatibility/2006" xmlns:mv="urn:schemas-microsoft-com:mac:vml" xmlns:p="http://schemas.openxmlformats.org/presentationml/2006/main" mc:Ignorable="mv" mc:PreserveAttributes="mv:*">
   <p:cSld>
     <p:spTree>
       <p:nvGrpSpPr>
@@ -3842,8 +4415,8 @@
 </p:sld>
 </file>
 
-<file path=ppt/slides/slide12.xml><?xml version="1.0" encoding="utf-8"?>
-<p:sld xmlns:a="http://schemas.openxmlformats.org/drawingml/2006/main" xmlns:r="http://schemas.openxmlformats.org/officeDocument/2006/relationships" xmlns:p="http://schemas.openxmlformats.org/presentationml/2006/main">
+<file path=ppt/slides/slide13.xml><?xml version="1.0" encoding="utf-8"?>
+<p:sld xmlns:a="http://schemas.openxmlformats.org/drawingml/2006/main" xmlns:r="http://schemas.openxmlformats.org/officeDocument/2006/relationships" xmlns:mc="http://schemas.openxmlformats.org/markup-compatibility/2006" xmlns:mv="urn:schemas-microsoft-com:mac:vml" xmlns:p="http://schemas.openxmlformats.org/presentationml/2006/main" mc:Ignorable="mv" mc:PreserveAttributes="mv:*">
   <p:cSld>
     <p:spTree>
       <p:nvGrpSpPr>
@@ -3989,8 +4562,8 @@
 </p:sld>
 </file>
 
-<file path=ppt/slides/slide13.xml><?xml version="1.0" encoding="utf-8"?>
-<p:sld xmlns:a="http://schemas.openxmlformats.org/drawingml/2006/main" xmlns:r="http://schemas.openxmlformats.org/officeDocument/2006/relationships" xmlns:p="http://schemas.openxmlformats.org/presentationml/2006/main">
+<file path=ppt/slides/slide14.xml><?xml version="1.0" encoding="utf-8"?>
+<p:sld xmlns:a="http://schemas.openxmlformats.org/drawingml/2006/main" xmlns:r="http://schemas.openxmlformats.org/officeDocument/2006/relationships" xmlns:mc="http://schemas.openxmlformats.org/markup-compatibility/2006" xmlns:mv="urn:schemas-microsoft-com:mac:vml" xmlns:p="http://schemas.openxmlformats.org/presentationml/2006/main" mc:Ignorable="mv" mc:PreserveAttributes="mv:*">
   <p:cSld>
     <p:spTree>
       <p:nvGrpSpPr>
@@ -4016,19 +4589,14 @@
             <p:ph type="title"/>
           </p:nvPr>
         </p:nvSpPr>
-        <p:spPr>
-          <a:xfrm>
-            <a:off x="508000" y="609600"/>
-            <a:ext cx="9144000" cy="1016000"/>
-          </a:xfrm>
-        </p:spPr>
+        <p:spPr/>
         <p:txBody>
           <a:bodyPr/>
           <a:lstStyle/>
           <a:p>
             <a:r>
-              <a:rPr lang="en-US" dirty="0" smtClean="0"/>
-              <a:t>Planning Poker</a:t>
+              <a:rPr lang="en-US" smtClean="0"/>
+              <a:t>Story Points</a:t>
             </a:r>
             <a:endParaRPr lang="en-US" dirty="0"/>
           </a:p>
@@ -4051,59 +4619,31 @@
           </a:bodyPr>
           <a:lstStyle/>
           <a:p>
-            <a:r>
-              <a:rPr lang="en-US" dirty="0" smtClean="0"/>
-              <a:t>After all the stories are written, </a:t>
-            </a:r>
-            <a:r>
-              <a:rPr lang="en-US" i="1" dirty="0" smtClean="0"/>
-              <a:t>prioritize</a:t>
-            </a:r>
-            <a:r>
-              <a:rPr lang="en-US" dirty="0" smtClean="0"/>
-              <a:t>!</a:t>
-            </a:r>
-          </a:p>
-          <a:p>
-            <a:r>
-              <a:rPr lang="en-US" dirty="0" smtClean="0"/>
-              <a:t>Choose which stories to estimate first</a:t>
-            </a:r>
-          </a:p>
-          <a:p>
-            <a:r>
-              <a:rPr lang="en-US" dirty="0" smtClean="0"/>
-              <a:t>Estimate by consensus</a:t>
-            </a:r>
-          </a:p>
-          <a:p>
-            <a:pPr lvl="1"/>
-            <a:r>
-              <a:rPr lang="en-US" dirty="0" smtClean="0"/>
-              <a:t>Have story owner give a brief overview</a:t>
-            </a:r>
-          </a:p>
-          <a:p>
-            <a:pPr lvl="1"/>
-            <a:r>
-              <a:rPr lang="en-US" dirty="0" smtClean="0"/>
-              <a:t>Only open discussion if the estimates don’t match</a:t>
-            </a:r>
-          </a:p>
-          <a:p>
-            <a:pPr lvl="1"/>
-            <a:r>
-              <a:rPr lang="en-US" dirty="0" smtClean="0"/>
-              <a:t>Record estimating assumptions</a:t>
-            </a:r>
-          </a:p>
-          <a:p>
-            <a:pPr lvl="1"/>
-            <a:endParaRPr lang="en-US" dirty="0" smtClean="0"/>
-          </a:p>
-          <a:p>
-            <a:pPr lvl="2"/>
-            <a:endParaRPr lang="en-US" dirty="0"/>
+            <a:pPr>
+              <a:buNone/>
+            </a:pPr>
+            <a:r>
+              <a:rPr lang="en-US" dirty="0" smtClean="0"/>
+              <a:t>… are an arbitrary unit of size/complexity that we use to estimate user stories in lieu of calendar time.</a:t>
+            </a:r>
+          </a:p>
+          <a:p>
+            <a:pPr>
+              <a:buNone/>
+            </a:pPr>
+            <a:r>
+              <a:rPr lang="en-US" dirty="0" smtClean="0"/>
+              <a:t>Make all estimates relative to other stories to improve the accuracy of the estimates</a:t>
+            </a:r>
+          </a:p>
+          <a:p>
+            <a:pPr>
+              <a:buNone/>
+            </a:pPr>
+            <a:r>
+              <a:rPr lang="en-US" dirty="0" smtClean="0"/>
+              <a:t>An alternative unit: Ideal Days</a:t>
+            </a:r>
           </a:p>
         </p:txBody>
       </p:sp>
@@ -4118,8 +4658,8 @@
 </p:sld>
 </file>
 
-<file path=ppt/slides/slide14.xml><?xml version="1.0" encoding="utf-8"?>
-<p:sld xmlns:a="http://schemas.openxmlformats.org/drawingml/2006/main" xmlns:r="http://schemas.openxmlformats.org/officeDocument/2006/relationships" xmlns:p="http://schemas.openxmlformats.org/presentationml/2006/main">
+<file path=ppt/slides/slide15.xml><?xml version="1.0" encoding="utf-8"?>
+<p:sld xmlns:a="http://schemas.openxmlformats.org/drawingml/2006/main" xmlns:r="http://schemas.openxmlformats.org/officeDocument/2006/relationships" xmlns:mc="http://schemas.openxmlformats.org/markup-compatibility/2006" xmlns:mv="urn:schemas-microsoft-com:mac:vml" xmlns:p="http://schemas.openxmlformats.org/presentationml/2006/main" mc:Ignorable="mv" mc:PreserveAttributes="mv:*">
   <p:cSld>
     <p:spTree>
       <p:nvGrpSpPr>
@@ -4145,14 +4685,19 @@
             <p:ph type="title"/>
           </p:nvPr>
         </p:nvSpPr>
-        <p:spPr/>
+        <p:spPr>
+          <a:xfrm>
+            <a:off x="508000" y="609600"/>
+            <a:ext cx="9144000" cy="1016000"/>
+          </a:xfrm>
+        </p:spPr>
         <p:txBody>
           <a:bodyPr/>
           <a:lstStyle/>
           <a:p>
             <a:r>
-              <a:rPr lang="en-US" smtClean="0"/>
-              <a:t>Story Points</a:t>
+              <a:rPr lang="en-US" dirty="0" smtClean="0"/>
+              <a:t>Planning Poker - Preparation</a:t>
             </a:r>
             <a:endParaRPr lang="en-US" dirty="0"/>
           </a:p>
@@ -4175,54 +4720,62 @@
           </a:bodyPr>
           <a:lstStyle/>
           <a:p>
-            <a:pPr>
-              <a:buNone/>
-            </a:pPr>
-            <a:r>
-              <a:rPr lang="en-US" dirty="0" smtClean="0"/>
-              <a:t>Story Points are a unit of size/complexity, not duration</a:t>
-            </a:r>
-          </a:p>
-          <a:p>
-            <a:pPr>
-              <a:buNone/>
-            </a:pPr>
-            <a:r>
-              <a:rPr lang="en-US" dirty="0" smtClean="0"/>
-              <a:t>Relative sizing: estimate based on other stories </a:t>
-            </a:r>
-          </a:p>
-          <a:p>
-            <a:pPr>
-              <a:buNone/>
-            </a:pPr>
-            <a:r>
-              <a:rPr lang="en-US" dirty="0" smtClean="0"/>
-              <a:t>An alternative unit: Ideal Days</a:t>
-            </a:r>
-          </a:p>
-          <a:p>
-            <a:pPr>
-              <a:buNone/>
-            </a:pPr>
+            <a:r>
+              <a:rPr lang="en-US" dirty="0" smtClean="0"/>
+              <a:t>After all the stories are written, </a:t>
+            </a:r>
+            <a:r>
+              <a:rPr lang="en-US" i="1" dirty="0" smtClean="0"/>
+              <a:t>prioritize</a:t>
+            </a:r>
+            <a:r>
+              <a:rPr lang="en-US" dirty="0" smtClean="0"/>
+              <a:t>!  We will estimate the high priority stories first.</a:t>
+            </a:r>
+          </a:p>
+          <a:p>
+            <a:r>
+              <a:rPr lang="en-US" dirty="0" smtClean="0"/>
+              <a:t>Pick a baseline story to set the unit size</a:t>
+            </a:r>
+          </a:p>
+          <a:p>
+            <a:pPr lvl="1"/>
+            <a:r>
+              <a:rPr lang="en-US" dirty="0" smtClean="0"/>
+              <a:t>Make the smallest story 1 unit OR</a:t>
+            </a:r>
+          </a:p>
+          <a:p>
+            <a:pPr lvl="1"/>
+            <a:r>
+              <a:rPr lang="en-US" dirty="0" smtClean="0"/>
+              <a:t>Choose a midsize story</a:t>
+            </a:r>
+          </a:p>
+          <a:p>
+            <a:r>
+              <a:rPr lang="en-US" dirty="0" smtClean="0"/>
+              <a:t>Pick a scale</a:t>
+            </a:r>
+          </a:p>
+          <a:p>
+            <a:pPr lvl="1"/>
+            <a:r>
+              <a:rPr lang="en-US" dirty="0" smtClean="0"/>
+              <a:t>Examples: Fibonacci sequence or Powers of 2</a:t>
+            </a:r>
+          </a:p>
+          <a:p>
             <a:endParaRPr lang="en-US" dirty="0" smtClean="0"/>
           </a:p>
           <a:p>
-            <a:pPr>
-              <a:buNone/>
-            </a:pPr>
-            <a:r>
-              <a:rPr lang="en-US" dirty="0" smtClean="0"/>
-              <a:t>Don’t worry: You </a:t>
-            </a:r>
-            <a:r>
-              <a:rPr lang="en-US" i="1" dirty="0" smtClean="0"/>
-              <a:t>will</a:t>
-            </a:r>
-            <a:r>
-              <a:rPr lang="en-US" dirty="0" smtClean="0"/>
-              <a:t> calculate duration later…</a:t>
-            </a:r>
+            <a:pPr lvl="1"/>
+            <a:endParaRPr lang="en-US" dirty="0" smtClean="0"/>
+          </a:p>
+          <a:p>
+            <a:pPr lvl="2"/>
+            <a:endParaRPr lang="en-US" dirty="0"/>
           </a:p>
         </p:txBody>
       </p:sp>
@@ -4237,8 +4790,8 @@
 </p:sld>
 </file>
 
-<file path=ppt/slides/slide15.xml><?xml version="1.0" encoding="utf-8"?>
-<p:sld xmlns:a="http://schemas.openxmlformats.org/drawingml/2006/main" xmlns:r="http://schemas.openxmlformats.org/officeDocument/2006/relationships" xmlns:p="http://schemas.openxmlformats.org/presentationml/2006/main">
+<file path=ppt/slides/slide16.xml><?xml version="1.0" encoding="utf-8"?>
+<p:sld xmlns:a="http://schemas.openxmlformats.org/drawingml/2006/main" xmlns:r="http://schemas.openxmlformats.org/officeDocument/2006/relationships" xmlns:mc="http://schemas.openxmlformats.org/markup-compatibility/2006" xmlns:mv="urn:schemas-microsoft-com:mac:vml" xmlns:p="http://schemas.openxmlformats.org/presentationml/2006/main" mc:Ignorable="mv" mc:PreserveAttributes="mv:*">
   <p:cSld>
     <p:spTree>
       <p:nvGrpSpPr>
@@ -4264,14 +4817,23 @@
             <p:ph type="title"/>
           </p:nvPr>
         </p:nvSpPr>
-        <p:spPr/>
+        <p:spPr>
+          <a:xfrm>
+            <a:off x="508000" y="609600"/>
+            <a:ext cx="9144000" cy="1016000"/>
+          </a:xfrm>
+        </p:spPr>
         <p:txBody>
           <a:bodyPr/>
           <a:lstStyle/>
           <a:p>
             <a:r>
               <a:rPr lang="en-US" dirty="0" smtClean="0"/>
-              <a:t>Story Backlog</a:t>
+              <a:t>Planning Poker - </a:t>
+            </a:r>
+            <a:r>
+              <a:rPr lang="en-US" dirty="0" err="1" smtClean="0"/>
+              <a:t>Gameplay</a:t>
             </a:r>
             <a:endParaRPr lang="en-US" dirty="0"/>
           </a:p>
@@ -4289,25 +4851,147 @@
         </p:nvSpPr>
         <p:spPr/>
         <p:txBody>
-          <a:bodyPr/>
+          <a:bodyPr>
+            <a:normAutofit fontScale="92500" lnSpcReduction="10000"/>
+          </a:bodyPr>
           <a:lstStyle/>
           <a:p>
-            <a:r>
-              <a:rPr lang="en-US" dirty="0" smtClean="0"/>
-              <a:t>This is just a bucket for all your stories</a:t>
-            </a:r>
-          </a:p>
-          <a:p>
-            <a:r>
-              <a:rPr lang="en-US" dirty="0" smtClean="0"/>
-              <a:t>Keep it organized!</a:t>
-            </a:r>
-          </a:p>
-          <a:p>
-            <a:r>
-              <a:rPr lang="en-US" dirty="0" smtClean="0"/>
-              <a:t>Pull stories off this list to create an iteration</a:t>
-            </a:r>
+            <a:pPr marL="742950" indent="-742950">
+              <a:buFont typeface="+mj-lt"/>
+              <a:buAutoNum type="arabicPeriod"/>
+            </a:pPr>
+            <a:r>
+              <a:rPr lang="en-US" sz="3200" dirty="0" smtClean="0"/>
+              <a:t>Have the story owner give a </a:t>
+            </a:r>
+            <a:r>
+              <a:rPr lang="en-US" sz="3200" i="1" dirty="0" smtClean="0"/>
+              <a:t>brief</a:t>
+            </a:r>
+            <a:r>
+              <a:rPr lang="en-US" sz="3200" dirty="0" smtClean="0"/>
+              <a:t> overview</a:t>
+            </a:r>
+          </a:p>
+          <a:p>
+            <a:pPr marL="742950" indent="-742950">
+              <a:buFont typeface="+mj-lt"/>
+              <a:buAutoNum type="arabicPeriod"/>
+            </a:pPr>
+            <a:r>
+              <a:rPr lang="en-US" sz="3200" dirty="0" smtClean="0"/>
+              <a:t>Everyone chooses </a:t>
+            </a:r>
+            <a:r>
+              <a:rPr lang="en-US" sz="3200" i="1" dirty="0" smtClean="0"/>
+              <a:t>one</a:t>
+            </a:r>
+            <a:r>
+              <a:rPr lang="en-US" sz="3200" dirty="0" smtClean="0"/>
+              <a:t> estimate (KEEP IT SECRET)</a:t>
+            </a:r>
+          </a:p>
+          <a:p>
+            <a:pPr marL="742950" indent="-742950">
+              <a:buFont typeface="+mj-lt"/>
+              <a:buAutoNum type="arabicPeriod"/>
+            </a:pPr>
+            <a:r>
+              <a:rPr lang="en-US" sz="3200" dirty="0" smtClean="0"/>
+              <a:t>On the count of 3, we reveal our estimates!</a:t>
+            </a:r>
+          </a:p>
+          <a:p>
+            <a:pPr marL="742950" indent="-742950">
+              <a:buFont typeface="+mj-lt"/>
+              <a:buAutoNum type="arabicPeriod"/>
+            </a:pPr>
+            <a:r>
+              <a:rPr lang="en-US" sz="3200" dirty="0" smtClean="0"/>
+              <a:t>Do we agree?</a:t>
+            </a:r>
+          </a:p>
+          <a:p>
+            <a:pPr marL="742950" indent="-742950">
+              <a:buNone/>
+            </a:pPr>
+            <a:r>
+              <a:rPr lang="en-US" sz="3200" dirty="0" smtClean="0"/>
+              <a:t>	</a:t>
+            </a:r>
+            <a:r>
+              <a:rPr lang="en-US" sz="3200" dirty="0" smtClean="0">
+                <a:solidFill>
+                  <a:schemeClr val="accent3"/>
+                </a:solidFill>
+              </a:rPr>
+              <a:t>YES </a:t>
+            </a:r>
+            <a:r>
+              <a:rPr lang="en-US" sz="3200" dirty="0" smtClean="0"/>
+              <a:t>– We’re done!  Move on to the next story.</a:t>
+            </a:r>
+          </a:p>
+          <a:p>
+            <a:pPr marL="742950" indent="-742950">
+              <a:buNone/>
+            </a:pPr>
+            <a:r>
+              <a:rPr lang="en-US" sz="3200" dirty="0" smtClean="0"/>
+              <a:t>	</a:t>
+            </a:r>
+            <a:r>
+              <a:rPr lang="en-US" sz="3200" dirty="0" smtClean="0">
+                <a:solidFill>
+                  <a:schemeClr val="accent2"/>
+                </a:solidFill>
+              </a:rPr>
+              <a:t>NO </a:t>
+            </a:r>
+            <a:r>
+              <a:rPr lang="en-US" sz="3200" dirty="0" smtClean="0"/>
+              <a:t>– </a:t>
+            </a:r>
+            <a:r>
+              <a:rPr lang="en-US" sz="3243" dirty="0" smtClean="0"/>
+              <a:t>The high and low outliers defend their positions in a </a:t>
+            </a:r>
+            <a:r>
+              <a:rPr lang="en-US" sz="3243" i="1" dirty="0" smtClean="0"/>
+              <a:t>short</a:t>
+            </a:r>
+            <a:r>
+              <a:rPr lang="en-US" sz="3243" dirty="0" smtClean="0"/>
+              <a:t> open discussion</a:t>
+            </a:r>
+          </a:p>
+          <a:p>
+            <a:pPr marL="1631941" lvl="2" indent="-742950">
+              <a:buFont typeface="+mj-lt"/>
+              <a:buAutoNum type="arabicPeriod"/>
+            </a:pPr>
+            <a:r>
+              <a:rPr lang="en-US" sz="2800" dirty="0" smtClean="0"/>
+              <a:t>Record any assumptions we need to make</a:t>
+            </a:r>
+          </a:p>
+          <a:p>
+            <a:pPr marL="1631941" lvl="2" indent="-742950">
+              <a:buFont typeface="+mj-lt"/>
+              <a:buAutoNum type="arabicPeriod"/>
+            </a:pPr>
+            <a:r>
+              <a:rPr lang="en-US" sz="2800" dirty="0" smtClean="0"/>
+              <a:t>Repeat steps 2 - 4 until we (mostly) agree</a:t>
+            </a:r>
+          </a:p>
+          <a:p>
+            <a:pPr lvl="1"/>
+            <a:endParaRPr lang="en-US" dirty="0" smtClean="0"/>
+          </a:p>
+          <a:p>
+            <a:pPr lvl="2"/>
+            <a:endParaRPr lang="en-US" dirty="0"/>
           </a:p>
         </p:txBody>
       </p:sp>
@@ -4322,8 +5006,8 @@
 </p:sld>
 </file>
 
-<file path=ppt/slides/slide16.xml><?xml version="1.0" encoding="utf-8"?>
-<p:sld xmlns:a="http://schemas.openxmlformats.org/drawingml/2006/main" xmlns:r="http://schemas.openxmlformats.org/officeDocument/2006/relationships" xmlns:p="http://schemas.openxmlformats.org/presentationml/2006/main">
+<file path=ppt/slides/slide17.xml><?xml version="1.0" encoding="utf-8"?>
+<p:sld xmlns:a="http://schemas.openxmlformats.org/drawingml/2006/main" xmlns:r="http://schemas.openxmlformats.org/officeDocument/2006/relationships" xmlns:mc="http://schemas.openxmlformats.org/markup-compatibility/2006" xmlns:mv="urn:schemas-microsoft-com:mac:vml" xmlns:p="http://schemas.openxmlformats.org/presentationml/2006/main" mc:Ignorable="mv" mc:PreserveAttributes="mv:*">
   <p:cSld>
     <p:spTree>
       <p:nvGrpSpPr>
@@ -4356,7 +5040,7 @@
           <a:p>
             <a:r>
               <a:rPr lang="en-US" dirty="0" smtClean="0"/>
-              <a:t>Iteration 1</a:t>
+              <a:t>Story Backlog</a:t>
             </a:r>
             <a:endParaRPr lang="en-US" dirty="0"/>
           </a:p>
@@ -4379,44 +5063,20 @@
           <a:p>
             <a:r>
               <a:rPr lang="en-US" dirty="0" smtClean="0"/>
-              <a:t>Usually 2-4 weeks</a:t>
-            </a:r>
-          </a:p>
-          <a:p>
-            <a:r>
-              <a:rPr lang="en-US" dirty="0" smtClean="0"/>
-              <a:t>Do high risk / high priority work first</a:t>
-            </a:r>
-          </a:p>
-          <a:p>
-            <a:r>
-              <a:rPr lang="en-US" dirty="0" smtClean="0"/>
-              <a:t>Make sure everyone can be kept busy</a:t>
-            </a:r>
-          </a:p>
-          <a:p>
-            <a:r>
-              <a:rPr lang="en-US" dirty="0" smtClean="0"/>
-              <a:t>How much can you do in one iteration?</a:t>
-            </a:r>
-          </a:p>
-          <a:p>
-            <a:pPr lvl="1"/>
-            <a:r>
-              <a:rPr lang="en-US" dirty="0" smtClean="0"/>
-              <a:t>Take the estimates off the stories at first</a:t>
-            </a:r>
-          </a:p>
-          <a:p>
-            <a:pPr lvl="1"/>
-            <a:r>
-              <a:rPr lang="en-US" dirty="0" smtClean="0"/>
-              <a:t>Try not to kill yourselves…</a:t>
-            </a:r>
-          </a:p>
-          <a:p>
-            <a:pPr lvl="1"/>
-            <a:endParaRPr lang="en-US" dirty="0" smtClean="0"/>
+              <a:t>This is just a bucket for all your stories</a:t>
+            </a:r>
+          </a:p>
+          <a:p>
+            <a:r>
+              <a:rPr lang="en-US" dirty="0" smtClean="0"/>
+              <a:t>Keep it prioritized!</a:t>
+            </a:r>
+          </a:p>
+          <a:p>
+            <a:r>
+              <a:rPr lang="en-US" dirty="0" smtClean="0"/>
+              <a:t>Pull estimated stories off this list to create an iteration plan</a:t>
+            </a:r>
           </a:p>
         </p:txBody>
       </p:sp>
@@ -4431,8 +5091,8 @@
 </p:sld>
 </file>
 
-<file path=ppt/slides/slide17.xml><?xml version="1.0" encoding="utf-8"?>
-<p:sld xmlns:a="http://schemas.openxmlformats.org/drawingml/2006/main" xmlns:r="http://schemas.openxmlformats.org/officeDocument/2006/relationships" xmlns:p="http://schemas.openxmlformats.org/presentationml/2006/main">
+<file path=ppt/slides/slide18.xml><?xml version="1.0" encoding="utf-8"?>
+<p:sld xmlns:a="http://schemas.openxmlformats.org/drawingml/2006/main" xmlns:r="http://schemas.openxmlformats.org/officeDocument/2006/relationships" xmlns:mc="http://schemas.openxmlformats.org/markup-compatibility/2006" xmlns:mv="urn:schemas-microsoft-com:mac:vml" xmlns:p="http://schemas.openxmlformats.org/presentationml/2006/main" mc:Ignorable="mv" mc:PreserveAttributes="mv:*">
   <p:cSld>
     <p:spTree>
       <p:nvGrpSpPr>
@@ -4464,8 +5124,8 @@
           <a:lstStyle/>
           <a:p>
             <a:r>
-              <a:rPr lang="en-US" smtClean="0"/>
-              <a:t>Team Velocity </a:t>
+              <a:rPr lang="en-US" dirty="0" smtClean="0"/>
+              <a:t>Iteration Plan</a:t>
             </a:r>
             <a:endParaRPr lang="en-US" dirty="0"/>
           </a:p>
@@ -4489,57 +5149,53 @@
           <a:lstStyle/>
           <a:p>
             <a:r>
-              <a:rPr lang="en-US" sz="3200" dirty="0" smtClean="0"/>
-              <a:t>Velocity is the number of points you can complete in one iteration</a:t>
-            </a:r>
-          </a:p>
-          <a:p>
-            <a:r>
-              <a:rPr lang="en-US" sz="3200" dirty="0" smtClean="0"/>
-              <a:t>If you can demo it, you get credit. No partial credit!</a:t>
-            </a:r>
-          </a:p>
-          <a:p>
-            <a:r>
-              <a:rPr lang="en-US" sz="3200" dirty="0" smtClean="0"/>
-              <a:t>Over time this number will stabilize (usually after 3 iterations)</a:t>
-            </a:r>
-          </a:p>
-          <a:p>
-            <a:pPr>
-              <a:buNone/>
-            </a:pPr>
-            <a:endParaRPr lang="en-US" sz="3200" dirty="0" smtClean="0"/>
-          </a:p>
-          <a:p>
-            <a:pPr algn="ctr">
-              <a:buNone/>
-            </a:pPr>
-            <a:r>
-              <a:rPr lang="en-US" sz="3200" dirty="0" smtClean="0">
-                <a:solidFill>
-                  <a:schemeClr val="accent6">
-                    <a:lumMod val="75000"/>
-                  </a:schemeClr>
-                </a:solidFill>
-              </a:rPr>
-              <a:t>Points of work / Velocity * Iteration length = </a:t>
-            </a:r>
-          </a:p>
-          <a:p>
-            <a:pPr algn="ctr">
-              <a:buNone/>
-            </a:pPr>
-            <a:r>
-              <a:rPr lang="en-US" sz="3200" dirty="0" smtClean="0">
-                <a:solidFill>
-                  <a:schemeClr val="accent6">
-                    <a:lumMod val="75000"/>
-                  </a:schemeClr>
-                </a:solidFill>
-              </a:rPr>
-              <a:t>Calendar Time!</a:t>
-            </a:r>
+              <a:rPr lang="en-US" dirty="0" smtClean="0"/>
+              <a:t>Usually 2-4 weeks</a:t>
+            </a:r>
+          </a:p>
+          <a:p>
+            <a:r>
+              <a:rPr lang="en-US" dirty="0" smtClean="0"/>
+              <a:t>Do high risk / high priority work first</a:t>
+            </a:r>
+          </a:p>
+          <a:p>
+            <a:r>
+              <a:rPr lang="en-US" dirty="0" smtClean="0"/>
+              <a:t>Make sure everyone can be kept busy</a:t>
+            </a:r>
+          </a:p>
+          <a:p>
+            <a:r>
+              <a:rPr lang="en-US" dirty="0" smtClean="0"/>
+              <a:t>How much can you do in one iteration?</a:t>
+            </a:r>
+          </a:p>
+          <a:p>
+            <a:pPr lvl="1"/>
+            <a:r>
+              <a:rPr lang="en-US" dirty="0" smtClean="0"/>
+              <a:t>Compare with previous work, if possible</a:t>
+            </a:r>
+          </a:p>
+          <a:p>
+            <a:pPr lvl="1"/>
+            <a:r>
+              <a:rPr lang="en-US" dirty="0" smtClean="0"/>
+              <a:t>If not, </a:t>
+            </a:r>
+            <a:r>
+              <a:rPr lang="en-US" i="1" dirty="0" smtClean="0"/>
+              <a:t>guess</a:t>
+            </a:r>
+            <a:r>
+              <a:rPr lang="en-US" dirty="0" smtClean="0"/>
+              <a:t>, it’s OK to be wrong!</a:t>
+            </a:r>
+          </a:p>
+          <a:p>
+            <a:pPr lvl="1"/>
+            <a:endParaRPr lang="en-US" dirty="0" smtClean="0"/>
           </a:p>
         </p:txBody>
       </p:sp>
@@ -4554,8 +5210,8 @@
 </p:sld>
 </file>
 
-<file path=ppt/slides/slide18.xml><?xml version="1.0" encoding="utf-8"?>
-<p:sld xmlns:a="http://schemas.openxmlformats.org/drawingml/2006/main" xmlns:r="http://schemas.openxmlformats.org/officeDocument/2006/relationships" xmlns:p="http://schemas.openxmlformats.org/presentationml/2006/main">
+<file path=ppt/slides/slide19.xml><?xml version="1.0" encoding="utf-8"?>
+<p:sld xmlns:a="http://schemas.openxmlformats.org/drawingml/2006/main" xmlns:r="http://schemas.openxmlformats.org/officeDocument/2006/relationships" xmlns:mc="http://schemas.openxmlformats.org/markup-compatibility/2006" xmlns:mv="urn:schemas-microsoft-com:mac:vml" xmlns:p="http://schemas.openxmlformats.org/presentationml/2006/main" mc:Ignorable="mv" mc:PreserveAttributes="mv:*">
   <p:cSld>
     <p:spTree>
       <p:nvGrpSpPr>
@@ -4588,7 +5244,7 @@
           <a:p>
             <a:r>
               <a:rPr lang="en-US" smtClean="0"/>
-              <a:t>Re-estimation</a:t>
+              <a:t>Team Velocity </a:t>
             </a:r>
             <a:endParaRPr lang="en-US" dirty="0"/>
           </a:p>
@@ -4612,22 +5268,66 @@
           <a:lstStyle/>
           <a:p>
             <a:r>
-              <a:rPr lang="en-US" dirty="0" smtClean="0"/>
-              <a:t>Re-estimate when you have new information that affects your previous estimates</a:t>
-            </a:r>
-          </a:p>
-          <a:p>
-            <a:r>
-              <a:rPr lang="en-US" dirty="0" smtClean="0"/>
-              <a:t>Review all your story estimates before each iteration</a:t>
-            </a:r>
-          </a:p>
-          <a:p>
-            <a:r>
-              <a:rPr lang="en-US" dirty="0" smtClean="0"/>
-              <a:t>Re-estimate if you change a story</a:t>
-            </a:r>
-            <a:endParaRPr lang="en-US" dirty="0"/>
+              <a:rPr lang="en-US" sz="3200" dirty="0" smtClean="0"/>
+              <a:t>Velocity is the number of points you </a:t>
+            </a:r>
+            <a:r>
+              <a:rPr lang="en-US" sz="3200" b="1" dirty="0" smtClean="0"/>
+              <a:t>completed</a:t>
+            </a:r>
+            <a:r>
+              <a:rPr lang="en-US" sz="3200" dirty="0" smtClean="0"/>
+              <a:t> in previous iterations</a:t>
+            </a:r>
+            <a:endParaRPr lang="en-US" sz="3200" b="1" dirty="0" smtClean="0"/>
+          </a:p>
+          <a:p>
+            <a:r>
+              <a:rPr lang="en-US" sz="3200" dirty="0" smtClean="0"/>
+              <a:t>Define ‘done’ to include testing and deployment!</a:t>
+            </a:r>
+          </a:p>
+          <a:p>
+            <a:r>
+              <a:rPr lang="en-US" sz="3200" dirty="0" smtClean="0"/>
+              <a:t>Over time this number will stabilize (usually after 3 iterations)</a:t>
+            </a:r>
+          </a:p>
+          <a:p>
+            <a:pPr algn="ctr">
+              <a:buNone/>
+            </a:pPr>
+            <a:endParaRPr lang="en-US" sz="3200" dirty="0" smtClean="0"/>
+          </a:p>
+          <a:p>
+            <a:pPr algn="ctr">
+              <a:buNone/>
+            </a:pPr>
+            <a:r>
+              <a:rPr lang="en-US" sz="3200" dirty="0" smtClean="0">
+                <a:solidFill>
+                  <a:schemeClr val="accent6">
+                    <a:lumMod val="75000"/>
+                  </a:schemeClr>
+                </a:solidFill>
+              </a:rPr>
+              <a:t>Total Points / Velocity * Iteration length = </a:t>
+            </a:r>
+          </a:p>
+          <a:p>
+            <a:pPr algn="ctr">
+              <a:buNone/>
+            </a:pPr>
+            <a:r>
+              <a:rPr lang="en-US" sz="3200" dirty="0" smtClean="0">
+                <a:solidFill>
+                  <a:schemeClr val="accent6">
+                    <a:lumMod val="75000"/>
+                  </a:schemeClr>
+                </a:solidFill>
+              </a:rPr>
+              <a:t>Calendar Time!</a:t>
+            </a:r>
           </a:p>
         </p:txBody>
       </p:sp>
@@ -4642,8 +5342,8 @@
 </p:sld>
 </file>
 
-<file path=ppt/slides/slide19.xml><?xml version="1.0" encoding="utf-8"?>
-<p:sld xmlns:a="http://schemas.openxmlformats.org/drawingml/2006/main" xmlns:r="http://schemas.openxmlformats.org/officeDocument/2006/relationships" xmlns:p="http://schemas.openxmlformats.org/presentationml/2006/main">
+<file path=ppt/slides/slide2.xml><?xml version="1.0" encoding="utf-8"?>
+<p:sld xmlns:a="http://schemas.openxmlformats.org/drawingml/2006/main" xmlns:r="http://schemas.openxmlformats.org/officeDocument/2006/relationships" xmlns:mc="http://schemas.openxmlformats.org/markup-compatibility/2006" xmlns:mv="urn:schemas-microsoft-com:mac:vml" xmlns:p="http://schemas.openxmlformats.org/presentationml/2006/main" mc:Ignorable="mv" mc:PreserveAttributes="mv:*">
   <p:cSld>
     <p:spTree>
       <p:nvGrpSpPr>
@@ -4661,7 +5361,7 @@
       </p:grpSpPr>
       <p:sp>
         <p:nvSpPr>
-          <p:cNvPr id="2" name="Title 1"/>
+          <p:cNvPr id="4" name="Title 3"/>
           <p:cNvSpPr>
             <a:spLocks noGrp="1"/>
           </p:cNvSpPr>
@@ -4671,119 +5371,20 @@
         </p:nvSpPr>
         <p:spPr/>
         <p:txBody>
-          <a:bodyPr/>
-          <a:lstStyle/>
-          <a:p>
-            <a:r>
-              <a:rPr lang="en-US" dirty="0" smtClean="0"/>
-              <a:t>Lab - Planning Poker</a:t>
-            </a:r>
-            <a:endParaRPr lang="en-US" dirty="0"/>
-          </a:p>
-        </p:txBody>
-      </p:sp>
-      <p:sp>
-        <p:nvSpPr>
-          <p:cNvPr id="3" name="Content Placeholder 2"/>
-          <p:cNvSpPr>
-            <a:spLocks noGrp="1"/>
-          </p:cNvSpPr>
-          <p:nvPr>
-            <p:ph idx="1"/>
-          </p:nvPr>
-        </p:nvSpPr>
-        <p:spPr/>
-        <p:txBody>
           <a:bodyPr>
-            <a:normAutofit fontScale="85000" lnSpcReduction="20000"/>
+            <a:normAutofit/>
           </a:bodyPr>
           <a:lstStyle/>
           <a:p>
-            <a:r>
-              <a:rPr lang="en-US" dirty="0" smtClean="0"/>
-              <a:t>Break up into groups</a:t>
-            </a:r>
-          </a:p>
-          <a:p>
-            <a:r>
-              <a:rPr lang="en-US" dirty="0" smtClean="0"/>
-              <a:t>Define roles you will represent:</a:t>
-            </a:r>
-          </a:p>
-          <a:p>
-            <a:pPr lvl="1"/>
-            <a:r>
-              <a:rPr lang="en-US" dirty="0" smtClean="0"/>
-              <a:t>Business users (2) and team members (design, dev, QA, etc) </a:t>
-            </a:r>
-          </a:p>
-          <a:p>
-            <a:r>
-              <a:rPr lang="en-US" dirty="0" smtClean="0"/>
-              <a:t>We work at </a:t>
-            </a:r>
-            <a:r>
-              <a:rPr lang="en-US" dirty="0" err="1" smtClean="0"/>
-              <a:t>Expedia.com</a:t>
-            </a:r>
-            <a:r>
-              <a:rPr lang="en-US" dirty="0" smtClean="0"/>
-              <a:t> and have 20 million customers. You are doing an add-on for the Customer Service team. Do a planning poker for this user story:</a:t>
-            </a:r>
-          </a:p>
-          <a:p>
-            <a:endParaRPr lang="en-US" dirty="0" smtClean="0"/>
-          </a:p>
-          <a:p>
-            <a:pPr>
-              <a:buNone/>
-            </a:pPr>
-            <a:r>
-              <a:rPr lang="en-US" dirty="0" smtClean="0"/>
-              <a:t>“</a:t>
-            </a:r>
-            <a:r>
-              <a:rPr lang="en-US" i="1" dirty="0" smtClean="0"/>
-              <a:t>Customer Service wants to search for customers by their first and last name, so that they can quickly retrieve customer information when on a call.</a:t>
-            </a:r>
-            <a:r>
-              <a:rPr lang="en-US" dirty="0" smtClean="0"/>
-              <a:t>”</a:t>
-            </a:r>
-          </a:p>
-          <a:p>
+            <a:pPr algn="ctr"/>
+            <a:r>
+              <a:rPr lang="en-US" dirty="0" smtClean="0"/>
+              <a:t>What is Estimation?</a:t>
+            </a:r>
             <a:endParaRPr lang="en-US" dirty="0"/>
           </a:p>
         </p:txBody>
       </p:sp>
-    </p:spTree>
-  </p:cSld>
-  <p:clrMapOvr>
-    <a:masterClrMapping/>
-  </p:clrMapOvr>
-  <p:transition>
-    <p:fade/>
-  </p:transition>
-</p:sld>
-</file>
-
-<file path=ppt/slides/slide2.xml><?xml version="1.0" encoding="utf-8"?>
-<p:sld xmlns:a="http://schemas.openxmlformats.org/drawingml/2006/main" xmlns:r="http://schemas.openxmlformats.org/officeDocument/2006/relationships" xmlns:p="http://schemas.openxmlformats.org/presentationml/2006/main">
-  <p:cSld>
-    <p:spTree>
-      <p:nvGrpSpPr>
-        <p:cNvPr id="1" name=""/>
-        <p:cNvGrpSpPr/>
-        <p:nvPr/>
-      </p:nvGrpSpPr>
-      <p:grpSpPr>
-        <a:xfrm>
-          <a:off x="0" y="0"/>
-          <a:ext cx="0" cy="0"/>
-          <a:chOff x="0" y="0"/>
-          <a:chExt cx="0" cy="0"/>
-        </a:xfrm>
-      </p:grpSpPr>
       <p:sp>
         <p:nvSpPr>
           <p:cNvPr id="3" name="Content Placeholder 2"/>
@@ -4796,7 +5397,9 @@
         </p:nvSpPr>
         <p:spPr/>
         <p:txBody>
-          <a:bodyPr anchor="ctr"/>
+          <a:bodyPr anchor="t">
+            <a:normAutofit lnSpcReduction="10000"/>
+          </a:bodyPr>
           <a:lstStyle/>
           <a:p>
             <a:pPr algn="ctr">
@@ -4824,11 +5427,45 @@
             </a:r>
             <a:r>
               <a:rPr lang="en-US" dirty="0" smtClean="0"/>
-              <a:t> even if input data may be incomplete or uncertain.</a:t>
-            </a:r>
-          </a:p>
-          <a:p>
-            <a:endParaRPr lang="en-US" dirty="0"/>
+              <a:t> even if input data may be </a:t>
+            </a:r>
+            <a:r>
+              <a:rPr lang="en-US" b="1" dirty="0" smtClean="0"/>
+              <a:t>incomplete</a:t>
+            </a:r>
+            <a:r>
+              <a:rPr lang="en-US" dirty="0" smtClean="0"/>
+              <a:t> or </a:t>
+            </a:r>
+            <a:r>
+              <a:rPr lang="en-US" b="1" dirty="0" smtClean="0"/>
+              <a:t>uncertain</a:t>
+            </a:r>
+            <a:r>
+              <a:rPr lang="en-US" dirty="0" smtClean="0"/>
+              <a:t>.</a:t>
+            </a:r>
+          </a:p>
+          <a:p>
+            <a:pPr algn="ctr">
+              <a:buNone/>
+            </a:pPr>
+            <a:endParaRPr lang="en-US" dirty="0" smtClean="0"/>
+          </a:p>
+          <a:p>
+            <a:pPr algn="ctr">
+              <a:buNone/>
+            </a:pPr>
+            <a:r>
+              <a:rPr lang="en-US" dirty="0" smtClean="0"/>
+              <a:t>In software engineering, estimation is the process of speculating the amount of effort required to complete a task or set of tasks.</a:t>
+            </a:r>
+          </a:p>
+          <a:p>
+            <a:pPr algn="ctr">
+              <a:buNone/>
+            </a:pPr>
+            <a:endParaRPr lang="en-US" dirty="0" smtClean="0"/>
           </a:p>
         </p:txBody>
       </p:sp>
@@ -4850,8 +5487,8 @@
 </p:sld>
 </file>
 
-<file path=ppt/slides/slide3.xml><?xml version="1.0" encoding="utf-8"?>
-<p:sld xmlns:a="http://schemas.openxmlformats.org/drawingml/2006/main" xmlns:r="http://schemas.openxmlformats.org/officeDocument/2006/relationships" xmlns:p="http://schemas.openxmlformats.org/presentationml/2006/main">
+<file path=ppt/slides/slide20.xml><?xml version="1.0" encoding="utf-8"?>
+<p:sld xmlns:a="http://schemas.openxmlformats.org/drawingml/2006/main" xmlns:r="http://schemas.openxmlformats.org/officeDocument/2006/relationships" xmlns:mc="http://schemas.openxmlformats.org/markup-compatibility/2006" xmlns:mv="urn:schemas-microsoft-com:mac:vml" xmlns:p="http://schemas.openxmlformats.org/presentationml/2006/main" mc:Ignorable="mv" mc:PreserveAttributes="mv:*">
   <p:cSld>
     <p:spTree>
       <p:nvGrpSpPr>
@@ -4877,19 +5514,14 @@
             <p:ph type="title"/>
           </p:nvPr>
         </p:nvSpPr>
-        <p:spPr>
-          <a:xfrm>
-            <a:off x="508000" y="609600"/>
-            <a:ext cx="9144000" cy="1016000"/>
-          </a:xfrm>
-        </p:spPr>
+        <p:spPr/>
         <p:txBody>
           <a:bodyPr/>
           <a:lstStyle/>
           <a:p>
             <a:r>
               <a:rPr lang="en-US" dirty="0" smtClean="0"/>
-              <a:t>Common Problems with Estimation</a:t>
+              <a:t>Re-estimation</a:t>
             </a:r>
             <a:endParaRPr lang="en-US" dirty="0"/>
           </a:p>
@@ -4912,43 +5544,32 @@
           </a:bodyPr>
           <a:lstStyle/>
           <a:p>
-            <a:pPr>
-              <a:buNone/>
-            </a:pPr>
-            <a:r>
-              <a:rPr lang="en-US" dirty="0" smtClean="0"/>
-              <a:t>Manager: “How long will this take?”</a:t>
-            </a:r>
-          </a:p>
-          <a:p>
-            <a:pPr>
-              <a:buNone/>
-            </a:pPr>
-            <a:r>
-              <a:rPr lang="en-US" dirty="0" smtClean="0"/>
-              <a:t>Engineer: “Do you mean if I worked full time on JUST THIS, or with my other work?”</a:t>
-            </a:r>
-          </a:p>
-          <a:p>
-            <a:pPr>
-              <a:buNone/>
-            </a:pPr>
-            <a:endParaRPr lang="en-US" dirty="0" smtClean="0"/>
-          </a:p>
-          <a:p>
-            <a:pPr algn="ctr">
-              <a:buNone/>
-            </a:pPr>
-            <a:r>
-              <a:rPr lang="en-US" dirty="0" smtClean="0"/>
-              <a:t>Calendar time is not a measure of effort.</a:t>
-            </a:r>
-          </a:p>
-          <a:p>
-            <a:pPr algn="ctr">
-              <a:buNone/>
-            </a:pPr>
-            <a:endParaRPr lang="en-US" dirty="0" smtClean="0"/>
+            <a:r>
+              <a:rPr lang="en-US" dirty="0" smtClean="0"/>
+              <a:t>Re-estimate when you have new information that affects your previous estimates</a:t>
+            </a:r>
+          </a:p>
+          <a:p>
+            <a:r>
+              <a:rPr lang="en-US" dirty="0" smtClean="0"/>
+              <a:t>Review your story estimates before each iteration, do they still make sense?</a:t>
+            </a:r>
+          </a:p>
+          <a:p>
+            <a:r>
+              <a:rPr lang="en-US" dirty="0" smtClean="0"/>
+              <a:t>Re-estimate if you change a story</a:t>
+            </a:r>
+          </a:p>
+          <a:p>
+            <a:r>
+              <a:rPr lang="en-US" b="1" dirty="0" smtClean="0"/>
+              <a:t>NEVER </a:t>
+            </a:r>
+            <a:r>
+              <a:rPr lang="en-US" dirty="0" smtClean="0"/>
+              <a:t>change an estimate after a story is completed!</a:t>
+            </a:r>
           </a:p>
         </p:txBody>
       </p:sp>
@@ -4963,8 +5584,8 @@
 </p:sld>
 </file>
 
-<file path=ppt/slides/slide4.xml><?xml version="1.0" encoding="utf-8"?>
-<p:sld xmlns:a="http://schemas.openxmlformats.org/drawingml/2006/main" xmlns:r="http://schemas.openxmlformats.org/officeDocument/2006/relationships" xmlns:p="http://schemas.openxmlformats.org/presentationml/2006/main">
+<file path=ppt/slides/slide21.xml><?xml version="1.0" encoding="utf-8"?>
+<p:sld xmlns:a="http://schemas.openxmlformats.org/drawingml/2006/main" xmlns:r="http://schemas.openxmlformats.org/officeDocument/2006/relationships" xmlns:mc="http://schemas.openxmlformats.org/markup-compatibility/2006" xmlns:mv="urn:schemas-microsoft-com:mac:vml" xmlns:p="http://schemas.openxmlformats.org/presentationml/2006/main" mc:Ignorable="mv" mc:PreserveAttributes="mv:*">
   <p:cSld>
     <p:spTree>
       <p:nvGrpSpPr>
@@ -4990,19 +5611,14 @@
             <p:ph type="title"/>
           </p:nvPr>
         </p:nvSpPr>
-        <p:spPr>
-          <a:xfrm>
-            <a:off x="508000" y="609600"/>
-            <a:ext cx="9144000" cy="1016000"/>
-          </a:xfrm>
-        </p:spPr>
+        <p:spPr/>
         <p:txBody>
           <a:bodyPr/>
           <a:lstStyle/>
           <a:p>
             <a:r>
               <a:rPr lang="en-US" dirty="0" smtClean="0"/>
-              <a:t>Common Problems with Estimation</a:t>
+              <a:t>Lab - Planning Poker</a:t>
             </a:r>
             <a:endParaRPr lang="en-US" dirty="0"/>
           </a:p>
@@ -5021,55 +5637,64 @@
         <p:spPr/>
         <p:txBody>
           <a:bodyPr>
-            <a:normAutofit/>
+            <a:normAutofit fontScale="85000" lnSpcReduction="20000"/>
           </a:bodyPr>
           <a:lstStyle/>
           <a:p>
+            <a:r>
+              <a:rPr lang="en-US" dirty="0" smtClean="0"/>
+              <a:t>Break up into groups</a:t>
+            </a:r>
+          </a:p>
+          <a:p>
+            <a:r>
+              <a:rPr lang="en-US" dirty="0" smtClean="0"/>
+              <a:t>Define roles you will represent:</a:t>
+            </a:r>
+          </a:p>
+          <a:p>
+            <a:pPr lvl="1"/>
+            <a:r>
+              <a:rPr lang="en-US" dirty="0" smtClean="0"/>
+              <a:t>Business users (2) and team members (design, dev, QA, etc) </a:t>
+            </a:r>
+          </a:p>
+          <a:p>
+            <a:r>
+              <a:rPr lang="en-US" dirty="0" smtClean="0"/>
+              <a:t>We work at </a:t>
+            </a:r>
+            <a:r>
+              <a:rPr lang="en-US" dirty="0" err="1" smtClean="0"/>
+              <a:t>Expedia.com</a:t>
+            </a:r>
+            <a:r>
+              <a:rPr lang="en-US" dirty="0" smtClean="0"/>
+              <a:t> and have 20 million customers. You are doing an add-on for the Customer Service team. Do a planning poker for this user story:</a:t>
+            </a:r>
+          </a:p>
+          <a:p>
+            <a:endParaRPr lang="en-US" dirty="0" smtClean="0"/>
+          </a:p>
+          <a:p>
             <a:pPr>
               <a:buNone/>
             </a:pPr>
             <a:r>
               <a:rPr lang="en-US" dirty="0" smtClean="0"/>
-              <a:t>Manager: “Joe said it would take three weeks.”</a:t>
-            </a:r>
-          </a:p>
-          <a:p>
-            <a:pPr>
-              <a:buNone/>
-            </a:pPr>
-            <a:r>
-              <a:rPr lang="en-US" dirty="0" smtClean="0"/>
-              <a:t>Engineer: “What!? He’s wrong, the </a:t>
-            </a:r>
-            <a:r>
-              <a:rPr lang="en-US" dirty="0" err="1" smtClean="0"/>
-              <a:t>MountainCrusher</a:t>
-            </a:r>
-            <a:r>
-              <a:rPr lang="en-US" dirty="0" smtClean="0"/>
-              <a:t> library already does that, and I have a copy right here.”</a:t>
-            </a:r>
-          </a:p>
-          <a:p>
-            <a:pPr>
-              <a:buNone/>
-            </a:pPr>
-            <a:endParaRPr lang="en-US" dirty="0" smtClean="0"/>
-          </a:p>
-          <a:p>
-            <a:pPr algn="ctr">
-              <a:buNone/>
-            </a:pPr>
-            <a:r>
-              <a:rPr lang="en-US" dirty="0" smtClean="0"/>
-              <a:t>One’s mountain is another’s molehill.</a:t>
-            </a:r>
-          </a:p>
-          <a:p>
-            <a:pPr algn="ctr">
-              <a:buNone/>
-            </a:pPr>
-            <a:endParaRPr lang="en-US" dirty="0" smtClean="0"/>
+              <a:t>“</a:t>
+            </a:r>
+            <a:r>
+              <a:rPr lang="en-US" i="1" dirty="0" smtClean="0"/>
+              <a:t>Customer Service wants to search for customers by their first and last name, so that they can quickly retrieve customer information when on a call.</a:t>
+            </a:r>
+            <a:r>
+              <a:rPr lang="en-US" dirty="0" smtClean="0"/>
+              <a:t>”</a:t>
+            </a:r>
+          </a:p>
+          <a:p>
+            <a:endParaRPr lang="en-US" dirty="0"/>
           </a:p>
         </p:txBody>
       </p:sp>
@@ -5084,8 +5709,8 @@
 </p:sld>
 </file>
 
-<file path=ppt/slides/slide5.xml><?xml version="1.0" encoding="utf-8"?>
-<p:sld xmlns:a="http://schemas.openxmlformats.org/drawingml/2006/main" xmlns:r="http://schemas.openxmlformats.org/officeDocument/2006/relationships" xmlns:p="http://schemas.openxmlformats.org/presentationml/2006/main">
+<file path=ppt/slides/slide3.xml><?xml version="1.0" encoding="utf-8"?>
+<p:sld xmlns:a="http://schemas.openxmlformats.org/drawingml/2006/main" xmlns:r="http://schemas.openxmlformats.org/officeDocument/2006/relationships" xmlns:mc="http://schemas.openxmlformats.org/markup-compatibility/2006" xmlns:mv="urn:schemas-microsoft-com:mac:vml" xmlns:p="http://schemas.openxmlformats.org/presentationml/2006/main" mc:Ignorable="mv" mc:PreserveAttributes="mv:*">
   <p:cSld>
     <p:spTree>
       <p:nvGrpSpPr>
@@ -5111,19 +5736,15 @@
             <p:ph type="title"/>
           </p:nvPr>
         </p:nvSpPr>
-        <p:spPr>
-          <a:xfrm>
-            <a:off x="508000" y="609600"/>
-            <a:ext cx="9144000" cy="1016000"/>
-          </a:xfrm>
-        </p:spPr>
+        <p:spPr/>
         <p:txBody>
           <a:bodyPr/>
           <a:lstStyle/>
           <a:p>
-            <a:r>
-              <a:rPr lang="en-US" dirty="0" smtClean="0"/>
-              <a:t>Common Problems with Estimation</a:t>
+            <a:pPr algn="ctr"/>
+            <a:r>
+              <a:rPr lang="en-US" dirty="0" smtClean="0"/>
+              <a:t>Why Do We Estimate Work?</a:t>
             </a:r>
             <a:endParaRPr lang="en-US" dirty="0"/>
           </a:p>
@@ -5141,48 +5762,31 @@
         </p:nvSpPr>
         <p:spPr/>
         <p:txBody>
-          <a:bodyPr>
-            <a:normAutofit/>
-          </a:bodyPr>
+          <a:bodyPr/>
           <a:lstStyle/>
           <a:p>
-            <a:pPr>
-              <a:buNone/>
-            </a:pPr>
-            <a:r>
-              <a:rPr lang="en-US" dirty="0" smtClean="0"/>
-              <a:t>Manager: “Why is this taking so long!?  You said this would only be two days!”</a:t>
-            </a:r>
-          </a:p>
-          <a:p>
-            <a:pPr>
-              <a:buNone/>
-            </a:pPr>
-            <a:r>
-              <a:rPr lang="en-US" dirty="0" smtClean="0"/>
-              <a:t>Engineer: “I said that 4 months ago!  The current system architecture makes this feature much harder to build.”</a:t>
-            </a:r>
-          </a:p>
-          <a:p>
-            <a:pPr>
-              <a:buNone/>
-            </a:pPr>
-            <a:endParaRPr lang="en-US" dirty="0" smtClean="0"/>
-          </a:p>
-          <a:p>
-            <a:pPr algn="ctr">
-              <a:buNone/>
-            </a:pPr>
-            <a:r>
-              <a:rPr lang="en-US" dirty="0" smtClean="0"/>
-              <a:t>Estimates have a short shelf-life.</a:t>
-            </a:r>
-          </a:p>
-          <a:p>
-            <a:pPr algn="ctr">
-              <a:buNone/>
-            </a:pPr>
-            <a:endParaRPr lang="en-US" dirty="0" smtClean="0"/>
+            <a:r>
+              <a:rPr lang="en-US" dirty="0" smtClean="0"/>
+              <a:t>Resource Planning</a:t>
+            </a:r>
+          </a:p>
+          <a:p>
+            <a:r>
+              <a:rPr lang="en-US" dirty="0" smtClean="0"/>
+              <a:t>Cost vs. Benefit Analysis</a:t>
+            </a:r>
+          </a:p>
+          <a:p>
+            <a:r>
+              <a:rPr lang="en-US" dirty="0" smtClean="0"/>
+              <a:t>Coordination with other projects</a:t>
+            </a:r>
+          </a:p>
+          <a:p>
+            <a:r>
+              <a:rPr lang="en-US" dirty="0" smtClean="0"/>
+              <a:t>What else?</a:t>
+            </a:r>
           </a:p>
         </p:txBody>
       </p:sp>
@@ -5197,8 +5801,8 @@
 </p:sld>
 </file>
 
-<file path=ppt/slides/slide6.xml><?xml version="1.0" encoding="utf-8"?>
-<p:sld xmlns:a="http://schemas.openxmlformats.org/drawingml/2006/main" xmlns:r="http://schemas.openxmlformats.org/officeDocument/2006/relationships" xmlns:p="http://schemas.openxmlformats.org/presentationml/2006/main">
+<file path=ppt/slides/slide4.xml><?xml version="1.0" encoding="utf-8"?>
+<p:sld xmlns:a="http://schemas.openxmlformats.org/drawingml/2006/main" xmlns:r="http://schemas.openxmlformats.org/officeDocument/2006/relationships" xmlns:mc="http://schemas.openxmlformats.org/markup-compatibility/2006" xmlns:mv="urn:schemas-microsoft-com:mac:vml" xmlns:p="http://schemas.openxmlformats.org/presentationml/2006/main" mc:Ignorable="mv" mc:PreserveAttributes="mv:*">
   <p:cSld>
     <p:spTree>
       <p:nvGrpSpPr>
@@ -5224,81 +5828,95 @@
             <p:ph type="title"/>
           </p:nvPr>
         </p:nvSpPr>
+        <p:spPr/>
+        <p:txBody>
+          <a:bodyPr/>
+          <a:lstStyle/>
+          <a:p>
+            <a:pPr algn="ctr"/>
+            <a:r>
+              <a:rPr lang="en-US" dirty="0" smtClean="0"/>
+              <a:t>Why Do We </a:t>
+            </a:r>
+            <a:r>
+              <a:rPr lang="en-US" i="1" dirty="0" smtClean="0"/>
+              <a:t>Really </a:t>
+            </a:r>
+            <a:r>
+              <a:rPr lang="en-US" dirty="0" smtClean="0"/>
+              <a:t>Estimate Work?</a:t>
+            </a:r>
+            <a:endParaRPr lang="en-US" dirty="0"/>
+          </a:p>
+        </p:txBody>
+      </p:sp>
+      <p:sp>
+        <p:nvSpPr>
+          <p:cNvPr id="3" name="Content Placeholder 2"/>
+          <p:cNvSpPr>
+            <a:spLocks noGrp="1"/>
+          </p:cNvSpPr>
+          <p:nvPr>
+            <p:ph idx="1"/>
+          </p:nvPr>
+        </p:nvSpPr>
         <p:spPr>
           <a:xfrm>
-            <a:off x="508000" y="609600"/>
-            <a:ext cx="9144000" cy="1016000"/>
+            <a:off x="1498600" y="6248400"/>
+            <a:ext cx="7086600" cy="838200"/>
           </a:xfrm>
         </p:spPr>
         <p:txBody>
           <a:bodyPr/>
           <a:lstStyle/>
           <a:p>
-            <a:r>
-              <a:rPr lang="en-US" dirty="0" smtClean="0"/>
-              <a:t>Common Problems with Estimation</a:t>
-            </a:r>
-            <a:endParaRPr lang="en-US" dirty="0"/>
-          </a:p>
-        </p:txBody>
-      </p:sp>
-      <p:sp>
-        <p:nvSpPr>
-          <p:cNvPr id="3" name="Content Placeholder 2"/>
-          <p:cNvSpPr>
-            <a:spLocks noGrp="1"/>
-          </p:cNvSpPr>
-          <p:nvPr>
-            <p:ph idx="1"/>
-          </p:nvPr>
-        </p:nvSpPr>
-        <p:spPr/>
-        <p:txBody>
-          <a:bodyPr>
-            <a:normAutofit/>
-          </a:bodyPr>
-          <a:lstStyle/>
-          <a:p>
-            <a:pPr>
-              <a:buNone/>
-            </a:pPr>
-            <a:r>
-              <a:rPr lang="en-US" dirty="0" smtClean="0"/>
-              <a:t>Engineer: “I don’t know how long it will take until I know every detail.”</a:t>
-            </a:r>
-          </a:p>
-          <a:p>
-            <a:pPr>
-              <a:buNone/>
-            </a:pPr>
-            <a:r>
-              <a:rPr lang="en-US" dirty="0" smtClean="0"/>
-              <a:t>Manager: “I gave you everything we have, now just take a guess.”</a:t>
-            </a:r>
-          </a:p>
-          <a:p>
-            <a:pPr>
-              <a:buNone/>
-            </a:pPr>
+            <a:pPr algn="ctr">
+              <a:buNone/>
+            </a:pPr>
+            <a:r>
+              <a:rPr lang="en-US" dirty="0" smtClean="0"/>
+              <a:t>To avoid </a:t>
+            </a:r>
+            <a:r>
+              <a:rPr lang="en-US" b="1" i="1" dirty="0" smtClean="0"/>
+              <a:t>stressful </a:t>
+            </a:r>
+            <a:r>
+              <a:rPr lang="en-US" i="1" dirty="0" smtClean="0"/>
+              <a:t>situations!!</a:t>
+            </a:r>
             <a:endParaRPr lang="en-US" dirty="0" smtClean="0"/>
           </a:p>
           <a:p>
-            <a:pPr algn="ctr">
-              <a:buNone/>
-            </a:pPr>
-            <a:r>
-              <a:rPr lang="en-US" dirty="0" smtClean="0"/>
-              <a:t>You will never know every detail up front.</a:t>
-            </a:r>
-          </a:p>
-          <a:p>
-            <a:pPr algn="ctr">
-              <a:buNone/>
-            </a:pPr>
+            <a:pPr algn="ctr"/>
             <a:endParaRPr lang="en-US" dirty="0" smtClean="0"/>
           </a:p>
         </p:txBody>
       </p:sp>
+      <p:pic>
+        <p:nvPicPr>
+          <p:cNvPr id="4" name="Picture 3" descr="stressedcat16.jpg"/>
+          <p:cNvPicPr>
+            <a:picLocks noChangeAspect="1"/>
+          </p:cNvPicPr>
+          <p:nvPr/>
+        </p:nvPicPr>
+        <p:blipFill>
+          <a:blip r:embed="rId2"/>
+          <a:stretch>
+            <a:fillRect/>
+          </a:stretch>
+        </p:blipFill>
+        <p:spPr>
+          <a:xfrm>
+            <a:off x="1811815" y="1905000"/>
+            <a:ext cx="6544785" cy="4267200"/>
+          </a:xfrm>
+          <a:prstGeom prst="rect">
+            <a:avLst/>
+          </a:prstGeom>
+        </p:spPr>
+      </p:pic>
     </p:spTree>
   </p:cSld>
   <p:clrMapOvr>
@@ -5310,8 +5928,8 @@
 </p:sld>
 </file>
 
-<file path=ppt/slides/slide7.xml><?xml version="1.0" encoding="utf-8"?>
-<p:sld xmlns:a="http://schemas.openxmlformats.org/drawingml/2006/main" xmlns:r="http://schemas.openxmlformats.org/officeDocument/2006/relationships" xmlns:p="http://schemas.openxmlformats.org/presentationml/2006/main">
+<file path=ppt/slides/slide5.xml><?xml version="1.0" encoding="utf-8"?>
+<p:sld xmlns:a="http://schemas.openxmlformats.org/drawingml/2006/main" xmlns:r="http://schemas.openxmlformats.org/officeDocument/2006/relationships" xmlns:mc="http://schemas.openxmlformats.org/markup-compatibility/2006" xmlns:mv="urn:schemas-microsoft-com:mac:vml" xmlns:p="http://schemas.openxmlformats.org/presentationml/2006/main" mc:Ignorable="mv" mc:PreserveAttributes="mv:*">
   <p:cSld>
     <p:spTree>
       <p:nvGrpSpPr>
@@ -5372,12 +5990,35 @@
           </a:bodyPr>
           <a:lstStyle/>
           <a:p>
+            <a:pPr algn="ctr">
+              <a:buNone/>
+            </a:pPr>
+            <a:r>
+              <a:rPr lang="en-US" sz="4000" dirty="0" smtClean="0"/>
+              <a:t>Calendar time is </a:t>
+            </a:r>
+            <a:r>
+              <a:rPr lang="en-US" sz="4000" i="1" dirty="0" smtClean="0"/>
+              <a:t>not</a:t>
+            </a:r>
+            <a:r>
+              <a:rPr lang="en-US" sz="4000" dirty="0" smtClean="0"/>
+              <a:t> a measure of effort.</a:t>
+            </a:r>
+          </a:p>
+          <a:p>
+            <a:pPr algn="ctr">
+              <a:buNone/>
+            </a:pPr>
+            <a:endParaRPr lang="en-US" dirty="0" smtClean="0"/>
+          </a:p>
+          <a:p>
             <a:pPr>
               <a:buNone/>
             </a:pPr>
             <a:r>
               <a:rPr lang="en-US" dirty="0" smtClean="0"/>
-              <a:t>Manager: “Now how long will it take to do Z?”</a:t>
+              <a:t>Manager: “How long will this take?”</a:t>
             </a:r>
           </a:p>
           <a:p>
@@ -5386,41 +6027,14 @@
             </a:pPr>
             <a:r>
               <a:rPr lang="en-US" dirty="0" smtClean="0"/>
-              <a:t>Engineer: “Well, I haven’t even done B yet, so I don’t have any way to know!”</a:t>
-            </a:r>
-          </a:p>
-          <a:p>
-            <a:pPr>
-              <a:buNone/>
-            </a:pPr>
-            <a:r>
-              <a:rPr lang="en-US" dirty="0" smtClean="0"/>
-              <a:t>Manager: “How long for B?”</a:t>
-            </a:r>
-          </a:p>
-          <a:p>
-            <a:pPr>
-              <a:buNone/>
-            </a:pPr>
-            <a:r>
-              <a:rPr lang="en-US" dirty="0" smtClean="0"/>
-              <a:t>Engineer: “About a week.”</a:t>
-            </a:r>
-          </a:p>
-          <a:p>
-            <a:pPr>
+              <a:t>Engineer: “Do you mean if I worked full time on JUST THIS, or with my other work?”</a:t>
+            </a:r>
+          </a:p>
+          <a:p>
+            <a:pPr algn="ctr">
               <a:buNone/>
             </a:pPr>
             <a:endParaRPr lang="en-US" dirty="0" smtClean="0"/>
-          </a:p>
-          <a:p>
-            <a:pPr algn="ctr">
-              <a:buNone/>
-            </a:pPr>
-            <a:r>
-              <a:rPr lang="en-US" dirty="0" smtClean="0"/>
-              <a:t>It is easier to estimate in the near future.</a:t>
-            </a:r>
           </a:p>
         </p:txBody>
       </p:sp>
@@ -5435,8 +6049,8 @@
 </p:sld>
 </file>
 
-<file path=ppt/slides/slide8.xml><?xml version="1.0" encoding="utf-8"?>
-<p:sld xmlns:a="http://schemas.openxmlformats.org/drawingml/2006/main" xmlns:r="http://schemas.openxmlformats.org/officeDocument/2006/relationships" xmlns:p="http://schemas.openxmlformats.org/presentationml/2006/main">
+<file path=ppt/slides/slide6.xml><?xml version="1.0" encoding="utf-8"?>
+<p:sld xmlns:a="http://schemas.openxmlformats.org/drawingml/2006/main" xmlns:r="http://schemas.openxmlformats.org/officeDocument/2006/relationships" xmlns:mc="http://schemas.openxmlformats.org/markup-compatibility/2006" xmlns:mv="urn:schemas-microsoft-com:mac:vml" xmlns:p="http://schemas.openxmlformats.org/presentationml/2006/main" mc:Ignorable="mv" mc:PreserveAttributes="mv:*">
   <p:cSld>
     <p:spTree>
       <p:nvGrpSpPr>
@@ -5454,6 +6068,34 @@
       </p:grpSpPr>
       <p:sp>
         <p:nvSpPr>
+          <p:cNvPr id="2" name="Title 1"/>
+          <p:cNvSpPr>
+            <a:spLocks noGrp="1"/>
+          </p:cNvSpPr>
+          <p:nvPr>
+            <p:ph type="title"/>
+          </p:nvPr>
+        </p:nvSpPr>
+        <p:spPr>
+          <a:xfrm>
+            <a:off x="508000" y="609600"/>
+            <a:ext cx="9144000" cy="1016000"/>
+          </a:xfrm>
+        </p:spPr>
+        <p:txBody>
+          <a:bodyPr/>
+          <a:lstStyle/>
+          <a:p>
+            <a:r>
+              <a:rPr lang="en-US" dirty="0" smtClean="0"/>
+              <a:t>Common Problems with Estimation</a:t>
+            </a:r>
+            <a:endParaRPr lang="en-US" dirty="0"/>
+          </a:p>
+        </p:txBody>
+      </p:sp>
+      <p:sp>
+        <p:nvSpPr>
           <p:cNvPr id="3" name="Content Placeholder 2"/>
           <p:cNvSpPr>
             <a:spLocks noGrp="1"/>
@@ -5464,7 +6106,7 @@
         </p:nvSpPr>
         <p:spPr/>
         <p:txBody>
-          <a:bodyPr anchor="ctr">
+          <a:bodyPr>
             <a:normAutofit/>
           </a:bodyPr>
           <a:lstStyle/>
@@ -5474,32 +6116,62 @@
             </a:pPr>
             <a:r>
               <a:rPr lang="en-US" sz="4000" dirty="0" smtClean="0"/>
-              <a:t>Agile estimation avoids</a:t>
-            </a:r>
-            <a:r>
-              <a:rPr lang="en-US" dirty="0" smtClean="0"/>
-              <a:t> </a:t>
+              <a:t>One’s </a:t>
+            </a:r>
+            <a:r>
+              <a:rPr lang="en-US" sz="4000" i="1" dirty="0" smtClean="0"/>
+              <a:t>mountain </a:t>
             </a:r>
             <a:r>
               <a:rPr lang="en-US" sz="4000" dirty="0" smtClean="0"/>
-              <a:t>these common problems </a:t>
-            </a:r>
-            <a:r>
-              <a:rPr lang="en-US" sz="3200" dirty="0" smtClean="0"/>
-              <a:t>(and more) </a:t>
+              <a:t>is another’s </a:t>
+            </a:r>
+            <a:r>
+              <a:rPr lang="en-US" sz="4000" i="1" dirty="0" smtClean="0"/>
+              <a:t>molehill</a:t>
             </a:r>
             <a:r>
               <a:rPr lang="en-US" sz="4000" dirty="0" smtClean="0"/>
-              <a:t>by taking a more </a:t>
-            </a:r>
-            <a:r>
-              <a:rPr lang="en-US" sz="4000" i="1" dirty="0" smtClean="0"/>
-              <a:t>practical approach </a:t>
-            </a:r>
-            <a:r>
-              <a:rPr lang="en-US" sz="4000" dirty="0" smtClean="0"/>
-              <a:t>to estimating work.</a:t>
-            </a:r>
+              <a:t>.</a:t>
+            </a:r>
+          </a:p>
+          <a:p>
+            <a:pPr>
+              <a:buNone/>
+            </a:pPr>
+            <a:endParaRPr lang="en-US" dirty="0" smtClean="0"/>
+          </a:p>
+          <a:p>
+            <a:pPr>
+              <a:buNone/>
+            </a:pPr>
+            <a:r>
+              <a:rPr lang="en-US" dirty="0" smtClean="0"/>
+              <a:t>Manager: “Joe said it would take three weeks.”</a:t>
+            </a:r>
+          </a:p>
+          <a:p>
+            <a:pPr>
+              <a:buNone/>
+            </a:pPr>
+            <a:r>
+              <a:rPr lang="en-US" dirty="0" smtClean="0"/>
+              <a:t>Engineer: “What!? He’s wrong, the </a:t>
+            </a:r>
+            <a:r>
+              <a:rPr lang="en-US" dirty="0" err="1" smtClean="0"/>
+              <a:t>MountainCrusher</a:t>
+            </a:r>
+            <a:r>
+              <a:rPr lang="en-US" dirty="0" smtClean="0"/>
+              <a:t> library already does that, and I have a copy right here.”</a:t>
+            </a:r>
+          </a:p>
+          <a:p>
+            <a:pPr algn="ctr">
+              <a:buNone/>
+            </a:pPr>
+            <a:endParaRPr lang="en-US" dirty="0" smtClean="0"/>
           </a:p>
         </p:txBody>
       </p:sp>
@@ -5514,8 +6186,8 @@
 </p:sld>
 </file>
 
-<file path=ppt/slides/slide9.xml><?xml version="1.0" encoding="utf-8"?>
-<p:sld xmlns:a="http://schemas.openxmlformats.org/drawingml/2006/main" xmlns:r="http://schemas.openxmlformats.org/officeDocument/2006/relationships" xmlns:p="http://schemas.openxmlformats.org/presentationml/2006/main">
+<file path=ppt/slides/slide7.xml><?xml version="1.0" encoding="utf-8"?>
+<p:sld xmlns:a="http://schemas.openxmlformats.org/drawingml/2006/main" xmlns:r="http://schemas.openxmlformats.org/officeDocument/2006/relationships" xmlns:mc="http://schemas.openxmlformats.org/markup-compatibility/2006" xmlns:mv="urn:schemas-microsoft-com:mac:vml" xmlns:p="http://schemas.openxmlformats.org/presentationml/2006/main" mc:Ignorable="mv" mc:PreserveAttributes="mv:*">
   <p:cSld>
     <p:spTree>
       <p:nvGrpSpPr>
@@ -5553,7 +6225,7 @@
           <a:p>
             <a:r>
               <a:rPr lang="en-US" dirty="0" smtClean="0"/>
-              <a:t>How to Estimate</a:t>
+              <a:t>Common Problems with Estimation</a:t>
             </a:r>
             <a:endParaRPr lang="en-US" dirty="0"/>
           </a:p>
@@ -5570,83 +6242,281 @@
           </p:nvPr>
         </p:nvSpPr>
         <p:spPr/>
+        <p:txBody>
+          <a:bodyPr>
+            <a:normAutofit/>
+          </a:bodyPr>
+          <a:lstStyle/>
+          <a:p>
+            <a:pPr algn="ctr">
+              <a:buNone/>
+            </a:pPr>
+            <a:r>
+              <a:rPr lang="en-US" sz="4000" dirty="0" smtClean="0"/>
+              <a:t>Estimates have a </a:t>
+            </a:r>
+            <a:r>
+              <a:rPr lang="en-US" sz="4000" i="1" dirty="0" smtClean="0"/>
+              <a:t>short shelf-life</a:t>
+            </a:r>
+            <a:r>
+              <a:rPr lang="en-US" sz="4000" dirty="0" smtClean="0"/>
+              <a:t>.</a:t>
+            </a:r>
+          </a:p>
+          <a:p>
+            <a:pPr algn="ctr">
+              <a:buNone/>
+            </a:pPr>
+            <a:endParaRPr lang="en-US" dirty="0" smtClean="0"/>
+          </a:p>
+          <a:p>
+            <a:pPr>
+              <a:buNone/>
+            </a:pPr>
+            <a:r>
+              <a:rPr lang="en-US" dirty="0" smtClean="0"/>
+              <a:t>Manager: “Why is this taking so long!?  You said this would only be two days!”</a:t>
+            </a:r>
+          </a:p>
+          <a:p>
+            <a:pPr>
+              <a:buNone/>
+            </a:pPr>
+            <a:r>
+              <a:rPr lang="en-US" dirty="0" smtClean="0"/>
+              <a:t>Engineer: “But I said that 4 months ago!  The current system architecture makes this feature much harder to build.”</a:t>
+            </a:r>
+          </a:p>
+          <a:p>
+            <a:pPr>
+              <a:buNone/>
+            </a:pPr>
+            <a:endParaRPr lang="en-US" dirty="0" smtClean="0"/>
+          </a:p>
+          <a:p>
+            <a:pPr algn="ctr">
+              <a:buNone/>
+            </a:pPr>
+            <a:endParaRPr lang="en-US" dirty="0" smtClean="0"/>
+          </a:p>
+        </p:txBody>
+      </p:sp>
+    </p:spTree>
+  </p:cSld>
+  <p:clrMapOvr>
+    <a:masterClrMapping/>
+  </p:clrMapOvr>
+  <p:transition>
+    <p:fade/>
+  </p:transition>
+</p:sld>
+</file>
+
+<file path=ppt/slides/slide8.xml><?xml version="1.0" encoding="utf-8"?>
+<p:sld xmlns:a="http://schemas.openxmlformats.org/drawingml/2006/main" xmlns:r="http://schemas.openxmlformats.org/officeDocument/2006/relationships" xmlns:mc="http://schemas.openxmlformats.org/markup-compatibility/2006" xmlns:mv="urn:schemas-microsoft-com:mac:vml" xmlns:p="http://schemas.openxmlformats.org/presentationml/2006/main" mc:Ignorable="mv" mc:PreserveAttributes="mv:*">
+  <p:cSld>
+    <p:spTree>
+      <p:nvGrpSpPr>
+        <p:cNvPr id="1" name=""/>
+        <p:cNvGrpSpPr/>
+        <p:nvPr/>
+      </p:nvGrpSpPr>
+      <p:grpSpPr>
+        <a:xfrm>
+          <a:off x="0" y="0"/>
+          <a:ext cx="0" cy="0"/>
+          <a:chOff x="0" y="0"/>
+          <a:chExt cx="0" cy="0"/>
+        </a:xfrm>
+      </p:grpSpPr>
+      <p:sp>
+        <p:nvSpPr>
+          <p:cNvPr id="2" name="Title 1"/>
+          <p:cNvSpPr>
+            <a:spLocks noGrp="1"/>
+          </p:cNvSpPr>
+          <p:nvPr>
+            <p:ph type="title"/>
+          </p:nvPr>
+        </p:nvSpPr>
+        <p:spPr>
+          <a:xfrm>
+            <a:off x="508000" y="609600"/>
+            <a:ext cx="9144000" cy="1016000"/>
+          </a:xfrm>
+        </p:spPr>
         <p:txBody>
           <a:bodyPr/>
           <a:lstStyle/>
           <a:p>
-            <a:pPr marL="742950" indent="-742950">
-              <a:buFont typeface="+mj-lt"/>
-              <a:buAutoNum type="arabicPeriod"/>
-            </a:pPr>
-            <a:r>
-              <a:rPr lang="en-US" dirty="0" smtClean="0"/>
-              <a:t>Define your work </a:t>
-            </a:r>
-            <a:r>
-              <a:rPr lang="en-US" sz="2400" dirty="0" smtClean="0"/>
-              <a:t>(User Story Modeling)</a:t>
-            </a:r>
-            <a:endParaRPr lang="en-US" sz="2800" dirty="0" smtClean="0"/>
-          </a:p>
-          <a:p>
-            <a:pPr marL="742950" indent="-742950">
-              <a:buFont typeface="+mj-lt"/>
-              <a:buAutoNum type="arabicPeriod"/>
-            </a:pPr>
-            <a:r>
-              <a:rPr lang="en-US" dirty="0" smtClean="0"/>
-              <a:t>Collaborate and compare to increase accuracy </a:t>
-            </a:r>
-            <a:r>
-              <a:rPr lang="en-US" sz="2400" dirty="0" smtClean="0"/>
-              <a:t>(Planning Poker, Relative Sizing)</a:t>
-            </a:r>
+            <a:r>
+              <a:rPr lang="en-US" dirty="0" smtClean="0"/>
+              <a:t>Common Problems with Estimation</a:t>
+            </a:r>
+            <a:endParaRPr lang="en-US" dirty="0"/>
+          </a:p>
+        </p:txBody>
+      </p:sp>
+      <p:sp>
+        <p:nvSpPr>
+          <p:cNvPr id="3" name="Content Placeholder 2"/>
+          <p:cNvSpPr>
+            <a:spLocks noGrp="1"/>
+          </p:cNvSpPr>
+          <p:nvPr>
+            <p:ph idx="1"/>
+          </p:nvPr>
+        </p:nvSpPr>
+        <p:spPr/>
+        <p:txBody>
+          <a:bodyPr>
+            <a:normAutofit/>
+          </a:bodyPr>
+          <a:lstStyle/>
+          <a:p>
+            <a:pPr algn="ctr">
+              <a:buNone/>
+            </a:pPr>
+            <a:r>
+              <a:rPr lang="en-US" sz="4000" dirty="0" smtClean="0"/>
+              <a:t>It is easier to estimate the </a:t>
+            </a:r>
+            <a:r>
+              <a:rPr lang="en-US" sz="4000" i="1" dirty="0" smtClean="0"/>
+              <a:t>near </a:t>
+            </a:r>
+            <a:r>
+              <a:rPr lang="en-US" sz="4000" dirty="0" smtClean="0"/>
+              <a:t>future.</a:t>
+            </a:r>
+          </a:p>
+          <a:p>
+            <a:pPr algn="ctr">
+              <a:buNone/>
+            </a:pPr>
             <a:endParaRPr lang="en-US" dirty="0" smtClean="0"/>
           </a:p>
           <a:p>
-            <a:pPr marL="742950" indent="-742950">
-              <a:buFont typeface="+mj-lt"/>
-              <a:buAutoNum type="arabicPeriod"/>
-            </a:pPr>
-            <a:r>
-              <a:rPr lang="en-US" dirty="0" smtClean="0"/>
-              <a:t>Use a unit of work, not time </a:t>
-            </a:r>
-            <a:r>
-              <a:rPr lang="en-US" sz="2400" dirty="0" smtClean="0"/>
-              <a:t>(Story Points)</a:t>
-            </a:r>
+            <a:pPr>
+              <a:buNone/>
+            </a:pPr>
+            <a:r>
+              <a:rPr lang="en-US" dirty="0" smtClean="0"/>
+              <a:t>Manager: “How long will it take to do Z?”</a:t>
+            </a:r>
+          </a:p>
+          <a:p>
+            <a:pPr>
+              <a:buNone/>
+            </a:pPr>
+            <a:r>
+              <a:rPr lang="en-US" dirty="0" smtClean="0"/>
+              <a:t>Engineer: “I haven’t even done B yet!”</a:t>
+            </a:r>
+          </a:p>
+          <a:p>
+            <a:pPr>
+              <a:buNone/>
+            </a:pPr>
+            <a:r>
+              <a:rPr lang="en-US" dirty="0" smtClean="0"/>
+              <a:t>Manager: “How long for B?”</a:t>
+            </a:r>
+          </a:p>
+          <a:p>
+            <a:pPr>
+              <a:buNone/>
+            </a:pPr>
+            <a:r>
+              <a:rPr lang="en-US" dirty="0" smtClean="0"/>
+              <a:t>Engineer: “Hmm… Maybe a week or so.”</a:t>
+            </a:r>
+          </a:p>
+          <a:p>
+            <a:pPr>
+              <a:buNone/>
+            </a:pPr>
             <a:endParaRPr lang="en-US" dirty="0" smtClean="0"/>
           </a:p>
-          <a:p>
-            <a:pPr marL="742950" indent="-742950">
-              <a:buFont typeface="+mj-lt"/>
-              <a:buAutoNum type="arabicPeriod"/>
-            </a:pPr>
-            <a:r>
-              <a:rPr lang="en-US" dirty="0" smtClean="0"/>
-              <a:t>Measure real progress </a:t>
-            </a:r>
-            <a:r>
-              <a:rPr lang="en-US" sz="2400" dirty="0" smtClean="0"/>
-              <a:t>(Velocity)</a:t>
-            </a:r>
-            <a:endParaRPr lang="en-US" dirty="0" smtClean="0"/>
-          </a:p>
-          <a:p>
-            <a:pPr marL="742950" indent="-742950">
-              <a:buFont typeface="+mj-lt"/>
-              <a:buAutoNum type="arabicPeriod"/>
-            </a:pPr>
-            <a:r>
-              <a:rPr lang="en-US" dirty="0" smtClean="0"/>
-              <a:t>Adapt to change </a:t>
-            </a:r>
-            <a:r>
-              <a:rPr lang="en-US" sz="2400" dirty="0" smtClean="0"/>
-              <a:t>(Re-estimation)</a:t>
-            </a:r>
-            <a:endParaRPr lang="en-US" dirty="0"/>
+        </p:txBody>
+      </p:sp>
+    </p:spTree>
+  </p:cSld>
+  <p:clrMapOvr>
+    <a:masterClrMapping/>
+  </p:clrMapOvr>
+  <p:transition>
+    <p:fade/>
+  </p:transition>
+</p:sld>
+</file>
+
+<file path=ppt/slides/slide9.xml><?xml version="1.0" encoding="utf-8"?>
+<p:sld xmlns:a="http://schemas.openxmlformats.org/drawingml/2006/main" xmlns:r="http://schemas.openxmlformats.org/officeDocument/2006/relationships" xmlns:mc="http://schemas.openxmlformats.org/markup-compatibility/2006" xmlns:mv="urn:schemas-microsoft-com:mac:vml" xmlns:p="http://schemas.openxmlformats.org/presentationml/2006/main" mc:Ignorable="mv" mc:PreserveAttributes="mv:*">
+  <p:cSld>
+    <p:spTree>
+      <p:nvGrpSpPr>
+        <p:cNvPr id="1" name=""/>
+        <p:cNvGrpSpPr/>
+        <p:nvPr/>
+      </p:nvGrpSpPr>
+      <p:grpSpPr>
+        <a:xfrm>
+          <a:off x="0" y="0"/>
+          <a:ext cx="0" cy="0"/>
+          <a:chOff x="0" y="0"/>
+          <a:chExt cx="0" cy="0"/>
+        </a:xfrm>
+      </p:grpSpPr>
+      <p:sp>
+        <p:nvSpPr>
+          <p:cNvPr id="3" name="Content Placeholder 2"/>
+          <p:cNvSpPr>
+            <a:spLocks noGrp="1"/>
+          </p:cNvSpPr>
+          <p:nvPr>
+            <p:ph idx="1"/>
+          </p:nvPr>
+        </p:nvSpPr>
+        <p:spPr/>
+        <p:txBody>
+          <a:bodyPr anchor="ctr">
+            <a:normAutofit/>
+          </a:bodyPr>
+          <a:lstStyle/>
+          <a:p>
+            <a:pPr algn="ctr">
+              <a:buNone/>
+            </a:pPr>
+            <a:r>
+              <a:rPr lang="en-US" sz="4000" dirty="0" smtClean="0"/>
+              <a:t>Agile estimation avoids</a:t>
+            </a:r>
+            <a:r>
+              <a:rPr lang="en-US" dirty="0" smtClean="0"/>
+              <a:t> </a:t>
+            </a:r>
+            <a:r>
+              <a:rPr lang="en-US" sz="4000" dirty="0" smtClean="0"/>
+              <a:t>these common problems </a:t>
+            </a:r>
+            <a:r>
+              <a:rPr lang="en-US" sz="3200" dirty="0" smtClean="0"/>
+              <a:t>(and more) </a:t>
+            </a:r>
+            <a:r>
+              <a:rPr lang="en-US" sz="4000" dirty="0" smtClean="0"/>
+              <a:t>by taking a more </a:t>
+            </a:r>
+            <a:r>
+              <a:rPr lang="en-US" sz="4000" i="1" dirty="0" smtClean="0"/>
+              <a:t>practical approach </a:t>
+            </a:r>
+            <a:r>
+              <a:rPr lang="en-US" sz="4000" dirty="0" smtClean="0"/>
+              <a:t>to estimating work.</a:t>
+            </a:r>
           </a:p>
         </p:txBody>
       </p:sp>

</xml_diff>

<commit_message>
Updated estimation deck with notes and some time checks after practicing presentation.
</commit_message>
<xml_diff>
--- a/Agile Firestarter Autumn 2010 Agile Estimation.pptx
+++ b/Agile Firestarter Autumn 2010 Agile Estimation.pptx
@@ -488,7 +488,7 @@
     </p:spTree>
     <p:extLst>
       <p:ext uri="{BB962C8B-B14F-4D97-AF65-F5344CB8AC3E}">
-        <p14:creationId xmlns="" xmlns:a="http://schemas.openxmlformats.org/drawingml/2006/main" xmlns:r="http://schemas.openxmlformats.org/officeDocument/2006/relationships" xmlns:p="http://schemas.openxmlformats.org/presentationml/2006/main" xmlns:p14="http://schemas.microsoft.com/office/powerpoint/2010/main" xmlns:mv="urn:schemas-microsoft-com:mac:vml" xmlns:mc="http://schemas.openxmlformats.org/markup-compatibility/2006" val="2551398053"/>
+        <p14:creationId xmlns:mc="http://schemas.openxmlformats.org/markup-compatibility/2006" xmlns:mv="urn:schemas-microsoft-com:mac:vml" xmlns:p14="http://schemas.microsoft.com/office/powerpoint/2010/main" xmlns:p="http://schemas.openxmlformats.org/presentationml/2006/main" xmlns:r="http://schemas.openxmlformats.org/officeDocument/2006/relationships" xmlns:a="http://schemas.openxmlformats.org/drawingml/2006/main" xmlns="" val="2551398053"/>
       </p:ext>
     </p:extLst>
   </p:cSld>
@@ -666,11 +666,475 @@
           <a:p>
             <a:r>
               <a:rPr lang="en-US" dirty="0" smtClean="0"/>
+              <a:t>Introduce yourself.</a:t>
+            </a:r>
+            <a:endParaRPr lang="en-US" dirty="0"/>
+          </a:p>
+        </p:txBody>
+      </p:sp>
+      <p:sp>
+        <p:nvSpPr>
+          <p:cNvPr id="4" name="Slide Number Placeholder 3"/>
+          <p:cNvSpPr>
+            <a:spLocks noGrp="1"/>
+          </p:cNvSpPr>
+          <p:nvPr>
+            <p:ph type="sldNum" sz="quarter" idx="10"/>
+          </p:nvPr>
+        </p:nvSpPr>
+        <p:spPr/>
+        <p:txBody>
+          <a:bodyPr/>
+          <a:lstStyle/>
+          <a:p>
+            <a:pPr>
+              <a:defRPr/>
+            </a:pPr>
+            <a:fld id="{5A54C694-995F-4285-BB19-700A08DB7AB0}" type="slidenum">
+              <a:rPr lang="en-US" smtClean="0"/>
+              <a:pPr>
+                <a:defRPr/>
+              </a:pPr>
+              <a:t>1</a:t>
+            </a:fld>
+            <a:endParaRPr lang="en-US"/>
+          </a:p>
+        </p:txBody>
+      </p:sp>
+    </p:spTree>
+  </p:cSld>
+  <p:clrMapOvr>
+    <a:masterClrMapping/>
+  </p:clrMapOvr>
+</p:notes>
+</file>
+
+<file path=ppt/notesSlides/notesSlide10.xml><?xml version="1.0" encoding="utf-8"?>
+<p:notes xmlns:a="http://schemas.openxmlformats.org/drawingml/2006/main" xmlns:r="http://schemas.openxmlformats.org/officeDocument/2006/relationships" xmlns:mc="http://schemas.openxmlformats.org/markup-compatibility/2006" xmlns:mv="urn:schemas-microsoft-com:mac:vml" xmlns:p="http://schemas.openxmlformats.org/presentationml/2006/main" mc:Ignorable="mv" mc:PreserveAttributes="mv:*">
+  <p:cSld>
+    <p:spTree>
+      <p:nvGrpSpPr>
+        <p:cNvPr id="1" name=""/>
+        <p:cNvGrpSpPr/>
+        <p:nvPr/>
+      </p:nvGrpSpPr>
+      <p:grpSpPr>
+        <a:xfrm>
+          <a:off x="0" y="0"/>
+          <a:ext cx="0" cy="0"/>
+          <a:chOff x="0" y="0"/>
+          <a:chExt cx="0" cy="0"/>
+        </a:xfrm>
+      </p:grpSpPr>
+      <p:sp>
+        <p:nvSpPr>
+          <p:cNvPr id="2" name="Slide Image Placeholder 1"/>
+          <p:cNvSpPr>
+            <a:spLocks noGrp="1" noRot="1" noChangeAspect="1"/>
+          </p:cNvSpPr>
+          <p:nvPr>
+            <p:ph type="sldImg"/>
+          </p:nvPr>
+        </p:nvSpPr>
+        <p:spPr/>
+      </p:sp>
+      <p:sp>
+        <p:nvSpPr>
+          <p:cNvPr id="3" name="Notes Placeholder 2"/>
+          <p:cNvSpPr>
+            <a:spLocks noGrp="1"/>
+          </p:cNvSpPr>
+          <p:nvPr>
+            <p:ph type="body" idx="1"/>
+          </p:nvPr>
+        </p:nvSpPr>
+        <p:spPr/>
+        <p:txBody>
+          <a:bodyPr>
+            <a:normAutofit/>
+          </a:bodyPr>
+          <a:lstStyle/>
+          <a:p>
+            <a:r>
+              <a:rPr lang="en-US" dirty="0" smtClean="0"/>
+              <a:t>I’ll present some</a:t>
+            </a:r>
+            <a:r>
+              <a:rPr lang="en-US" baseline="0" dirty="0" smtClean="0"/>
+              <a:t> best practices for following this process.</a:t>
+            </a:r>
+          </a:p>
+          <a:p>
+            <a:r>
+              <a:rPr lang="en-US" baseline="0" dirty="0" smtClean="0"/>
+              <a:t>Time: 0:08</a:t>
+            </a:r>
+          </a:p>
+        </p:txBody>
+      </p:sp>
+      <p:sp>
+        <p:nvSpPr>
+          <p:cNvPr id="4" name="Slide Number Placeholder 3"/>
+          <p:cNvSpPr>
+            <a:spLocks noGrp="1"/>
+          </p:cNvSpPr>
+          <p:nvPr>
+            <p:ph type="sldNum" sz="quarter" idx="10"/>
+          </p:nvPr>
+        </p:nvSpPr>
+        <p:spPr/>
+        <p:txBody>
+          <a:bodyPr/>
+          <a:lstStyle/>
+          <a:p>
+            <a:pPr>
+              <a:defRPr/>
+            </a:pPr>
+            <a:fld id="{5A54C694-995F-4285-BB19-700A08DB7AB0}" type="slidenum">
+              <a:rPr lang="en-US" smtClean="0"/>
+              <a:pPr>
+                <a:defRPr/>
+              </a:pPr>
+              <a:t>10</a:t>
+            </a:fld>
+            <a:endParaRPr lang="en-US"/>
+          </a:p>
+        </p:txBody>
+      </p:sp>
+    </p:spTree>
+  </p:cSld>
+  <p:clrMapOvr>
+    <a:masterClrMapping/>
+  </p:clrMapOvr>
+</p:notes>
+</file>
+
+<file path=ppt/notesSlides/notesSlide11.xml><?xml version="1.0" encoding="utf-8"?>
+<p:notes xmlns:a="http://schemas.openxmlformats.org/drawingml/2006/main" xmlns:r="http://schemas.openxmlformats.org/officeDocument/2006/relationships" xmlns:mc="http://schemas.openxmlformats.org/markup-compatibility/2006" xmlns:mv="urn:schemas-microsoft-com:mac:vml" xmlns:p="http://schemas.openxmlformats.org/presentationml/2006/main" mc:Ignorable="mv" mc:PreserveAttributes="mv:*">
+  <p:cSld>
+    <p:spTree>
+      <p:nvGrpSpPr>
+        <p:cNvPr id="1" name=""/>
+        <p:cNvGrpSpPr/>
+        <p:nvPr/>
+      </p:nvGrpSpPr>
+      <p:grpSpPr>
+        <a:xfrm>
+          <a:off x="0" y="0"/>
+          <a:ext cx="0" cy="0"/>
+          <a:chOff x="0" y="0"/>
+          <a:chExt cx="0" cy="0"/>
+        </a:xfrm>
+      </p:grpSpPr>
+      <p:sp>
+        <p:nvSpPr>
+          <p:cNvPr id="2" name="Slide Image Placeholder 1"/>
+          <p:cNvSpPr>
+            <a:spLocks noGrp="1" noRot="1" noChangeAspect="1"/>
+          </p:cNvSpPr>
+          <p:nvPr>
+            <p:ph type="sldImg"/>
+          </p:nvPr>
+        </p:nvSpPr>
+        <p:spPr/>
+      </p:sp>
+      <p:sp>
+        <p:nvSpPr>
+          <p:cNvPr id="3" name="Notes Placeholder 2"/>
+          <p:cNvSpPr>
+            <a:spLocks noGrp="1"/>
+          </p:cNvSpPr>
+          <p:nvPr>
+            <p:ph type="body" idx="1"/>
+          </p:nvPr>
+        </p:nvSpPr>
+        <p:spPr/>
+        <p:txBody>
+          <a:bodyPr>
+            <a:normAutofit/>
+          </a:bodyPr>
+          <a:lstStyle/>
+          <a:p>
+            <a:r>
+              <a:rPr lang="en-US" baseline="0" dirty="0" smtClean="0"/>
+              <a:t>Who – Who will benefit from the feature</a:t>
+            </a:r>
+          </a:p>
+          <a:p>
+            <a:r>
+              <a:rPr lang="en-US" baseline="0" dirty="0" smtClean="0"/>
+              <a:t>What – What is the feature</a:t>
+            </a:r>
+          </a:p>
+          <a:p>
+            <a:r>
+              <a:rPr lang="en-US" baseline="0" dirty="0" smtClean="0"/>
+              <a:t>*Why – Why is most important to help empower engineers to make value decisions based on an understanding of the motivation behind the story.</a:t>
+            </a:r>
+            <a:endParaRPr lang="en-US" dirty="0"/>
+          </a:p>
+        </p:txBody>
+      </p:sp>
+      <p:sp>
+        <p:nvSpPr>
+          <p:cNvPr id="4" name="Slide Number Placeholder 3"/>
+          <p:cNvSpPr>
+            <a:spLocks noGrp="1"/>
+          </p:cNvSpPr>
+          <p:nvPr>
+            <p:ph type="sldNum" sz="quarter" idx="10"/>
+          </p:nvPr>
+        </p:nvSpPr>
+        <p:spPr/>
+        <p:txBody>
+          <a:bodyPr/>
+          <a:lstStyle/>
+          <a:p>
+            <a:pPr>
+              <a:defRPr/>
+            </a:pPr>
+            <a:fld id="{5A54C694-995F-4285-BB19-700A08DB7AB0}" type="slidenum">
+              <a:rPr lang="en-US" smtClean="0"/>
+              <a:pPr>
+                <a:defRPr/>
+              </a:pPr>
+              <a:t>11</a:t>
+            </a:fld>
+            <a:endParaRPr lang="en-US"/>
+          </a:p>
+        </p:txBody>
+      </p:sp>
+    </p:spTree>
+  </p:cSld>
+  <p:clrMapOvr>
+    <a:masterClrMapping/>
+  </p:clrMapOvr>
+</p:notes>
+</file>
+
+<file path=ppt/notesSlides/notesSlide12.xml><?xml version="1.0" encoding="utf-8"?>
+<p:notes xmlns:a="http://schemas.openxmlformats.org/drawingml/2006/main" xmlns:r="http://schemas.openxmlformats.org/officeDocument/2006/relationships" xmlns:mc="http://schemas.openxmlformats.org/markup-compatibility/2006" xmlns:mv="urn:schemas-microsoft-com:mac:vml" xmlns:p="http://schemas.openxmlformats.org/presentationml/2006/main" mc:Ignorable="mv" mc:PreserveAttributes="mv:*">
+  <p:cSld>
+    <p:spTree>
+      <p:nvGrpSpPr>
+        <p:cNvPr id="1" name=""/>
+        <p:cNvGrpSpPr/>
+        <p:nvPr/>
+      </p:nvGrpSpPr>
+      <p:grpSpPr>
+        <a:xfrm>
+          <a:off x="0" y="0"/>
+          <a:ext cx="0" cy="0"/>
+          <a:chOff x="0" y="0"/>
+          <a:chExt cx="0" cy="0"/>
+        </a:xfrm>
+      </p:grpSpPr>
+      <p:sp>
+        <p:nvSpPr>
+          <p:cNvPr id="2" name="Slide Image Placeholder 1"/>
+          <p:cNvSpPr>
+            <a:spLocks noGrp="1" noRot="1" noChangeAspect="1"/>
+          </p:cNvSpPr>
+          <p:nvPr>
+            <p:ph type="sldImg"/>
+          </p:nvPr>
+        </p:nvSpPr>
+        <p:spPr/>
+      </p:sp>
+      <p:sp>
+        <p:nvSpPr>
+          <p:cNvPr id="3" name="Notes Placeholder 2"/>
+          <p:cNvSpPr>
+            <a:spLocks noGrp="1"/>
+          </p:cNvSpPr>
+          <p:nvPr>
+            <p:ph type="body" idx="1"/>
+          </p:nvPr>
+        </p:nvSpPr>
+        <p:spPr/>
+        <p:txBody>
+          <a:bodyPr>
+            <a:normAutofit/>
+          </a:bodyPr>
+          <a:lstStyle/>
+          <a:p>
+            <a:r>
+              <a:rPr lang="en-US" dirty="0" smtClean="0"/>
+              <a:t>Independent – Can</a:t>
+            </a:r>
+            <a:r>
+              <a:rPr lang="en-US" baseline="0" dirty="0" smtClean="0"/>
+              <a:t> be done in any order without depending on each other.</a:t>
+            </a:r>
+          </a:p>
+          <a:p>
+            <a:r>
+              <a:rPr lang="en-US" baseline="0" dirty="0" smtClean="0"/>
+              <a:t>Negotiable – Leaves some detail up for debate about implementation or approach</a:t>
+            </a:r>
+          </a:p>
+          <a:p>
+            <a:r>
+              <a:rPr lang="en-US" baseline="0" dirty="0" smtClean="0"/>
+              <a:t>Valuable – Offers users real value</a:t>
+            </a:r>
+          </a:p>
+          <a:p>
+            <a:r>
+              <a:rPr lang="en-US" baseline="0" dirty="0" smtClean="0"/>
+              <a:t>Estimable – Has enough information to be able to estimate it</a:t>
+            </a:r>
+          </a:p>
+          <a:p>
+            <a:r>
+              <a:rPr lang="en-US" baseline="0" dirty="0" smtClean="0"/>
+              <a:t>Small – Large pieces of work need to be broken down</a:t>
+            </a:r>
+          </a:p>
+          <a:p>
+            <a:r>
+              <a:rPr lang="en-US" baseline="0" dirty="0" smtClean="0"/>
+              <a:t>Testable – Has well defined criteria for testing that the work is DONE. </a:t>
+            </a:r>
+            <a:endParaRPr lang="en-US" dirty="0" smtClean="0"/>
+          </a:p>
+          <a:p>
+            <a:endParaRPr lang="en-US" baseline="0" dirty="0" smtClean="0"/>
+          </a:p>
+          <a:p>
+            <a:r>
+              <a:rPr lang="en-US" baseline="0" dirty="0" smtClean="0"/>
+              <a:t>Ask what’s wrong with bad ones!</a:t>
+            </a:r>
+            <a:endParaRPr lang="en-US" dirty="0"/>
+          </a:p>
+        </p:txBody>
+      </p:sp>
+      <p:sp>
+        <p:nvSpPr>
+          <p:cNvPr id="4" name="Slide Number Placeholder 3"/>
+          <p:cNvSpPr>
+            <a:spLocks noGrp="1"/>
+          </p:cNvSpPr>
+          <p:nvPr>
+            <p:ph type="sldNum" sz="quarter" idx="10"/>
+          </p:nvPr>
+        </p:nvSpPr>
+        <p:spPr/>
+        <p:txBody>
+          <a:bodyPr/>
+          <a:lstStyle/>
+          <a:p>
+            <a:pPr>
+              <a:defRPr/>
+            </a:pPr>
+            <a:fld id="{5A54C694-995F-4285-BB19-700A08DB7AB0}" type="slidenum">
+              <a:rPr lang="en-US" smtClean="0"/>
+              <a:pPr>
+                <a:defRPr/>
+              </a:pPr>
+              <a:t>12</a:t>
+            </a:fld>
+            <a:endParaRPr lang="en-US"/>
+          </a:p>
+        </p:txBody>
+      </p:sp>
+    </p:spTree>
+  </p:cSld>
+  <p:clrMapOvr>
+    <a:masterClrMapping/>
+  </p:clrMapOvr>
+</p:notes>
+</file>
+
+<file path=ppt/notesSlides/notesSlide13.xml><?xml version="1.0" encoding="utf-8"?>
+<p:notes xmlns:a="http://schemas.openxmlformats.org/drawingml/2006/main" xmlns:r="http://schemas.openxmlformats.org/officeDocument/2006/relationships" xmlns:mc="http://schemas.openxmlformats.org/markup-compatibility/2006" xmlns:mv="urn:schemas-microsoft-com:mac:vml" xmlns:p="http://schemas.openxmlformats.org/presentationml/2006/main" mc:Ignorable="mv" mc:PreserveAttributes="mv:*">
+  <p:cSld>
+    <p:spTree>
+      <p:nvGrpSpPr>
+        <p:cNvPr id="1" name=""/>
+        <p:cNvGrpSpPr/>
+        <p:nvPr/>
+      </p:nvGrpSpPr>
+      <p:grpSpPr>
+        <a:xfrm>
+          <a:off x="0" y="0"/>
+          <a:ext cx="0" cy="0"/>
+          <a:chOff x="0" y="0"/>
+          <a:chExt cx="0" cy="0"/>
+        </a:xfrm>
+      </p:grpSpPr>
+      <p:sp>
+        <p:nvSpPr>
+          <p:cNvPr id="2" name="Slide Image Placeholder 1"/>
+          <p:cNvSpPr>
+            <a:spLocks noGrp="1" noRot="1" noChangeAspect="1"/>
+          </p:cNvSpPr>
+          <p:nvPr>
+            <p:ph type="sldImg"/>
+          </p:nvPr>
+        </p:nvSpPr>
+        <p:spPr/>
+      </p:sp>
+      <p:sp>
+        <p:nvSpPr>
+          <p:cNvPr id="3" name="Notes Placeholder 2"/>
+          <p:cNvSpPr>
+            <a:spLocks noGrp="1"/>
+          </p:cNvSpPr>
+          <p:nvPr>
+            <p:ph type="body" idx="1"/>
+          </p:nvPr>
+        </p:nvSpPr>
+        <p:spPr/>
+        <p:txBody>
+          <a:bodyPr>
+            <a:normAutofit/>
+          </a:bodyPr>
+          <a:lstStyle/>
+          <a:p>
+            <a:r>
+              <a:rPr lang="en-US" baseline="0" dirty="0" smtClean="0"/>
+              <a:t>Only include necessary detail.  </a:t>
+            </a:r>
+            <a:r>
+              <a:rPr lang="en-US" dirty="0" smtClean="0"/>
+              <a:t>AND</a:t>
+            </a:r>
+            <a:r>
+              <a:rPr lang="en-US" baseline="0" dirty="0" smtClean="0"/>
+              <a:t> is also acceptable language.</a:t>
+            </a:r>
+          </a:p>
+          <a:p>
+            <a:r>
+              <a:rPr lang="en-US" baseline="0" dirty="0" smtClean="0"/>
+              <a:t>Key Point: This formatting helps you better define your work and avoid communication problems.</a:t>
+            </a:r>
+            <a:endParaRPr lang="en-US" dirty="0" smtClean="0"/>
+          </a:p>
+          <a:p>
+            <a:r>
+              <a:rPr lang="en-US" dirty="0" smtClean="0"/>
               <a:t>Break</a:t>
             </a:r>
             <a:r>
               <a:rPr lang="en-US" baseline="0" dirty="0" smtClean="0"/>
-              <a:t> for questions about user stories!</a:t>
+              <a:t> </a:t>
+            </a:r>
+            <a:r>
+              <a:rPr lang="en-US" baseline="0" dirty="0" smtClean="0"/>
+              <a:t>for questions about user </a:t>
+            </a:r>
+            <a:r>
+              <a:rPr lang="en-US" baseline="0" dirty="0" smtClean="0"/>
+              <a:t>stories and defining your work!</a:t>
+            </a:r>
+          </a:p>
+          <a:p>
+            <a:r>
+              <a:rPr lang="en-US" baseline="0" dirty="0" smtClean="0"/>
+              <a:t>Time: 0:18</a:t>
             </a:r>
             <a:endParaRPr lang="en-US" dirty="0"/>
           </a:p>
@@ -700,6 +1164,644 @@
                 <a:defRPr/>
               </a:pPr>
               <a:t>13</a:t>
+            </a:fld>
+            <a:endParaRPr lang="en-US"/>
+          </a:p>
+        </p:txBody>
+      </p:sp>
+    </p:spTree>
+  </p:cSld>
+  <p:clrMapOvr>
+    <a:masterClrMapping/>
+  </p:clrMapOvr>
+</p:notes>
+</file>
+
+<file path=ppt/notesSlides/notesSlide14.xml><?xml version="1.0" encoding="utf-8"?>
+<p:notes xmlns:a="http://schemas.openxmlformats.org/drawingml/2006/main" xmlns:r="http://schemas.openxmlformats.org/officeDocument/2006/relationships" xmlns:mc="http://schemas.openxmlformats.org/markup-compatibility/2006" xmlns:mv="urn:schemas-microsoft-com:mac:vml" xmlns:p="http://schemas.openxmlformats.org/presentationml/2006/main" mc:Ignorable="mv" mc:PreserveAttributes="mv:*">
+  <p:cSld>
+    <p:spTree>
+      <p:nvGrpSpPr>
+        <p:cNvPr id="1" name=""/>
+        <p:cNvGrpSpPr/>
+        <p:nvPr/>
+      </p:nvGrpSpPr>
+      <p:grpSpPr>
+        <a:xfrm>
+          <a:off x="0" y="0"/>
+          <a:ext cx="0" cy="0"/>
+          <a:chOff x="0" y="0"/>
+          <a:chExt cx="0" cy="0"/>
+        </a:xfrm>
+      </p:grpSpPr>
+      <p:sp>
+        <p:nvSpPr>
+          <p:cNvPr id="2" name="Slide Image Placeholder 1"/>
+          <p:cNvSpPr>
+            <a:spLocks noGrp="1" noRot="1" noChangeAspect="1"/>
+          </p:cNvSpPr>
+          <p:nvPr>
+            <p:ph type="sldImg"/>
+          </p:nvPr>
+        </p:nvSpPr>
+        <p:spPr/>
+      </p:sp>
+      <p:sp>
+        <p:nvSpPr>
+          <p:cNvPr id="3" name="Notes Placeholder 2"/>
+          <p:cNvSpPr>
+            <a:spLocks noGrp="1"/>
+          </p:cNvSpPr>
+          <p:nvPr>
+            <p:ph type="body" idx="1"/>
+          </p:nvPr>
+        </p:nvSpPr>
+        <p:spPr/>
+        <p:txBody>
+          <a:bodyPr>
+            <a:normAutofit/>
+          </a:bodyPr>
+          <a:lstStyle/>
+          <a:p>
+            <a:r>
+              <a:rPr lang="en-US" dirty="0" smtClean="0"/>
+              <a:t>Some</a:t>
+            </a:r>
+            <a:r>
+              <a:rPr lang="en-US" baseline="0" dirty="0" smtClean="0"/>
+              <a:t> people use Ideal Days – I advise against it because as confusing as a new term is, it’s worse to try to redefine a term people think they already understand.  I promise that if you use Ideal Days, people will think this means one calendar day, and that is INCORRECT.</a:t>
+            </a:r>
+            <a:endParaRPr lang="en-US" dirty="0" smtClean="0"/>
+          </a:p>
+        </p:txBody>
+      </p:sp>
+      <p:sp>
+        <p:nvSpPr>
+          <p:cNvPr id="4" name="Slide Number Placeholder 3"/>
+          <p:cNvSpPr>
+            <a:spLocks noGrp="1"/>
+          </p:cNvSpPr>
+          <p:nvPr>
+            <p:ph type="sldNum" sz="quarter" idx="10"/>
+          </p:nvPr>
+        </p:nvSpPr>
+        <p:spPr/>
+        <p:txBody>
+          <a:bodyPr/>
+          <a:lstStyle/>
+          <a:p>
+            <a:pPr>
+              <a:defRPr/>
+            </a:pPr>
+            <a:fld id="{5A54C694-995F-4285-BB19-700A08DB7AB0}" type="slidenum">
+              <a:rPr lang="en-US" smtClean="0"/>
+              <a:pPr>
+                <a:defRPr/>
+              </a:pPr>
+              <a:t>14</a:t>
+            </a:fld>
+            <a:endParaRPr lang="en-US"/>
+          </a:p>
+        </p:txBody>
+      </p:sp>
+    </p:spTree>
+  </p:cSld>
+  <p:clrMapOvr>
+    <a:masterClrMapping/>
+  </p:clrMapOvr>
+</p:notes>
+</file>
+
+<file path=ppt/notesSlides/notesSlide15.xml><?xml version="1.0" encoding="utf-8"?>
+<p:notes xmlns:a="http://schemas.openxmlformats.org/drawingml/2006/main" xmlns:r="http://schemas.openxmlformats.org/officeDocument/2006/relationships" xmlns:mc="http://schemas.openxmlformats.org/markup-compatibility/2006" xmlns:mv="urn:schemas-microsoft-com:mac:vml" xmlns:p="http://schemas.openxmlformats.org/presentationml/2006/main" mc:Ignorable="mv" mc:PreserveAttributes="mv:*">
+  <p:cSld>
+    <p:spTree>
+      <p:nvGrpSpPr>
+        <p:cNvPr id="1" name=""/>
+        <p:cNvGrpSpPr/>
+        <p:nvPr/>
+      </p:nvGrpSpPr>
+      <p:grpSpPr>
+        <a:xfrm>
+          <a:off x="0" y="0"/>
+          <a:ext cx="0" cy="0"/>
+          <a:chOff x="0" y="0"/>
+          <a:chExt cx="0" cy="0"/>
+        </a:xfrm>
+      </p:grpSpPr>
+      <p:sp>
+        <p:nvSpPr>
+          <p:cNvPr id="2" name="Slide Image Placeholder 1"/>
+          <p:cNvSpPr>
+            <a:spLocks noGrp="1" noRot="1" noChangeAspect="1"/>
+          </p:cNvSpPr>
+          <p:nvPr>
+            <p:ph type="sldImg"/>
+          </p:nvPr>
+        </p:nvSpPr>
+        <p:spPr/>
+      </p:sp>
+      <p:sp>
+        <p:nvSpPr>
+          <p:cNvPr id="3" name="Notes Placeholder 2"/>
+          <p:cNvSpPr>
+            <a:spLocks noGrp="1"/>
+          </p:cNvSpPr>
+          <p:nvPr>
+            <p:ph type="body" idx="1"/>
+          </p:nvPr>
+        </p:nvSpPr>
+        <p:spPr/>
+        <p:txBody>
+          <a:bodyPr>
+            <a:normAutofit/>
+          </a:bodyPr>
+          <a:lstStyle/>
+          <a:p>
+            <a:r>
+              <a:rPr lang="en-US" dirty="0" smtClean="0"/>
+              <a:t>We</a:t>
+            </a:r>
+            <a:r>
+              <a:rPr lang="en-US" baseline="0" dirty="0" smtClean="0"/>
+              <a:t> use nonlinear scale to account for having less detailed information about bigger pieces of work.  These scales lose resolution as they increase and work very well in practice.</a:t>
+            </a:r>
+            <a:endParaRPr lang="en-US" dirty="0"/>
+          </a:p>
+        </p:txBody>
+      </p:sp>
+      <p:sp>
+        <p:nvSpPr>
+          <p:cNvPr id="4" name="Slide Number Placeholder 3"/>
+          <p:cNvSpPr>
+            <a:spLocks noGrp="1"/>
+          </p:cNvSpPr>
+          <p:nvPr>
+            <p:ph type="sldNum" sz="quarter" idx="10"/>
+          </p:nvPr>
+        </p:nvSpPr>
+        <p:spPr/>
+        <p:txBody>
+          <a:bodyPr/>
+          <a:lstStyle/>
+          <a:p>
+            <a:pPr>
+              <a:defRPr/>
+            </a:pPr>
+            <a:fld id="{5A54C694-995F-4285-BB19-700A08DB7AB0}" type="slidenum">
+              <a:rPr lang="en-US" smtClean="0"/>
+              <a:pPr>
+                <a:defRPr/>
+              </a:pPr>
+              <a:t>15</a:t>
+            </a:fld>
+            <a:endParaRPr lang="en-US"/>
+          </a:p>
+        </p:txBody>
+      </p:sp>
+    </p:spTree>
+  </p:cSld>
+  <p:clrMapOvr>
+    <a:masterClrMapping/>
+  </p:clrMapOvr>
+</p:notes>
+</file>
+
+<file path=ppt/notesSlides/notesSlide16.xml><?xml version="1.0" encoding="utf-8"?>
+<p:notes xmlns:a="http://schemas.openxmlformats.org/drawingml/2006/main" xmlns:r="http://schemas.openxmlformats.org/officeDocument/2006/relationships" xmlns:mc="http://schemas.openxmlformats.org/markup-compatibility/2006" xmlns:mv="urn:schemas-microsoft-com:mac:vml" xmlns:p="http://schemas.openxmlformats.org/presentationml/2006/main" mc:Ignorable="mv" mc:PreserveAttributes="mv:*">
+  <p:cSld>
+    <p:spTree>
+      <p:nvGrpSpPr>
+        <p:cNvPr id="1" name=""/>
+        <p:cNvGrpSpPr/>
+        <p:nvPr/>
+      </p:nvGrpSpPr>
+      <p:grpSpPr>
+        <a:xfrm>
+          <a:off x="0" y="0"/>
+          <a:ext cx="0" cy="0"/>
+          <a:chOff x="0" y="0"/>
+          <a:chExt cx="0" cy="0"/>
+        </a:xfrm>
+      </p:grpSpPr>
+      <p:sp>
+        <p:nvSpPr>
+          <p:cNvPr id="2" name="Slide Image Placeholder 1"/>
+          <p:cNvSpPr>
+            <a:spLocks noGrp="1" noRot="1" noChangeAspect="1"/>
+          </p:cNvSpPr>
+          <p:nvPr>
+            <p:ph type="sldImg"/>
+          </p:nvPr>
+        </p:nvSpPr>
+        <p:spPr/>
+      </p:sp>
+      <p:sp>
+        <p:nvSpPr>
+          <p:cNvPr id="3" name="Notes Placeholder 2"/>
+          <p:cNvSpPr>
+            <a:spLocks noGrp="1"/>
+          </p:cNvSpPr>
+          <p:nvPr>
+            <p:ph type="body" idx="1"/>
+          </p:nvPr>
+        </p:nvSpPr>
+        <p:spPr/>
+        <p:txBody>
+          <a:bodyPr>
+            <a:normAutofit/>
+          </a:bodyPr>
+          <a:lstStyle/>
+          <a:p>
+            <a:pPr marL="0" marR="0" indent="0" algn="l" defTabSz="914400" rtl="0" eaLnBrk="0" fontAlgn="base" latinLnBrk="0" hangingPunct="0">
+              <a:lnSpc>
+                <a:spcPct val="100000"/>
+              </a:lnSpc>
+              <a:spcBef>
+                <a:spcPct val="0"/>
+              </a:spcBef>
+              <a:spcAft>
+                <a:spcPct val="0"/>
+              </a:spcAft>
+              <a:buClrTx/>
+              <a:buSzTx/>
+              <a:buFontTx/>
+              <a:buNone/>
+              <a:tabLst/>
+              <a:defRPr/>
+            </a:pPr>
+            <a:r>
+              <a:rPr lang="en-US" dirty="0" smtClean="0"/>
+              <a:t>Break</a:t>
+            </a:r>
+            <a:r>
+              <a:rPr lang="en-US" baseline="0" dirty="0" smtClean="0"/>
+              <a:t> for questions about Planning Poker!</a:t>
+            </a:r>
+            <a:endParaRPr lang="en-US" dirty="0" smtClean="0"/>
+          </a:p>
+          <a:p>
+            <a:r>
+              <a:rPr lang="en-US" dirty="0" smtClean="0"/>
+              <a:t>Time:</a:t>
+            </a:r>
+            <a:r>
+              <a:rPr lang="en-US" baseline="0" dirty="0" smtClean="0"/>
+              <a:t> 0:30</a:t>
+            </a:r>
+            <a:endParaRPr lang="en-US" dirty="0"/>
+          </a:p>
+        </p:txBody>
+      </p:sp>
+      <p:sp>
+        <p:nvSpPr>
+          <p:cNvPr id="4" name="Slide Number Placeholder 3"/>
+          <p:cNvSpPr>
+            <a:spLocks noGrp="1"/>
+          </p:cNvSpPr>
+          <p:nvPr>
+            <p:ph type="sldNum" sz="quarter" idx="10"/>
+          </p:nvPr>
+        </p:nvSpPr>
+        <p:spPr/>
+        <p:txBody>
+          <a:bodyPr/>
+          <a:lstStyle/>
+          <a:p>
+            <a:pPr>
+              <a:defRPr/>
+            </a:pPr>
+            <a:fld id="{5A54C694-995F-4285-BB19-700A08DB7AB0}" type="slidenum">
+              <a:rPr lang="en-US" smtClean="0"/>
+              <a:pPr>
+                <a:defRPr/>
+              </a:pPr>
+              <a:t>16</a:t>
+            </a:fld>
+            <a:endParaRPr lang="en-US"/>
+          </a:p>
+        </p:txBody>
+      </p:sp>
+    </p:spTree>
+  </p:cSld>
+  <p:clrMapOvr>
+    <a:masterClrMapping/>
+  </p:clrMapOvr>
+</p:notes>
+</file>
+
+<file path=ppt/notesSlides/notesSlide17.xml><?xml version="1.0" encoding="utf-8"?>
+<p:notes xmlns:a="http://schemas.openxmlformats.org/drawingml/2006/main" xmlns:r="http://schemas.openxmlformats.org/officeDocument/2006/relationships" xmlns:mc="http://schemas.openxmlformats.org/markup-compatibility/2006" xmlns:mv="urn:schemas-microsoft-com:mac:vml" xmlns:p="http://schemas.openxmlformats.org/presentationml/2006/main" mc:Ignorable="mv" mc:PreserveAttributes="mv:*">
+  <p:cSld>
+    <p:spTree>
+      <p:nvGrpSpPr>
+        <p:cNvPr id="1" name=""/>
+        <p:cNvGrpSpPr/>
+        <p:nvPr/>
+      </p:nvGrpSpPr>
+      <p:grpSpPr>
+        <a:xfrm>
+          <a:off x="0" y="0"/>
+          <a:ext cx="0" cy="0"/>
+          <a:chOff x="0" y="0"/>
+          <a:chExt cx="0" cy="0"/>
+        </a:xfrm>
+      </p:grpSpPr>
+      <p:sp>
+        <p:nvSpPr>
+          <p:cNvPr id="2" name="Slide Image Placeholder 1"/>
+          <p:cNvSpPr>
+            <a:spLocks noGrp="1" noRot="1" noChangeAspect="1"/>
+          </p:cNvSpPr>
+          <p:nvPr>
+            <p:ph type="sldImg"/>
+          </p:nvPr>
+        </p:nvSpPr>
+        <p:spPr/>
+      </p:sp>
+      <p:sp>
+        <p:nvSpPr>
+          <p:cNvPr id="3" name="Notes Placeholder 2"/>
+          <p:cNvSpPr>
+            <a:spLocks noGrp="1"/>
+          </p:cNvSpPr>
+          <p:nvPr>
+            <p:ph type="body" idx="1"/>
+          </p:nvPr>
+        </p:nvSpPr>
+        <p:spPr/>
+        <p:txBody>
+          <a:bodyPr>
+            <a:normAutofit/>
+          </a:bodyPr>
+          <a:lstStyle/>
+          <a:p>
+            <a:r>
+              <a:rPr lang="en-US" dirty="0" smtClean="0"/>
+              <a:t>Can use note cards or a tool like Rally,</a:t>
+            </a:r>
+            <a:r>
+              <a:rPr lang="en-US" baseline="0" dirty="0" smtClean="0"/>
+              <a:t> Mingle, Lighthouse, </a:t>
+            </a:r>
+            <a:r>
+              <a:rPr lang="en-US" baseline="0" dirty="0" err="1" smtClean="0"/>
+              <a:t>FogBugz</a:t>
+            </a:r>
+            <a:r>
+              <a:rPr lang="en-US" baseline="0" dirty="0" smtClean="0"/>
+              <a:t>, </a:t>
+            </a:r>
+            <a:r>
+              <a:rPr lang="en-US" baseline="0" dirty="0" err="1" smtClean="0"/>
+              <a:t>Bugzilla</a:t>
+            </a:r>
+            <a:r>
+              <a:rPr lang="en-US" baseline="0" dirty="0" smtClean="0"/>
+              <a:t> to keep track of your backlog.</a:t>
+            </a:r>
+            <a:endParaRPr lang="en-US" dirty="0"/>
+          </a:p>
+        </p:txBody>
+      </p:sp>
+      <p:sp>
+        <p:nvSpPr>
+          <p:cNvPr id="4" name="Slide Number Placeholder 3"/>
+          <p:cNvSpPr>
+            <a:spLocks noGrp="1"/>
+          </p:cNvSpPr>
+          <p:nvPr>
+            <p:ph type="sldNum" sz="quarter" idx="10"/>
+          </p:nvPr>
+        </p:nvSpPr>
+        <p:spPr/>
+        <p:txBody>
+          <a:bodyPr/>
+          <a:lstStyle/>
+          <a:p>
+            <a:pPr>
+              <a:defRPr/>
+            </a:pPr>
+            <a:fld id="{5A54C694-995F-4285-BB19-700A08DB7AB0}" type="slidenum">
+              <a:rPr lang="en-US" smtClean="0"/>
+              <a:pPr>
+                <a:defRPr/>
+              </a:pPr>
+              <a:t>17</a:t>
+            </a:fld>
+            <a:endParaRPr lang="en-US"/>
+          </a:p>
+        </p:txBody>
+      </p:sp>
+    </p:spTree>
+  </p:cSld>
+  <p:clrMapOvr>
+    <a:masterClrMapping/>
+  </p:clrMapOvr>
+</p:notes>
+</file>
+
+<file path=ppt/notesSlides/notesSlide18.xml><?xml version="1.0" encoding="utf-8"?>
+<p:notes xmlns:a="http://schemas.openxmlformats.org/drawingml/2006/main" xmlns:r="http://schemas.openxmlformats.org/officeDocument/2006/relationships" xmlns:mc="http://schemas.openxmlformats.org/markup-compatibility/2006" xmlns:mv="urn:schemas-microsoft-com:mac:vml" xmlns:p="http://schemas.openxmlformats.org/presentationml/2006/main" mc:Ignorable="mv" mc:PreserveAttributes="mv:*">
+  <p:cSld>
+    <p:spTree>
+      <p:nvGrpSpPr>
+        <p:cNvPr id="1" name=""/>
+        <p:cNvGrpSpPr/>
+        <p:nvPr/>
+      </p:nvGrpSpPr>
+      <p:grpSpPr>
+        <a:xfrm>
+          <a:off x="0" y="0"/>
+          <a:ext cx="0" cy="0"/>
+          <a:chOff x="0" y="0"/>
+          <a:chExt cx="0" cy="0"/>
+        </a:xfrm>
+      </p:grpSpPr>
+      <p:sp>
+        <p:nvSpPr>
+          <p:cNvPr id="2" name="Slide Image Placeholder 1"/>
+          <p:cNvSpPr>
+            <a:spLocks noGrp="1" noRot="1" noChangeAspect="1"/>
+          </p:cNvSpPr>
+          <p:nvPr>
+            <p:ph type="sldImg"/>
+          </p:nvPr>
+        </p:nvSpPr>
+        <p:spPr/>
+      </p:sp>
+      <p:sp>
+        <p:nvSpPr>
+          <p:cNvPr id="3" name="Notes Placeholder 2"/>
+          <p:cNvSpPr>
+            <a:spLocks noGrp="1"/>
+          </p:cNvSpPr>
+          <p:nvPr>
+            <p:ph type="body" idx="1"/>
+          </p:nvPr>
+        </p:nvSpPr>
+        <p:spPr/>
+        <p:txBody>
+          <a:bodyPr>
+            <a:normAutofit/>
+          </a:bodyPr>
+          <a:lstStyle/>
+          <a:p>
+            <a:r>
+              <a:rPr lang="en-US" dirty="0" smtClean="0"/>
+              <a:t>Time: 0:33</a:t>
+            </a:r>
+            <a:endParaRPr lang="en-US" dirty="0"/>
+          </a:p>
+        </p:txBody>
+      </p:sp>
+      <p:sp>
+        <p:nvSpPr>
+          <p:cNvPr id="4" name="Slide Number Placeholder 3"/>
+          <p:cNvSpPr>
+            <a:spLocks noGrp="1"/>
+          </p:cNvSpPr>
+          <p:nvPr>
+            <p:ph type="sldNum" sz="quarter" idx="10"/>
+          </p:nvPr>
+        </p:nvSpPr>
+        <p:spPr/>
+        <p:txBody>
+          <a:bodyPr/>
+          <a:lstStyle/>
+          <a:p>
+            <a:pPr>
+              <a:defRPr/>
+            </a:pPr>
+            <a:fld id="{5A54C694-995F-4285-BB19-700A08DB7AB0}" type="slidenum">
+              <a:rPr lang="en-US" smtClean="0"/>
+              <a:pPr>
+                <a:defRPr/>
+              </a:pPr>
+              <a:t>18</a:t>
+            </a:fld>
+            <a:endParaRPr lang="en-US"/>
+          </a:p>
+        </p:txBody>
+      </p:sp>
+    </p:spTree>
+  </p:cSld>
+  <p:clrMapOvr>
+    <a:masterClrMapping/>
+  </p:clrMapOvr>
+</p:notes>
+</file>
+
+<file path=ppt/notesSlides/notesSlide19.xml><?xml version="1.0" encoding="utf-8"?>
+<p:notes xmlns:a="http://schemas.openxmlformats.org/drawingml/2006/main" xmlns:r="http://schemas.openxmlformats.org/officeDocument/2006/relationships" xmlns:mc="http://schemas.openxmlformats.org/markup-compatibility/2006" xmlns:mv="urn:schemas-microsoft-com:mac:vml" xmlns:p="http://schemas.openxmlformats.org/presentationml/2006/main" mc:Ignorable="mv" mc:PreserveAttributes="mv:*">
+  <p:cSld>
+    <p:spTree>
+      <p:nvGrpSpPr>
+        <p:cNvPr id="1" name=""/>
+        <p:cNvGrpSpPr/>
+        <p:nvPr/>
+      </p:nvGrpSpPr>
+      <p:grpSpPr>
+        <a:xfrm>
+          <a:off x="0" y="0"/>
+          <a:ext cx="0" cy="0"/>
+          <a:chOff x="0" y="0"/>
+          <a:chExt cx="0" cy="0"/>
+        </a:xfrm>
+      </p:grpSpPr>
+      <p:sp>
+        <p:nvSpPr>
+          <p:cNvPr id="2" name="Slide Image Placeholder 1"/>
+          <p:cNvSpPr>
+            <a:spLocks noGrp="1" noRot="1" noChangeAspect="1"/>
+          </p:cNvSpPr>
+          <p:nvPr>
+            <p:ph type="sldImg"/>
+          </p:nvPr>
+        </p:nvSpPr>
+        <p:spPr/>
+      </p:sp>
+      <p:sp>
+        <p:nvSpPr>
+          <p:cNvPr id="3" name="Notes Placeholder 2"/>
+          <p:cNvSpPr>
+            <a:spLocks noGrp="1"/>
+          </p:cNvSpPr>
+          <p:nvPr>
+            <p:ph type="body" idx="1"/>
+          </p:nvPr>
+        </p:nvSpPr>
+        <p:spPr/>
+        <p:txBody>
+          <a:bodyPr>
+            <a:normAutofit/>
+          </a:bodyPr>
+          <a:lstStyle/>
+          <a:p>
+            <a:pPr marL="0" marR="0" indent="0" algn="l" defTabSz="914400" rtl="0" eaLnBrk="0" fontAlgn="base" latinLnBrk="0" hangingPunct="0">
+              <a:lnSpc>
+                <a:spcPct val="100000"/>
+              </a:lnSpc>
+              <a:spcBef>
+                <a:spcPct val="0"/>
+              </a:spcBef>
+              <a:spcAft>
+                <a:spcPct val="0"/>
+              </a:spcAft>
+              <a:buClrTx/>
+              <a:buSzTx/>
+              <a:buFontTx/>
+              <a:buNone/>
+              <a:tabLst/>
+              <a:defRPr/>
+            </a:pPr>
+            <a:r>
+              <a:rPr lang="en-US" dirty="0" smtClean="0"/>
+              <a:t>Break</a:t>
+            </a:r>
+            <a:r>
+              <a:rPr lang="en-US" baseline="0" dirty="0" smtClean="0"/>
+              <a:t> for questions about Iterations and Velocity!</a:t>
+            </a:r>
+            <a:endParaRPr lang="en-US" dirty="0" smtClean="0"/>
+          </a:p>
+          <a:p>
+            <a:r>
+              <a:rPr lang="en-US" dirty="0" smtClean="0"/>
+              <a:t>Time:</a:t>
+            </a:r>
+            <a:r>
+              <a:rPr lang="en-US" baseline="0" dirty="0" smtClean="0"/>
+              <a:t> 0:37</a:t>
+            </a:r>
+            <a:endParaRPr lang="en-US" dirty="0"/>
+          </a:p>
+        </p:txBody>
+      </p:sp>
+      <p:sp>
+        <p:nvSpPr>
+          <p:cNvPr id="4" name="Slide Number Placeholder 3"/>
+          <p:cNvSpPr>
+            <a:spLocks noGrp="1"/>
+          </p:cNvSpPr>
+          <p:nvPr>
+            <p:ph type="sldNum" sz="quarter" idx="10"/>
+          </p:nvPr>
+        </p:nvSpPr>
+        <p:spPr/>
+        <p:txBody>
+          <a:bodyPr/>
+          <a:lstStyle/>
+          <a:p>
+            <a:pPr>
+              <a:defRPr/>
+            </a:pPr>
+            <a:fld id="{5A54C694-995F-4285-BB19-700A08DB7AB0}" type="slidenum">
+              <a:rPr lang="en-US" smtClean="0"/>
+              <a:pPr>
+                <a:defRPr/>
+              </a:pPr>
+              <a:t>19</a:t>
             </a:fld>
             <a:endParaRPr lang="en-US"/>
           </a:p>
@@ -759,6 +1861,93 @@
           </a:bodyPr>
           <a:lstStyle/>
           <a:p>
+            <a:endParaRPr lang="en-US" dirty="0"/>
+          </a:p>
+        </p:txBody>
+      </p:sp>
+      <p:sp>
+        <p:nvSpPr>
+          <p:cNvPr id="4" name="Slide Number Placeholder 3"/>
+          <p:cNvSpPr>
+            <a:spLocks noGrp="1"/>
+          </p:cNvSpPr>
+          <p:nvPr>
+            <p:ph type="sldNum" sz="quarter" idx="10"/>
+          </p:nvPr>
+        </p:nvSpPr>
+        <p:spPr/>
+        <p:txBody>
+          <a:bodyPr/>
+          <a:lstStyle/>
+          <a:p>
+            <a:pPr>
+              <a:defRPr/>
+            </a:pPr>
+            <a:fld id="{5A54C694-995F-4285-BB19-700A08DB7AB0}" type="slidenum">
+              <a:rPr lang="en-US" smtClean="0"/>
+              <a:pPr>
+                <a:defRPr/>
+              </a:pPr>
+              <a:t>2</a:t>
+            </a:fld>
+            <a:endParaRPr lang="en-US"/>
+          </a:p>
+        </p:txBody>
+      </p:sp>
+    </p:spTree>
+  </p:cSld>
+  <p:clrMapOvr>
+    <a:masterClrMapping/>
+  </p:clrMapOvr>
+</p:notes>
+</file>
+
+<file path=ppt/notesSlides/notesSlide20.xml><?xml version="1.0" encoding="utf-8"?>
+<p:notes xmlns:a="http://schemas.openxmlformats.org/drawingml/2006/main" xmlns:r="http://schemas.openxmlformats.org/officeDocument/2006/relationships" xmlns:mc="http://schemas.openxmlformats.org/markup-compatibility/2006" xmlns:mv="urn:schemas-microsoft-com:mac:vml" xmlns:p="http://schemas.openxmlformats.org/presentationml/2006/main" mc:Ignorable="mv" mc:PreserveAttributes="mv:*">
+  <p:cSld>
+    <p:spTree>
+      <p:nvGrpSpPr>
+        <p:cNvPr id="1" name=""/>
+        <p:cNvGrpSpPr/>
+        <p:nvPr/>
+      </p:nvGrpSpPr>
+      <p:grpSpPr>
+        <a:xfrm>
+          <a:off x="0" y="0"/>
+          <a:ext cx="0" cy="0"/>
+          <a:chOff x="0" y="0"/>
+          <a:chExt cx="0" cy="0"/>
+        </a:xfrm>
+      </p:grpSpPr>
+      <p:sp>
+        <p:nvSpPr>
+          <p:cNvPr id="2" name="Slide Image Placeholder 1"/>
+          <p:cNvSpPr>
+            <a:spLocks noGrp="1" noRot="1" noChangeAspect="1"/>
+          </p:cNvSpPr>
+          <p:nvPr>
+            <p:ph type="sldImg"/>
+          </p:nvPr>
+        </p:nvSpPr>
+        <p:spPr/>
+      </p:sp>
+      <p:sp>
+        <p:nvSpPr>
+          <p:cNvPr id="3" name="Notes Placeholder 2"/>
+          <p:cNvSpPr>
+            <a:spLocks noGrp="1"/>
+          </p:cNvSpPr>
+          <p:nvPr>
+            <p:ph type="body" idx="1"/>
+          </p:nvPr>
+        </p:nvSpPr>
+        <p:spPr/>
+        <p:txBody>
+          <a:bodyPr>
+            <a:normAutofit/>
+          </a:bodyPr>
+          <a:lstStyle/>
+          <a:p>
             <a:pPr marL="0" marR="0" indent="0" algn="l" defTabSz="914400" rtl="0" eaLnBrk="0" fontAlgn="base" latinLnBrk="0" hangingPunct="0">
               <a:lnSpc>
                 <a:spcPct val="100000"/>
@@ -778,16 +1967,42 @@
             </a:pPr>
             <a:r>
               <a:rPr lang="en-US" dirty="0" smtClean="0"/>
-              <a:t>Break</a:t>
+              <a:t>You don’t change story estimates</a:t>
             </a:r>
             <a:r>
               <a:rPr lang="en-US" baseline="0" dirty="0" smtClean="0"/>
-              <a:t> for questions about story points!</a:t>
+              <a:t> after dev starts because you want your estimation to happen in a consistent way, before you start working.  Estimates are ESTIMATES, not a record of actual time.</a:t>
             </a:r>
             <a:endParaRPr lang="en-US" dirty="0" smtClean="0"/>
           </a:p>
           <a:p>
-            <a:endParaRPr lang="en-US" dirty="0"/>
+            <a:pPr marL="0" marR="0" indent="0" algn="l" defTabSz="914400" rtl="0" eaLnBrk="0" fontAlgn="base" latinLnBrk="0" hangingPunct="0">
+              <a:lnSpc>
+                <a:spcPct val="100000"/>
+              </a:lnSpc>
+              <a:spcBef>
+                <a:spcPct val="0"/>
+              </a:spcBef>
+              <a:spcAft>
+                <a:spcPct val="0"/>
+              </a:spcAft>
+              <a:buClrTx/>
+              <a:buSzTx/>
+              <a:buFontTx/>
+              <a:buNone/>
+              <a:tabLst/>
+              <a:defRPr/>
+            </a:pPr>
+            <a:r>
+              <a:rPr lang="en-US" dirty="0" smtClean="0"/>
+              <a:t>Questions?</a:t>
+            </a:r>
+          </a:p>
+          <a:p>
+            <a:r>
+              <a:rPr lang="en-US" dirty="0" smtClean="0"/>
+              <a:t>Time 0:40</a:t>
+            </a:r>
           </a:p>
         </p:txBody>
       </p:sp>
@@ -814,7 +2029,94 @@
               <a:pPr>
                 <a:defRPr/>
               </a:pPr>
-              <a:t>14</a:t>
+              <a:t>20</a:t>
+            </a:fld>
+            <a:endParaRPr lang="en-US"/>
+          </a:p>
+        </p:txBody>
+      </p:sp>
+    </p:spTree>
+  </p:cSld>
+  <p:clrMapOvr>
+    <a:masterClrMapping/>
+  </p:clrMapOvr>
+</p:notes>
+</file>
+
+<file path=ppt/notesSlides/notesSlide21.xml><?xml version="1.0" encoding="utf-8"?>
+<p:notes xmlns:a="http://schemas.openxmlformats.org/drawingml/2006/main" xmlns:r="http://schemas.openxmlformats.org/officeDocument/2006/relationships" xmlns:mc="http://schemas.openxmlformats.org/markup-compatibility/2006" xmlns:mv="urn:schemas-microsoft-com:mac:vml" xmlns:p="http://schemas.openxmlformats.org/presentationml/2006/main" mc:Ignorable="mv" mc:PreserveAttributes="mv:*">
+  <p:cSld>
+    <p:spTree>
+      <p:nvGrpSpPr>
+        <p:cNvPr id="1" name=""/>
+        <p:cNvGrpSpPr/>
+        <p:nvPr/>
+      </p:nvGrpSpPr>
+      <p:grpSpPr>
+        <a:xfrm>
+          <a:off x="0" y="0"/>
+          <a:ext cx="0" cy="0"/>
+          <a:chOff x="0" y="0"/>
+          <a:chExt cx="0" cy="0"/>
+        </a:xfrm>
+      </p:grpSpPr>
+      <p:sp>
+        <p:nvSpPr>
+          <p:cNvPr id="2" name="Slide Image Placeholder 1"/>
+          <p:cNvSpPr>
+            <a:spLocks noGrp="1" noRot="1" noChangeAspect="1"/>
+          </p:cNvSpPr>
+          <p:nvPr>
+            <p:ph type="sldImg"/>
+          </p:nvPr>
+        </p:nvSpPr>
+        <p:spPr/>
+      </p:sp>
+      <p:sp>
+        <p:nvSpPr>
+          <p:cNvPr id="3" name="Notes Placeholder 2"/>
+          <p:cNvSpPr>
+            <a:spLocks noGrp="1"/>
+          </p:cNvSpPr>
+          <p:nvPr>
+            <p:ph type="body" idx="1"/>
+          </p:nvPr>
+        </p:nvSpPr>
+        <p:spPr/>
+        <p:txBody>
+          <a:bodyPr>
+            <a:normAutofit/>
+          </a:bodyPr>
+          <a:lstStyle/>
+          <a:p>
+            <a:endParaRPr lang="en-US" dirty="0"/>
+          </a:p>
+        </p:txBody>
+      </p:sp>
+      <p:sp>
+        <p:nvSpPr>
+          <p:cNvPr id="4" name="Slide Number Placeholder 3"/>
+          <p:cNvSpPr>
+            <a:spLocks noGrp="1"/>
+          </p:cNvSpPr>
+          <p:nvPr>
+            <p:ph type="sldNum" sz="quarter" idx="10"/>
+          </p:nvPr>
+        </p:nvSpPr>
+        <p:spPr/>
+        <p:txBody>
+          <a:bodyPr/>
+          <a:lstStyle/>
+          <a:p>
+            <a:pPr>
+              <a:defRPr/>
+            </a:pPr>
+            <a:fld id="{5A54C694-995F-4285-BB19-700A08DB7AB0}" type="slidenum">
+              <a:rPr lang="en-US" smtClean="0"/>
+              <a:pPr>
+                <a:defRPr/>
+              </a:pPr>
+              <a:t>21</a:t>
             </a:fld>
             <a:endParaRPr lang="en-US"/>
           </a:p>
@@ -874,34 +2176,24 @@
           </a:bodyPr>
           <a:lstStyle/>
           <a:p>
-            <a:pPr marL="0" marR="0" indent="0" algn="l" defTabSz="914400" rtl="0" eaLnBrk="0" fontAlgn="base" latinLnBrk="0" hangingPunct="0">
-              <a:lnSpc>
-                <a:spcPct val="100000"/>
-              </a:lnSpc>
-              <a:spcBef>
-                <a:spcPct val="0"/>
-              </a:spcBef>
-              <a:spcAft>
-                <a:spcPct val="0"/>
-              </a:spcAft>
-              <a:buClrTx/>
-              <a:buSzTx/>
-              <a:buFontTx/>
-              <a:buNone/>
-              <a:tabLst/>
-              <a:defRPr/>
-            </a:pPr>
-            <a:r>
-              <a:rPr lang="en-US" dirty="0" smtClean="0"/>
-              <a:t>Break</a:t>
+            <a:r>
+              <a:rPr lang="en-US" dirty="0" smtClean="0"/>
+              <a:t>Ask for</a:t>
             </a:r>
             <a:r>
               <a:rPr lang="en-US" baseline="0" dirty="0" smtClean="0"/>
-              <a:t> for questions about Planning Poker!</a:t>
-            </a:r>
-            <a:endParaRPr lang="en-US" dirty="0" smtClean="0"/>
-          </a:p>
-          <a:p>
+              <a:t> suggestions why we might estimate.</a:t>
+            </a:r>
+          </a:p>
+          <a:p>
+            <a:r>
+              <a:rPr lang="en-US" dirty="0" smtClean="0"/>
+              <a:t>Time</a:t>
+            </a:r>
+            <a:r>
+              <a:rPr lang="en-US" baseline="0" dirty="0" smtClean="0"/>
+              <a:t>: 0:02</a:t>
+            </a:r>
             <a:endParaRPr lang="en-US" dirty="0"/>
           </a:p>
         </p:txBody>
@@ -929,7 +2221,7 @@
               <a:pPr>
                 <a:defRPr/>
               </a:pPr>
-              <a:t>16</a:t>
+              <a:t>3</a:t>
             </a:fld>
             <a:endParaRPr lang="en-US"/>
           </a:p>
@@ -989,35 +2281,17 @@
           </a:bodyPr>
           <a:lstStyle/>
           <a:p>
-            <a:pPr marL="0" marR="0" indent="0" algn="l" defTabSz="914400" rtl="0" eaLnBrk="0" fontAlgn="base" latinLnBrk="0" hangingPunct="0">
-              <a:lnSpc>
-                <a:spcPct val="100000"/>
-              </a:lnSpc>
-              <a:spcBef>
-                <a:spcPct val="0"/>
-              </a:spcBef>
-              <a:spcAft>
-                <a:spcPct val="0"/>
-              </a:spcAft>
-              <a:buClrTx/>
-              <a:buSzTx/>
-              <a:buFontTx/>
-              <a:buNone/>
-              <a:tabLst/>
-              <a:defRPr/>
-            </a:pPr>
-            <a:r>
-              <a:rPr lang="en-US" dirty="0" smtClean="0"/>
-              <a:t>Break</a:t>
-            </a:r>
             <a:r>
               <a:rPr lang="en-US" baseline="0" dirty="0" smtClean="0"/>
-              <a:t> for questions about Iterations and Velocity!</a:t>
-            </a:r>
+              <a:t>Typically, poor (or no) estimation leads directly to overworking as deadlines loom.  Then we cut corners and wind up with messy software that is difficult to </a:t>
+            </a:r>
+            <a:r>
+              <a:rPr lang="en-US" baseline="0" smtClean="0"/>
+              <a:t>maintain.</a:t>
+            </a:r>
+          </a:p>
+          <a:p>
             <a:endParaRPr lang="en-US" dirty="0" smtClean="0"/>
-          </a:p>
-          <a:p>
-            <a:endParaRPr lang="en-US" dirty="0"/>
           </a:p>
         </p:txBody>
       </p:sp>
@@ -1044,7 +2318,452 @@
               <a:pPr>
                 <a:defRPr/>
               </a:pPr>
-              <a:t>19</a:t>
+              <a:t>4</a:t>
+            </a:fld>
+            <a:endParaRPr lang="en-US"/>
+          </a:p>
+        </p:txBody>
+      </p:sp>
+    </p:spTree>
+  </p:cSld>
+  <p:clrMapOvr>
+    <a:masterClrMapping/>
+  </p:clrMapOvr>
+</p:notes>
+</file>
+
+<file path=ppt/notesSlides/notesSlide5.xml><?xml version="1.0" encoding="utf-8"?>
+<p:notes xmlns:a="http://schemas.openxmlformats.org/drawingml/2006/main" xmlns:r="http://schemas.openxmlformats.org/officeDocument/2006/relationships" xmlns:mc="http://schemas.openxmlformats.org/markup-compatibility/2006" xmlns:mv="urn:schemas-microsoft-com:mac:vml" xmlns:p="http://schemas.openxmlformats.org/presentationml/2006/main" mc:Ignorable="mv" mc:PreserveAttributes="mv:*">
+  <p:cSld>
+    <p:spTree>
+      <p:nvGrpSpPr>
+        <p:cNvPr id="1" name=""/>
+        <p:cNvGrpSpPr/>
+        <p:nvPr/>
+      </p:nvGrpSpPr>
+      <p:grpSpPr>
+        <a:xfrm>
+          <a:off x="0" y="0"/>
+          <a:ext cx="0" cy="0"/>
+          <a:chOff x="0" y="0"/>
+          <a:chExt cx="0" cy="0"/>
+        </a:xfrm>
+      </p:grpSpPr>
+      <p:sp>
+        <p:nvSpPr>
+          <p:cNvPr id="2" name="Slide Image Placeholder 1"/>
+          <p:cNvSpPr>
+            <a:spLocks noGrp="1" noRot="1" noChangeAspect="1"/>
+          </p:cNvSpPr>
+          <p:nvPr>
+            <p:ph type="sldImg"/>
+          </p:nvPr>
+        </p:nvSpPr>
+        <p:spPr/>
+      </p:sp>
+      <p:sp>
+        <p:nvSpPr>
+          <p:cNvPr id="3" name="Notes Placeholder 2"/>
+          <p:cNvSpPr>
+            <a:spLocks noGrp="1"/>
+          </p:cNvSpPr>
+          <p:nvPr>
+            <p:ph type="body" idx="1"/>
+          </p:nvPr>
+        </p:nvSpPr>
+        <p:spPr/>
+        <p:txBody>
+          <a:bodyPr>
+            <a:normAutofit/>
+          </a:bodyPr>
+          <a:lstStyle/>
+          <a:p>
+            <a:endParaRPr lang="en-US" dirty="0"/>
+          </a:p>
+        </p:txBody>
+      </p:sp>
+      <p:sp>
+        <p:nvSpPr>
+          <p:cNvPr id="4" name="Slide Number Placeholder 3"/>
+          <p:cNvSpPr>
+            <a:spLocks noGrp="1"/>
+          </p:cNvSpPr>
+          <p:nvPr>
+            <p:ph type="sldNum" sz="quarter" idx="10"/>
+          </p:nvPr>
+        </p:nvSpPr>
+        <p:spPr/>
+        <p:txBody>
+          <a:bodyPr/>
+          <a:lstStyle/>
+          <a:p>
+            <a:pPr>
+              <a:defRPr/>
+            </a:pPr>
+            <a:fld id="{5A54C694-995F-4285-BB19-700A08DB7AB0}" type="slidenum">
+              <a:rPr lang="en-US" smtClean="0"/>
+              <a:pPr>
+                <a:defRPr/>
+              </a:pPr>
+              <a:t>5</a:t>
+            </a:fld>
+            <a:endParaRPr lang="en-US"/>
+          </a:p>
+        </p:txBody>
+      </p:sp>
+    </p:spTree>
+  </p:cSld>
+  <p:clrMapOvr>
+    <a:masterClrMapping/>
+  </p:clrMapOvr>
+</p:notes>
+</file>
+
+<file path=ppt/notesSlides/notesSlide6.xml><?xml version="1.0" encoding="utf-8"?>
+<p:notes xmlns:a="http://schemas.openxmlformats.org/drawingml/2006/main" xmlns:r="http://schemas.openxmlformats.org/officeDocument/2006/relationships" xmlns:mc="http://schemas.openxmlformats.org/markup-compatibility/2006" xmlns:mv="urn:schemas-microsoft-com:mac:vml" xmlns:p="http://schemas.openxmlformats.org/presentationml/2006/main" mc:Ignorable="mv" mc:PreserveAttributes="mv:*">
+  <p:cSld>
+    <p:spTree>
+      <p:nvGrpSpPr>
+        <p:cNvPr id="1" name=""/>
+        <p:cNvGrpSpPr/>
+        <p:nvPr/>
+      </p:nvGrpSpPr>
+      <p:grpSpPr>
+        <a:xfrm>
+          <a:off x="0" y="0"/>
+          <a:ext cx="0" cy="0"/>
+          <a:chOff x="0" y="0"/>
+          <a:chExt cx="0" cy="0"/>
+        </a:xfrm>
+      </p:grpSpPr>
+      <p:sp>
+        <p:nvSpPr>
+          <p:cNvPr id="2" name="Slide Image Placeholder 1"/>
+          <p:cNvSpPr>
+            <a:spLocks noGrp="1" noRot="1" noChangeAspect="1"/>
+          </p:cNvSpPr>
+          <p:nvPr>
+            <p:ph type="sldImg"/>
+          </p:nvPr>
+        </p:nvSpPr>
+        <p:spPr/>
+      </p:sp>
+      <p:sp>
+        <p:nvSpPr>
+          <p:cNvPr id="3" name="Notes Placeholder 2"/>
+          <p:cNvSpPr>
+            <a:spLocks noGrp="1"/>
+          </p:cNvSpPr>
+          <p:nvPr>
+            <p:ph type="body" idx="1"/>
+          </p:nvPr>
+        </p:nvSpPr>
+        <p:spPr/>
+        <p:txBody>
+          <a:bodyPr>
+            <a:normAutofit/>
+          </a:bodyPr>
+          <a:lstStyle/>
+          <a:p>
+            <a:endParaRPr lang="en-US" dirty="0"/>
+          </a:p>
+        </p:txBody>
+      </p:sp>
+      <p:sp>
+        <p:nvSpPr>
+          <p:cNvPr id="4" name="Slide Number Placeholder 3"/>
+          <p:cNvSpPr>
+            <a:spLocks noGrp="1"/>
+          </p:cNvSpPr>
+          <p:nvPr>
+            <p:ph type="sldNum" sz="quarter" idx="10"/>
+          </p:nvPr>
+        </p:nvSpPr>
+        <p:spPr/>
+        <p:txBody>
+          <a:bodyPr/>
+          <a:lstStyle/>
+          <a:p>
+            <a:pPr>
+              <a:defRPr/>
+            </a:pPr>
+            <a:fld id="{5A54C694-995F-4285-BB19-700A08DB7AB0}" type="slidenum">
+              <a:rPr lang="en-US" smtClean="0"/>
+              <a:pPr>
+                <a:defRPr/>
+              </a:pPr>
+              <a:t>6</a:t>
+            </a:fld>
+            <a:endParaRPr lang="en-US"/>
+          </a:p>
+        </p:txBody>
+      </p:sp>
+    </p:spTree>
+  </p:cSld>
+  <p:clrMapOvr>
+    <a:masterClrMapping/>
+  </p:clrMapOvr>
+</p:notes>
+</file>
+
+<file path=ppt/notesSlides/notesSlide7.xml><?xml version="1.0" encoding="utf-8"?>
+<p:notes xmlns:a="http://schemas.openxmlformats.org/drawingml/2006/main" xmlns:r="http://schemas.openxmlformats.org/officeDocument/2006/relationships" xmlns:mc="http://schemas.openxmlformats.org/markup-compatibility/2006" xmlns:mv="urn:schemas-microsoft-com:mac:vml" xmlns:p="http://schemas.openxmlformats.org/presentationml/2006/main" mc:Ignorable="mv" mc:PreserveAttributes="mv:*">
+  <p:cSld>
+    <p:spTree>
+      <p:nvGrpSpPr>
+        <p:cNvPr id="1" name=""/>
+        <p:cNvGrpSpPr/>
+        <p:nvPr/>
+      </p:nvGrpSpPr>
+      <p:grpSpPr>
+        <a:xfrm>
+          <a:off x="0" y="0"/>
+          <a:ext cx="0" cy="0"/>
+          <a:chOff x="0" y="0"/>
+          <a:chExt cx="0" cy="0"/>
+        </a:xfrm>
+      </p:grpSpPr>
+      <p:sp>
+        <p:nvSpPr>
+          <p:cNvPr id="2" name="Slide Image Placeholder 1"/>
+          <p:cNvSpPr>
+            <a:spLocks noGrp="1" noRot="1" noChangeAspect="1"/>
+          </p:cNvSpPr>
+          <p:nvPr>
+            <p:ph type="sldImg"/>
+          </p:nvPr>
+        </p:nvSpPr>
+        <p:spPr/>
+      </p:sp>
+      <p:sp>
+        <p:nvSpPr>
+          <p:cNvPr id="3" name="Notes Placeholder 2"/>
+          <p:cNvSpPr>
+            <a:spLocks noGrp="1"/>
+          </p:cNvSpPr>
+          <p:nvPr>
+            <p:ph type="body" idx="1"/>
+          </p:nvPr>
+        </p:nvSpPr>
+        <p:spPr/>
+        <p:txBody>
+          <a:bodyPr>
+            <a:normAutofit/>
+          </a:bodyPr>
+          <a:lstStyle/>
+          <a:p>
+            <a:endParaRPr lang="en-US" dirty="0"/>
+          </a:p>
+        </p:txBody>
+      </p:sp>
+      <p:sp>
+        <p:nvSpPr>
+          <p:cNvPr id="4" name="Slide Number Placeholder 3"/>
+          <p:cNvSpPr>
+            <a:spLocks noGrp="1"/>
+          </p:cNvSpPr>
+          <p:nvPr>
+            <p:ph type="sldNum" sz="quarter" idx="10"/>
+          </p:nvPr>
+        </p:nvSpPr>
+        <p:spPr/>
+        <p:txBody>
+          <a:bodyPr/>
+          <a:lstStyle/>
+          <a:p>
+            <a:pPr>
+              <a:defRPr/>
+            </a:pPr>
+            <a:fld id="{5A54C694-995F-4285-BB19-700A08DB7AB0}" type="slidenum">
+              <a:rPr lang="en-US" smtClean="0"/>
+              <a:pPr>
+                <a:defRPr/>
+              </a:pPr>
+              <a:t>7</a:t>
+            </a:fld>
+            <a:endParaRPr lang="en-US"/>
+          </a:p>
+        </p:txBody>
+      </p:sp>
+    </p:spTree>
+  </p:cSld>
+  <p:clrMapOvr>
+    <a:masterClrMapping/>
+  </p:clrMapOvr>
+</p:notes>
+</file>
+
+<file path=ppt/notesSlides/notesSlide8.xml><?xml version="1.0" encoding="utf-8"?>
+<p:notes xmlns:a="http://schemas.openxmlformats.org/drawingml/2006/main" xmlns:r="http://schemas.openxmlformats.org/officeDocument/2006/relationships" xmlns:mc="http://schemas.openxmlformats.org/markup-compatibility/2006" xmlns:mv="urn:schemas-microsoft-com:mac:vml" xmlns:p="http://schemas.openxmlformats.org/presentationml/2006/main" mc:Ignorable="mv" mc:PreserveAttributes="mv:*">
+  <p:cSld>
+    <p:spTree>
+      <p:nvGrpSpPr>
+        <p:cNvPr id="1" name=""/>
+        <p:cNvGrpSpPr/>
+        <p:nvPr/>
+      </p:nvGrpSpPr>
+      <p:grpSpPr>
+        <a:xfrm>
+          <a:off x="0" y="0"/>
+          <a:ext cx="0" cy="0"/>
+          <a:chOff x="0" y="0"/>
+          <a:chExt cx="0" cy="0"/>
+        </a:xfrm>
+      </p:grpSpPr>
+      <p:sp>
+        <p:nvSpPr>
+          <p:cNvPr id="2" name="Slide Image Placeholder 1"/>
+          <p:cNvSpPr>
+            <a:spLocks noGrp="1" noRot="1" noChangeAspect="1"/>
+          </p:cNvSpPr>
+          <p:nvPr>
+            <p:ph type="sldImg"/>
+          </p:nvPr>
+        </p:nvSpPr>
+        <p:spPr/>
+      </p:sp>
+      <p:sp>
+        <p:nvSpPr>
+          <p:cNvPr id="3" name="Notes Placeholder 2"/>
+          <p:cNvSpPr>
+            <a:spLocks noGrp="1"/>
+          </p:cNvSpPr>
+          <p:nvPr>
+            <p:ph type="body" idx="1"/>
+          </p:nvPr>
+        </p:nvSpPr>
+        <p:spPr/>
+        <p:txBody>
+          <a:bodyPr>
+            <a:normAutofit/>
+          </a:bodyPr>
+          <a:lstStyle/>
+          <a:p>
+            <a:endParaRPr lang="en-US" dirty="0"/>
+          </a:p>
+        </p:txBody>
+      </p:sp>
+      <p:sp>
+        <p:nvSpPr>
+          <p:cNvPr id="4" name="Slide Number Placeholder 3"/>
+          <p:cNvSpPr>
+            <a:spLocks noGrp="1"/>
+          </p:cNvSpPr>
+          <p:nvPr>
+            <p:ph type="sldNum" sz="quarter" idx="10"/>
+          </p:nvPr>
+        </p:nvSpPr>
+        <p:spPr/>
+        <p:txBody>
+          <a:bodyPr/>
+          <a:lstStyle/>
+          <a:p>
+            <a:pPr>
+              <a:defRPr/>
+            </a:pPr>
+            <a:fld id="{5A54C694-995F-4285-BB19-700A08DB7AB0}" type="slidenum">
+              <a:rPr lang="en-US" smtClean="0"/>
+              <a:pPr>
+                <a:defRPr/>
+              </a:pPr>
+              <a:t>8</a:t>
+            </a:fld>
+            <a:endParaRPr lang="en-US"/>
+          </a:p>
+        </p:txBody>
+      </p:sp>
+    </p:spTree>
+  </p:cSld>
+  <p:clrMapOvr>
+    <a:masterClrMapping/>
+  </p:clrMapOvr>
+</p:notes>
+</file>
+
+<file path=ppt/notesSlides/notesSlide9.xml><?xml version="1.0" encoding="utf-8"?>
+<p:notes xmlns:a="http://schemas.openxmlformats.org/drawingml/2006/main" xmlns:r="http://schemas.openxmlformats.org/officeDocument/2006/relationships" xmlns:mc="http://schemas.openxmlformats.org/markup-compatibility/2006" xmlns:mv="urn:schemas-microsoft-com:mac:vml" xmlns:p="http://schemas.openxmlformats.org/presentationml/2006/main" mc:Ignorable="mv" mc:PreserveAttributes="mv:*">
+  <p:cSld>
+    <p:spTree>
+      <p:nvGrpSpPr>
+        <p:cNvPr id="1" name=""/>
+        <p:cNvGrpSpPr/>
+        <p:nvPr/>
+      </p:nvGrpSpPr>
+      <p:grpSpPr>
+        <a:xfrm>
+          <a:off x="0" y="0"/>
+          <a:ext cx="0" cy="0"/>
+          <a:chOff x="0" y="0"/>
+          <a:chExt cx="0" cy="0"/>
+        </a:xfrm>
+      </p:grpSpPr>
+      <p:sp>
+        <p:nvSpPr>
+          <p:cNvPr id="2" name="Slide Image Placeholder 1"/>
+          <p:cNvSpPr>
+            <a:spLocks noGrp="1" noRot="1" noChangeAspect="1"/>
+          </p:cNvSpPr>
+          <p:nvPr>
+            <p:ph type="sldImg"/>
+          </p:nvPr>
+        </p:nvSpPr>
+        <p:spPr/>
+      </p:sp>
+      <p:sp>
+        <p:nvSpPr>
+          <p:cNvPr id="3" name="Notes Placeholder 2"/>
+          <p:cNvSpPr>
+            <a:spLocks noGrp="1"/>
+          </p:cNvSpPr>
+          <p:nvPr>
+            <p:ph type="body" idx="1"/>
+          </p:nvPr>
+        </p:nvSpPr>
+        <p:spPr/>
+        <p:txBody>
+          <a:bodyPr>
+            <a:normAutofit/>
+          </a:bodyPr>
+          <a:lstStyle/>
+          <a:p>
+            <a:r>
+              <a:rPr lang="en-US" dirty="0" smtClean="0"/>
+              <a:t>By practical, I mean ‘proven to work better by trial</a:t>
+            </a:r>
+            <a:r>
+              <a:rPr lang="en-US" baseline="0" dirty="0" smtClean="0"/>
+              <a:t> and error’!</a:t>
+            </a:r>
+          </a:p>
+          <a:p>
+            <a:endParaRPr lang="en-US" dirty="0"/>
+          </a:p>
+        </p:txBody>
+      </p:sp>
+      <p:sp>
+        <p:nvSpPr>
+          <p:cNvPr id="4" name="Slide Number Placeholder 3"/>
+          <p:cNvSpPr>
+            <a:spLocks noGrp="1"/>
+          </p:cNvSpPr>
+          <p:nvPr>
+            <p:ph type="sldNum" sz="quarter" idx="10"/>
+          </p:nvPr>
+        </p:nvSpPr>
+        <p:spPr/>
+        <p:txBody>
+          <a:bodyPr/>
+          <a:lstStyle/>
+          <a:p>
+            <a:pPr>
+              <a:defRPr/>
+            </a:pPr>
+            <a:fld id="{5A54C694-995F-4285-BB19-700A08DB7AB0}" type="slidenum">
+              <a:rPr lang="en-US" smtClean="0"/>
+              <a:pPr>
+                <a:defRPr/>
+              </a:pPr>
+              <a:t>9</a:t>
             </a:fld>
             <a:endParaRPr lang="en-US"/>
           </a:p>
@@ -3237,7 +4956,7 @@
             <a:fld id="{F2BCC184-CBE3-4F29-A273-6F4E5CFA4DFC}" type="datetimeFigureOut">
               <a:rPr lang="en-US" smtClean="0"/>
               <a:pPr/>
-              <a:t>11/9/10</a:t>
+              <a:t>11/11/10</a:t>
             </a:fld>
             <a:endParaRPr lang="en-US"/>
           </a:p>
@@ -3883,6 +5602,13 @@
   <p:transition>
     <p:fade/>
   </p:transition>
+  <p:timing>
+    <p:tnLst>
+      <p:par>
+        <p:cTn id="1" dur="indefinite" restart="never" nodeType="tmRoot"/>
+      </p:par>
+    </p:tnLst>
+  </p:timing>
 </p:sld>
 </file>
 
@@ -3951,25 +5677,36 @@
             </a:pPr>
             <a:r>
               <a:rPr lang="en-US" dirty="0" smtClean="0"/>
-              <a:t>(Who) wants (what) so that (why)</a:t>
+              <a:t>Narrative:</a:t>
             </a:r>
           </a:p>
           <a:p>
             <a:pPr algn="ctr">
               <a:buNone/>
             </a:pPr>
+            <a:r>
+              <a:rPr lang="en-US" dirty="0" smtClean="0"/>
+              <a:t>(</a:t>
+            </a:r>
+            <a:r>
+              <a:rPr lang="en-US" dirty="0" smtClean="0"/>
+              <a:t>Who) wants (what) so that (why)</a:t>
+            </a:r>
+          </a:p>
+          <a:p>
+            <a:pPr algn="ctr">
+              <a:buNone/>
+            </a:pPr>
             <a:endParaRPr lang="en-US" dirty="0" smtClean="0"/>
           </a:p>
           <a:p>
             <a:r>
               <a:rPr lang="en-US" dirty="0" smtClean="0"/>
-              <a:t>Keep your user stories small</a:t>
-            </a:r>
-          </a:p>
-          <a:p>
-            <a:r>
-              <a:rPr lang="en-US" dirty="0" smtClean="0"/>
-              <a:t>A story is a conversation starter, and gets more detailed over time</a:t>
+              <a:t>A </a:t>
+            </a:r>
+            <a:r>
+              <a:rPr lang="en-US" dirty="0" smtClean="0"/>
+              <a:t>story is a conversation starter, and gets more detailed over time</a:t>
             </a:r>
           </a:p>
         </p:txBody>
@@ -3982,6 +5719,13 @@
   <p:transition>
     <p:fade/>
   </p:transition>
+  <p:timing>
+    <p:tnLst>
+      <p:par>
+        <p:cTn id="1" dur="indefinite" restart="never" nodeType="tmRoot"/>
+      </p:par>
+    </p:tnLst>
+  </p:timing>
 </p:sld>
 </file>
 
@@ -4412,6 +6156,13 @@
   <p:transition>
     <p:fade/>
   </p:transition>
+  <p:timing>
+    <p:tnLst>
+      <p:par>
+        <p:cTn id="1" dur="indefinite" restart="never" nodeType="tmRoot"/>
+      </p:par>
+    </p:tnLst>
+  </p:timing>
 </p:sld>
 </file>
 
@@ -4559,6 +6310,13 @@
   <p:transition>
     <p:fade/>
   </p:transition>
+  <p:timing>
+    <p:tnLst>
+      <p:par>
+        <p:cTn id="1" dur="indefinite" restart="never" nodeType="tmRoot"/>
+      </p:par>
+    </p:tnLst>
+  </p:timing>
 </p:sld>
 </file>
 
@@ -4624,17 +6382,18 @@
             </a:pPr>
             <a:r>
               <a:rPr lang="en-US" dirty="0" smtClean="0"/>
-              <a:t>… are an arbitrary unit of size/complexity that we use to estimate user stories in lieu of calendar time.</a:t>
+              <a:t>… are an arbitrary unit of size/complexity that we use to estimate user stories in lieu of calendar time</a:t>
+            </a:r>
+            <a:r>
+              <a:rPr lang="en-US" dirty="0" smtClean="0"/>
+              <a:t>.</a:t>
             </a:r>
           </a:p>
           <a:p>
             <a:pPr>
               <a:buNone/>
             </a:pPr>
-            <a:r>
-              <a:rPr lang="en-US" dirty="0" smtClean="0"/>
-              <a:t>Make all estimates relative to other stories to improve the accuracy of the estimates</a:t>
-            </a:r>
+            <a:endParaRPr lang="en-US" dirty="0" smtClean="0"/>
           </a:p>
           <a:p>
             <a:pPr>
@@ -4642,7 +6401,11 @@
             </a:pPr>
             <a:r>
               <a:rPr lang="en-US" dirty="0" smtClean="0"/>
-              <a:t>An alternative unit: Ideal Days</a:t>
+              <a:t>An </a:t>
+            </a:r>
+            <a:r>
+              <a:rPr lang="en-US" dirty="0" smtClean="0"/>
+              <a:t>alternative unit: Ideal Days</a:t>
             </a:r>
           </a:p>
         </p:txBody>
@@ -4655,6 +6418,13 @@
   <p:transition>
     <p:fade/>
   </p:transition>
+  <p:timing>
+    <p:tnLst>
+      <p:par>
+        <p:cTn id="1" dur="indefinite" restart="never" nodeType="tmRoot"/>
+      </p:par>
+    </p:tnLst>
+  </p:timing>
 </p:sld>
 </file>
 
@@ -4732,17 +6502,35 @@
               <a:rPr lang="en-US" dirty="0" smtClean="0"/>
               <a:t>!  We will estimate the high priority stories first.</a:t>
             </a:r>
-          </a:p>
-          <a:p>
-            <a:r>
-              <a:rPr lang="en-US" dirty="0" smtClean="0"/>
-              <a:t>Pick a baseline story to set the unit size</a:t>
+            <a:endParaRPr lang="en-US" dirty="0" smtClean="0"/>
+          </a:p>
+          <a:p>
+            <a:r>
+              <a:rPr lang="en-US" dirty="0" smtClean="0"/>
+              <a:t>Pick a scale</a:t>
             </a:r>
           </a:p>
           <a:p>
             <a:pPr lvl="1"/>
             <a:r>
               <a:rPr lang="en-US" dirty="0" smtClean="0"/>
+              <a:t>Examples: Fibonacci sequence or Powers of 2</a:t>
+            </a:r>
+          </a:p>
+          <a:p>
+            <a:r>
+              <a:rPr lang="en-US" dirty="0" smtClean="0"/>
+              <a:t>Pick </a:t>
+            </a:r>
+            <a:r>
+              <a:rPr lang="en-US" dirty="0" smtClean="0"/>
+              <a:t>a baseline story to set the unit size</a:t>
+            </a:r>
+          </a:p>
+          <a:p>
+            <a:pPr lvl="1"/>
+            <a:r>
+              <a:rPr lang="en-US" dirty="0" smtClean="0"/>
               <a:t>Make the smallest story 1 unit OR</a:t>
             </a:r>
           </a:p>
@@ -4752,19 +6540,7 @@
               <a:rPr lang="en-US" dirty="0" smtClean="0"/>
               <a:t>Choose a midsize story</a:t>
             </a:r>
-          </a:p>
-          <a:p>
-            <a:r>
-              <a:rPr lang="en-US" dirty="0" smtClean="0"/>
-              <a:t>Pick a scale</a:t>
-            </a:r>
-          </a:p>
-          <a:p>
-            <a:pPr lvl="1"/>
-            <a:r>
-              <a:rPr lang="en-US" dirty="0" smtClean="0"/>
-              <a:t>Examples: Fibonacci sequence or Powers of 2</a:t>
-            </a:r>
+            <a:endParaRPr lang="en-US" dirty="0" smtClean="0"/>
           </a:p>
           <a:p>
             <a:endParaRPr lang="en-US" dirty="0" smtClean="0"/>
@@ -4787,6 +6563,13 @@
   <p:transition>
     <p:fade/>
   </p:transition>
+  <p:timing>
+    <p:tnLst>
+      <p:par>
+        <p:cTn id="1" dur="indefinite" restart="never" nodeType="tmRoot"/>
+      </p:par>
+    </p:tnLst>
+  </p:timing>
 </p:sld>
 </file>
 
@@ -4870,7 +6653,11 @@
             </a:r>
             <a:r>
               <a:rPr lang="en-US" sz="3200" dirty="0" smtClean="0"/>
-              <a:t> overview</a:t>
+              <a:t> </a:t>
+            </a:r>
+            <a:r>
+              <a:rPr lang="en-US" sz="3200" dirty="0" smtClean="0"/>
+              <a:t>overview (1 min)</a:t>
             </a:r>
           </a:p>
           <a:p>
@@ -5003,6 +6790,13 @@
   <p:transition>
     <p:fade/>
   </p:transition>
+  <p:timing>
+    <p:tnLst>
+      <p:par>
+        <p:cTn id="1" dur="indefinite" restart="never" nodeType="tmRoot"/>
+      </p:par>
+    </p:tnLst>
+  </p:timing>
 </p:sld>
 </file>
 
@@ -5069,8 +6863,13 @@
           <a:p>
             <a:r>
               <a:rPr lang="en-US" dirty="0" smtClean="0"/>
-              <a:t>Keep it prioritized!</a:t>
-            </a:r>
+              <a:t>Keep it </a:t>
+            </a:r>
+            <a:r>
+              <a:rPr lang="en-US" dirty="0" smtClean="0"/>
+              <a:t>prioritized and organized!</a:t>
+            </a:r>
+            <a:endParaRPr lang="en-US" dirty="0" smtClean="0"/>
           </a:p>
           <a:p>
             <a:r>
@@ -5088,6 +6887,13 @@
   <p:transition>
     <p:fade/>
   </p:transition>
+  <p:timing>
+    <p:tnLst>
+      <p:par>
+        <p:cTn id="1" dur="indefinite" restart="never" nodeType="tmRoot"/>
+      </p:par>
+    </p:tnLst>
+  </p:timing>
 </p:sld>
 </file>
 
@@ -5158,18 +6964,37 @@
               <a:rPr lang="en-US" dirty="0" smtClean="0"/>
               <a:t>Do high risk / high priority work first</a:t>
             </a:r>
-          </a:p>
-          <a:p>
-            <a:r>
-              <a:rPr lang="en-US" dirty="0" smtClean="0"/>
-              <a:t>Make sure everyone can be kept busy</a:t>
-            </a:r>
-          </a:p>
-          <a:p>
-            <a:r>
-              <a:rPr lang="en-US" dirty="0" smtClean="0"/>
-              <a:t>How much can you do in one iteration?</a:t>
-            </a:r>
+            <a:endParaRPr lang="en-US" dirty="0" smtClean="0"/>
+          </a:p>
+          <a:p>
+            <a:r>
+              <a:rPr lang="en-US" dirty="0" smtClean="0"/>
+              <a:t>How </a:t>
+            </a:r>
+            <a:r>
+              <a:rPr lang="en-US" dirty="0" smtClean="0"/>
+              <a:t>much can you do in one iteration</a:t>
+            </a:r>
+            <a:r>
+              <a:rPr lang="en-US" dirty="0" smtClean="0"/>
+              <a:t>?</a:t>
+            </a:r>
+          </a:p>
+          <a:p>
+            <a:pPr lvl="1"/>
+            <a:r>
+              <a:rPr lang="en-US" dirty="0" smtClean="0"/>
+              <a:t>Make </a:t>
+            </a:r>
+            <a:r>
+              <a:rPr lang="en-US" dirty="0" smtClean="0"/>
+              <a:t>sure everyone can be kept </a:t>
+            </a:r>
+            <a:r>
+              <a:rPr lang="en-US" dirty="0" smtClean="0"/>
+              <a:t>busy</a:t>
+            </a:r>
+            <a:endParaRPr lang="en-US" dirty="0" smtClean="0"/>
           </a:p>
           <a:p>
             <a:pPr lvl="1"/>
@@ -5207,6 +7032,13 @@
   <p:transition>
     <p:fade/>
   </p:transition>
+  <p:timing>
+    <p:tnLst>
+      <p:par>
+        <p:cTn id="1" dur="indefinite" restart="never" nodeType="tmRoot"/>
+      </p:par>
+    </p:tnLst>
+  </p:timing>
 </p:sld>
 </file>
 
@@ -5284,13 +7116,19 @@
           <a:p>
             <a:r>
               <a:rPr lang="en-US" sz="3200" dirty="0" smtClean="0"/>
-              <a:t>Define ‘done’ to include testing and deployment!</a:t>
-            </a:r>
-          </a:p>
-          <a:p>
+              <a:t>Over </a:t>
+            </a:r>
             <a:r>
               <a:rPr lang="en-US" sz="3200" dirty="0" smtClean="0"/>
-              <a:t>Over time this number will stabilize (usually after 3 iterations)</a:t>
+              <a:t>time this number will stabilize (usually</a:t>
+            </a:r>
+            <a:r>
+              <a:rPr lang="en-US" sz="3200" dirty="0" smtClean="0"/>
+              <a:t> after 3 </a:t>
+            </a:r>
+            <a:r>
+              <a:rPr lang="en-US" sz="3200" dirty="0" smtClean="0"/>
+              <a:t>iterations)</a:t>
             </a:r>
           </a:p>
           <a:p>
@@ -5339,6 +7177,13 @@
   <p:transition>
     <p:fade/>
   </p:transition>
+  <p:timing>
+    <p:tnLst>
+      <p:par>
+        <p:cTn id="1" dur="indefinite" restart="never" nodeType="tmRoot"/>
+      </p:par>
+    </p:tnLst>
+  </p:timing>
 </p:sld>
 </file>
 
@@ -5552,7 +7397,15 @@
           <a:p>
             <a:r>
               <a:rPr lang="en-US" dirty="0" smtClean="0"/>
-              <a:t>Review your story estimates before each iteration, do they still make sense?</a:t>
+              <a:t>Review your</a:t>
+            </a:r>
+            <a:r>
+              <a:rPr lang="en-US" dirty="0" smtClean="0"/>
+              <a:t> upcoming story </a:t>
+            </a:r>
+            <a:r>
+              <a:rPr lang="en-US" dirty="0" smtClean="0"/>
+              <a:t>estimates before each iteration, do they still make sense?</a:t>
             </a:r>
           </a:p>
           <a:p>
@@ -5568,8 +7421,21 @@
             </a:r>
             <a:r>
               <a:rPr lang="en-US" dirty="0" smtClean="0"/>
-              <a:t>change an estimate after a story is completed!</a:t>
-            </a:r>
+              <a:t>change an estimate after a story</a:t>
+            </a:r>
+            <a:r>
+              <a:rPr lang="en-US" dirty="0" smtClean="0"/>
+              <a:t> has </a:t>
+            </a:r>
+            <a:r>
+              <a:rPr lang="en-US" dirty="0" smtClean="0"/>
+              <a:t>entered development</a:t>
+            </a:r>
+            <a:r>
+              <a:rPr lang="en-US" dirty="0" smtClean="0"/>
+              <a:t>!</a:t>
+            </a:r>
+            <a:endParaRPr lang="en-US" dirty="0" smtClean="0"/>
           </a:p>
         </p:txBody>
       </p:sp>
@@ -5581,6 +7447,13 @@
   <p:transition>
     <p:fade/>
   </p:transition>
+  <p:timing>
+    <p:tnLst>
+      <p:par>
+        <p:cTn id="1" dur="indefinite" restart="never" nodeType="tmRoot"/>
+      </p:par>
+    </p:tnLst>
+  </p:timing>
 </p:sld>
 </file>
 
@@ -5643,7 +7516,11 @@
           <a:p>
             <a:r>
               <a:rPr lang="en-US" dirty="0" smtClean="0"/>
-              <a:t>Break up into groups</a:t>
+              <a:t>Break up into </a:t>
+            </a:r>
+            <a:r>
+              <a:rPr lang="en-US" dirty="0" smtClean="0"/>
+              <a:t>groups</a:t>
             </a:r>
           </a:p>
           <a:p>
@@ -5706,6 +7583,13 @@
   <p:transition>
     <p:fade/>
   </p:transition>
+  <p:timing>
+    <p:tnLst>
+      <p:par>
+        <p:cTn id="1" dur="indefinite" restart="never" nodeType="tmRoot"/>
+      </p:par>
+    </p:tnLst>
+  </p:timing>
 </p:sld>
 </file>
 
@@ -5798,6 +7682,13 @@
   <p:transition>
     <p:fade/>
   </p:transition>
+  <p:timing>
+    <p:tnLst>
+      <p:par>
+        <p:cTn id="1" dur="indefinite" restart="never" nodeType="tmRoot"/>
+      </p:par>
+    </p:tnLst>
+  </p:timing>
 </p:sld>
 </file>
 
@@ -5902,7 +7793,7 @@
           <p:nvPr/>
         </p:nvPicPr>
         <p:blipFill>
-          <a:blip r:embed="rId2"/>
+          <a:blip r:embed="rId3"/>
           <a:stretch>
             <a:fillRect/>
           </a:stretch>
@@ -5925,6 +7816,13 @@
   <p:transition>
     <p:fade/>
   </p:transition>
+  <p:timing>
+    <p:tnLst>
+      <p:par>
+        <p:cTn id="1" dur="indefinite" restart="never" nodeType="tmRoot"/>
+      </p:par>
+    </p:tnLst>
+  </p:timing>
 </p:sld>
 </file>
 
@@ -6046,6 +7944,13 @@
   <p:transition>
     <p:fade/>
   </p:transition>
+  <p:timing>
+    <p:tnLst>
+      <p:par>
+        <p:cTn id="1" dur="indefinite" restart="never" nodeType="tmRoot"/>
+      </p:par>
+    </p:tnLst>
+  </p:timing>
 </p:sld>
 </file>
 
@@ -6183,6 +8088,13 @@
   <p:transition>
     <p:fade/>
   </p:transition>
+  <p:timing>
+    <p:tnLst>
+      <p:par>
+        <p:cTn id="1" dur="indefinite" restart="never" nodeType="tmRoot"/>
+      </p:par>
+    </p:tnLst>
+  </p:timing>
 </p:sld>
 </file>
 
@@ -6310,6 +8222,13 @@
   <p:transition>
     <p:fade/>
   </p:transition>
+  <p:timing>
+    <p:tnLst>
+      <p:par>
+        <p:cTn id="1" dur="indefinite" restart="never" nodeType="tmRoot"/>
+      </p:par>
+    </p:tnLst>
+  </p:timing>
 </p:sld>
 </file>
 
@@ -6449,6 +8368,13 @@
   <p:transition>
     <p:fade/>
   </p:transition>
+  <p:timing>
+    <p:tnLst>
+      <p:par>
+        <p:cTn id="1" dur="indefinite" restart="never" nodeType="tmRoot"/>
+      </p:par>
+    </p:tnLst>
+  </p:timing>
 </p:sld>
 </file>
 
@@ -6528,6 +8454,13 @@
   <p:transition>
     <p:fade/>
   </p:transition>
+  <p:timing>
+    <p:tnLst>
+      <p:par>
+        <p:cTn id="1" dur="indefinite" restart="never" nodeType="tmRoot"/>
+      </p:par>
+    </p:tnLst>
+  </p:timing>
 </p:sld>
 </file>
 

</xml_diff>

<commit_message>
Some more last minute tweaks and notes...
</commit_message>
<xml_diff>
--- a/Agile Firestarter Autumn 2010 Agile Estimation.pptx
+++ b/Agile Firestarter Autumn 2010 Agile Estimation.pptx
@@ -488,7 +488,7 @@
     </p:spTree>
     <p:extLst>
       <p:ext uri="{BB962C8B-B14F-4D97-AF65-F5344CB8AC3E}">
-        <p14:creationId xmlns:mc="http://schemas.openxmlformats.org/markup-compatibility/2006" xmlns:mv="urn:schemas-microsoft-com:mac:vml" xmlns:p14="http://schemas.microsoft.com/office/powerpoint/2010/main" xmlns:p="http://schemas.openxmlformats.org/presentationml/2006/main" xmlns:r="http://schemas.openxmlformats.org/officeDocument/2006/relationships" xmlns:a="http://schemas.openxmlformats.org/drawingml/2006/main" xmlns="" val="2551398053"/>
+        <p14:creationId xmlns="" xmlns:a="http://schemas.openxmlformats.org/drawingml/2006/main" xmlns:r="http://schemas.openxmlformats.org/officeDocument/2006/relationships" xmlns:p="http://schemas.openxmlformats.org/presentationml/2006/main" xmlns:p14="http://schemas.microsoft.com/office/powerpoint/2010/main" xmlns:mv="urn:schemas-microsoft-com:mac:vml" xmlns:mc="http://schemas.openxmlformats.org/markup-compatibility/2006" val="2551398053"/>
       </p:ext>
     </p:extLst>
   </p:cSld>
@@ -665,8 +665,8 @@
           <a:lstStyle/>
           <a:p>
             <a:r>
-              <a:rPr lang="en-US" dirty="0" smtClean="0"/>
-              <a:t>Introduce yourself.</a:t>
+              <a:rPr lang="en-US" baseline="0" dirty="0" smtClean="0"/>
+              <a:t>Don’t talk about your credentials, no one really cares, and you have too much content to cover.</a:t>
             </a:r>
             <a:endParaRPr lang="en-US" dirty="0"/>
           </a:p>
@@ -1120,15 +1120,7 @@
             </a:r>
             <a:r>
               <a:rPr lang="en-US" baseline="0" dirty="0" smtClean="0"/>
-              <a:t> </a:t>
-            </a:r>
-            <a:r>
-              <a:rPr lang="en-US" baseline="0" dirty="0" smtClean="0"/>
-              <a:t>for questions about user </a:t>
-            </a:r>
-            <a:r>
-              <a:rPr lang="en-US" baseline="0" dirty="0" smtClean="0"/>
-              <a:t>stories and defining your work!</a:t>
+              <a:t> for questions about user stories and defining your work!</a:t>
             </a:r>
           </a:p>
           <a:p>
@@ -1861,6 +1853,18 @@
           </a:bodyPr>
           <a:lstStyle/>
           <a:p>
+            <a:r>
+              <a:rPr lang="en-US" dirty="0" smtClean="0"/>
+              <a:t>In a nutshell: We’re going to use incomplete</a:t>
+            </a:r>
+            <a:r>
+              <a:rPr lang="en-US" baseline="0" dirty="0" smtClean="0"/>
+              <a:t> and uncertain information to approximate our work efforts before we undertake a big project, and this is going to be valuable to us, </a:t>
+            </a:r>
+            <a:r>
+              <a:rPr lang="en-US" baseline="0" smtClean="0"/>
+              <a:t>I promise.</a:t>
+            </a:r>
             <a:endParaRPr lang="en-US" dirty="0"/>
           </a:p>
         </p:txBody>
@@ -5404,12 +5408,20 @@
               <a:defRPr/>
             </a:pPr>
             <a:r>
-              <a:rPr lang="en-US" sz="2400" kern="0" smtClean="0">
+              <a:rPr lang="en-US" sz="2400" kern="0" dirty="0" smtClean="0">
                 <a:solidFill>
                   <a:schemeClr val="bg1"/>
                 </a:solidFill>
               </a:rPr>
-              <a:t>Dan Berlin</a:t>
+              <a:t>Dan </a:t>
+            </a:r>
+            <a:r>
+              <a:rPr lang="en-US" sz="2400" kern="0" dirty="0" smtClean="0">
+                <a:solidFill>
+                  <a:schemeClr val="bg1"/>
+                </a:solidFill>
+              </a:rPr>
+              <a:t>Berlin</a:t>
             </a:r>
           </a:p>
           <a:p>
@@ -5423,12 +5435,60 @@
               <a:defRPr/>
             </a:pPr>
             <a:r>
-              <a:rPr lang="en-US" sz="2000" kern="0" smtClean="0">
+              <a:rPr lang="en-US" sz="2400" kern="0" dirty="0" smtClean="0">
                 <a:solidFill>
                   <a:schemeClr val="bg1"/>
                 </a:solidFill>
               </a:rPr>
-              <a:t>daniel.l.berlin@gmail.com</a:t>
+              <a:t>Twitter: @</a:t>
+            </a:r>
+            <a:r>
+              <a:rPr lang="en-US" sz="2400" kern="0" dirty="0" err="1" smtClean="0">
+                <a:solidFill>
+                  <a:schemeClr val="bg1"/>
+                </a:solidFill>
+              </a:rPr>
+              <a:t>DanBerlin</a:t>
+            </a:r>
+            <a:endParaRPr lang="en-US" sz="2400" kern="0" dirty="0" smtClean="0">
+              <a:solidFill>
+                <a:schemeClr val="bg1"/>
+              </a:solidFill>
+            </a:endParaRPr>
+          </a:p>
+          <a:p>
+            <a:pPr lvl="0" defTabSz="914400" fontAlgn="base">
+              <a:spcAft>
+                <a:spcPct val="0"/>
+              </a:spcAft>
+              <a:buClr>
+                <a:schemeClr val="accent1"/>
+              </a:buClr>
+              <a:defRPr/>
+            </a:pPr>
+            <a:r>
+              <a:rPr lang="en-US" sz="2000" kern="0" dirty="0" smtClean="0">
+                <a:solidFill>
+                  <a:schemeClr val="bg1"/>
+                </a:solidFill>
+              </a:rPr>
+              <a:t>Email: </a:t>
+            </a:r>
+            <a:r>
+              <a:rPr lang="en-US" sz="2000" kern="0" dirty="0" err="1" smtClean="0">
+                <a:solidFill>
+                  <a:schemeClr val="bg1"/>
+                </a:solidFill>
+              </a:rPr>
+              <a:t>daniel.l.berlin</a:t>
+            </a:r>
+            <a:r>
+              <a:rPr lang="en-US" sz="2000" kern="0" dirty="0" err="1" smtClean="0">
+                <a:solidFill>
+                  <a:schemeClr val="bg1"/>
+                </a:solidFill>
+              </a:rPr>
+              <a:t>@gmail.com</a:t>
             </a:r>
             <a:endParaRPr lang="en-US" sz="2000" kern="0" dirty="0" smtClean="0">
               <a:solidFill>
@@ -5686,11 +5746,7 @@
             </a:pPr>
             <a:r>
               <a:rPr lang="en-US" dirty="0" smtClean="0"/>
-              <a:t>(</a:t>
-            </a:r>
-            <a:r>
-              <a:rPr lang="en-US" dirty="0" smtClean="0"/>
-              <a:t>Who) wants (what) so that (why)</a:t>
+              <a:t>(Who) wants (what) so that (why)</a:t>
             </a:r>
           </a:p>
           <a:p>
@@ -5702,11 +5758,7 @@
           <a:p>
             <a:r>
               <a:rPr lang="en-US" dirty="0" smtClean="0"/>
-              <a:t>A </a:t>
-            </a:r>
-            <a:r>
-              <a:rPr lang="en-US" dirty="0" smtClean="0"/>
-              <a:t>story is a conversation starter, and gets more detailed over time</a:t>
+              <a:t>A story is a conversation starter, and gets more detailed over time</a:t>
             </a:r>
           </a:p>
         </p:txBody>
@@ -6382,11 +6434,7 @@
             </a:pPr>
             <a:r>
               <a:rPr lang="en-US" dirty="0" smtClean="0"/>
-              <a:t>… are an arbitrary unit of size/complexity that we use to estimate user stories in lieu of calendar time</a:t>
-            </a:r>
-            <a:r>
-              <a:rPr lang="en-US" dirty="0" smtClean="0"/>
-              <a:t>.</a:t>
+              <a:t>… are an arbitrary unit of size/complexity that we use to estimate user stories in lieu of calendar time.</a:t>
             </a:r>
           </a:p>
           <a:p>
@@ -6401,11 +6449,7 @@
             </a:pPr>
             <a:r>
               <a:rPr lang="en-US" dirty="0" smtClean="0"/>
-              <a:t>An </a:t>
-            </a:r>
-            <a:r>
-              <a:rPr lang="en-US" dirty="0" smtClean="0"/>
-              <a:t>alternative unit: Ideal Days</a:t>
+              <a:t>An alternative unit: Ideal Days</a:t>
             </a:r>
           </a:p>
         </p:txBody>
@@ -6502,7 +6546,6 @@
               <a:rPr lang="en-US" dirty="0" smtClean="0"/>
               <a:t>!  We will estimate the high priority stories first.</a:t>
             </a:r>
-            <a:endParaRPr lang="en-US" dirty="0" smtClean="0"/>
           </a:p>
           <a:p>
             <a:r>
@@ -6520,11 +6563,7 @@
           <a:p>
             <a:r>
               <a:rPr lang="en-US" dirty="0" smtClean="0"/>
-              <a:t>Pick </a:t>
-            </a:r>
-            <a:r>
-              <a:rPr lang="en-US" dirty="0" smtClean="0"/>
-              <a:t>a baseline story to set the unit size</a:t>
+              <a:t>Pick a baseline story to set the unit size</a:t>
             </a:r>
           </a:p>
           <a:p>
@@ -6540,7 +6579,6 @@
               <a:rPr lang="en-US" dirty="0" smtClean="0"/>
               <a:t>Choose a midsize story</a:t>
             </a:r>
-            <a:endParaRPr lang="en-US" dirty="0" smtClean="0"/>
           </a:p>
           <a:p>
             <a:endParaRPr lang="en-US" dirty="0" smtClean="0"/>
@@ -6653,11 +6691,7 @@
             </a:r>
             <a:r>
               <a:rPr lang="en-US" sz="3200" dirty="0" smtClean="0"/>
-              <a:t> </a:t>
-            </a:r>
-            <a:r>
-              <a:rPr lang="en-US" sz="3200" dirty="0" smtClean="0"/>
-              <a:t>overview (1 min)</a:t>
+              <a:t> overview (1 min)</a:t>
             </a:r>
           </a:p>
           <a:p>
@@ -6863,13 +6897,8 @@
           <a:p>
             <a:r>
               <a:rPr lang="en-US" dirty="0" smtClean="0"/>
-              <a:t>Keep it </a:t>
-            </a:r>
-            <a:r>
-              <a:rPr lang="en-US" dirty="0" smtClean="0"/>
-              <a:t>prioritized and organized!</a:t>
-            </a:r>
-            <a:endParaRPr lang="en-US" dirty="0" smtClean="0"/>
+              <a:t>Keep it prioritized and organized!</a:t>
+            </a:r>
           </a:p>
           <a:p>
             <a:r>
@@ -6964,37 +6993,19 @@
               <a:rPr lang="en-US" dirty="0" smtClean="0"/>
               <a:t>Do high risk / high priority work first</a:t>
             </a:r>
-            <a:endParaRPr lang="en-US" dirty="0" smtClean="0"/>
-          </a:p>
-          <a:p>
-            <a:r>
-              <a:rPr lang="en-US" dirty="0" smtClean="0"/>
-              <a:t>How </a:t>
-            </a:r>
-            <a:r>
-              <a:rPr lang="en-US" dirty="0" smtClean="0"/>
-              <a:t>much can you do in one iteration</a:t>
-            </a:r>
-            <a:r>
-              <a:rPr lang="en-US" dirty="0" smtClean="0"/>
-              <a:t>?</a:t>
+          </a:p>
+          <a:p>
+            <a:r>
+              <a:rPr lang="en-US" dirty="0" smtClean="0"/>
+              <a:t>How much can you do in one iteration?</a:t>
             </a:r>
           </a:p>
           <a:p>
             <a:pPr lvl="1"/>
             <a:r>
               <a:rPr lang="en-US" dirty="0" smtClean="0"/>
-              <a:t>Make </a:t>
-            </a:r>
-            <a:r>
-              <a:rPr lang="en-US" dirty="0" smtClean="0"/>
-              <a:t>sure everyone can be kept </a:t>
-            </a:r>
-            <a:r>
-              <a:rPr lang="en-US" dirty="0" smtClean="0"/>
-              <a:t>busy</a:t>
-            </a:r>
-            <a:endParaRPr lang="en-US" dirty="0" smtClean="0"/>
+              <a:t>Make sure everyone can be kept busy</a:t>
+            </a:r>
           </a:p>
           <a:p>
             <a:pPr lvl="1"/>
@@ -7116,19 +7127,7 @@
           <a:p>
             <a:r>
               <a:rPr lang="en-US" sz="3200" dirty="0" smtClean="0"/>
-              <a:t>Over </a:t>
-            </a:r>
-            <a:r>
-              <a:rPr lang="en-US" sz="3200" dirty="0" smtClean="0"/>
-              <a:t>time this number will stabilize (usually</a:t>
-            </a:r>
-            <a:r>
-              <a:rPr lang="en-US" sz="3200" dirty="0" smtClean="0"/>
-              <a:t> after 3 </a:t>
-            </a:r>
-            <a:r>
-              <a:rPr lang="en-US" sz="3200" dirty="0" smtClean="0"/>
-              <a:t>iterations)</a:t>
+              <a:t>Over time this number will stabilize (usually after 3 iterations)</a:t>
             </a:r>
           </a:p>
           <a:p>
@@ -7397,15 +7396,7 @@
           <a:p>
             <a:r>
               <a:rPr lang="en-US" dirty="0" smtClean="0"/>
-              <a:t>Review your</a:t>
-            </a:r>
-            <a:r>
-              <a:rPr lang="en-US" dirty="0" smtClean="0"/>
-              <a:t> upcoming story </a:t>
-            </a:r>
-            <a:r>
-              <a:rPr lang="en-US" dirty="0" smtClean="0"/>
-              <a:t>estimates before each iteration, do they still make sense?</a:t>
+              <a:t>Review your upcoming story estimates before each iteration, do they still make sense?</a:t>
             </a:r>
           </a:p>
           <a:p>
@@ -7421,21 +7412,8 @@
             </a:r>
             <a:r>
               <a:rPr lang="en-US" dirty="0" smtClean="0"/>
-              <a:t>change an estimate after a story</a:t>
-            </a:r>
-            <a:r>
-              <a:rPr lang="en-US" dirty="0" smtClean="0"/>
-              <a:t> has </a:t>
-            </a:r>
-            <a:r>
-              <a:rPr lang="en-US" dirty="0" smtClean="0"/>
-              <a:t>entered development</a:t>
-            </a:r>
-            <a:r>
-              <a:rPr lang="en-US" dirty="0" smtClean="0"/>
-              <a:t>!</a:t>
-            </a:r>
-            <a:endParaRPr lang="en-US" dirty="0" smtClean="0"/>
+              <a:t>change an estimate after a story has entered development!</a:t>
+            </a:r>
           </a:p>
         </p:txBody>
       </p:sp>
@@ -7516,11 +7494,7 @@
           <a:p>
             <a:r>
               <a:rPr lang="en-US" dirty="0" smtClean="0"/>
-              <a:t>Break up into </a:t>
-            </a:r>
-            <a:r>
-              <a:rPr lang="en-US" dirty="0" smtClean="0"/>
-              <a:t>groups</a:t>
+              <a:t>Break up into groups</a:t>
             </a:r>
           </a:p>
           <a:p>

</xml_diff>